<commit_message>
sending week 6 updates - distributions
</commit_message>
<xml_diff>
--- a/lectures/le_5_tests.pptx
+++ b/lectures/le_5_tests.pptx
@@ -5,7 +5,7 @@
     <p:sldMasterId id="2147483648" r:id="rId1"/>
   </p:sldMasterIdLst>
   <p:notesMasterIdLst>
-    <p:notesMasterId r:id="rId43"/>
+    <p:notesMasterId r:id="rId44"/>
   </p:notesMasterIdLst>
   <p:sldIdLst>
     <p:sldId id="256" r:id="rId2"/>
@@ -27,28 +27,29 @@
     <p:sldId id="289" r:id="rId18"/>
     <p:sldId id="291" r:id="rId19"/>
     <p:sldId id="292" r:id="rId20"/>
-    <p:sldId id="293" r:id="rId21"/>
-    <p:sldId id="290" r:id="rId22"/>
-    <p:sldId id="294" r:id="rId23"/>
-    <p:sldId id="270" r:id="rId24"/>
-    <p:sldId id="271" r:id="rId25"/>
-    <p:sldId id="295" r:id="rId26"/>
-    <p:sldId id="296" r:id="rId27"/>
-    <p:sldId id="297" r:id="rId28"/>
-    <p:sldId id="298" r:id="rId29"/>
-    <p:sldId id="273" r:id="rId30"/>
-    <p:sldId id="274" r:id="rId31"/>
-    <p:sldId id="275" r:id="rId32"/>
-    <p:sldId id="299" r:id="rId33"/>
-    <p:sldId id="304" r:id="rId34"/>
-    <p:sldId id="276" r:id="rId35"/>
-    <p:sldId id="277" r:id="rId36"/>
-    <p:sldId id="278" r:id="rId37"/>
-    <p:sldId id="300" r:id="rId38"/>
-    <p:sldId id="279" r:id="rId39"/>
-    <p:sldId id="301" r:id="rId40"/>
-    <p:sldId id="284" r:id="rId41"/>
-    <p:sldId id="303" r:id="rId42"/>
+    <p:sldId id="305" r:id="rId21"/>
+    <p:sldId id="293" r:id="rId22"/>
+    <p:sldId id="290" r:id="rId23"/>
+    <p:sldId id="294" r:id="rId24"/>
+    <p:sldId id="270" r:id="rId25"/>
+    <p:sldId id="271" r:id="rId26"/>
+    <p:sldId id="295" r:id="rId27"/>
+    <p:sldId id="296" r:id="rId28"/>
+    <p:sldId id="297" r:id="rId29"/>
+    <p:sldId id="298" r:id="rId30"/>
+    <p:sldId id="273" r:id="rId31"/>
+    <p:sldId id="274" r:id="rId32"/>
+    <p:sldId id="275" r:id="rId33"/>
+    <p:sldId id="299" r:id="rId34"/>
+    <p:sldId id="304" r:id="rId35"/>
+    <p:sldId id="276" r:id="rId36"/>
+    <p:sldId id="277" r:id="rId37"/>
+    <p:sldId id="278" r:id="rId38"/>
+    <p:sldId id="300" r:id="rId39"/>
+    <p:sldId id="279" r:id="rId40"/>
+    <p:sldId id="301" r:id="rId41"/>
+    <p:sldId id="284" r:id="rId42"/>
+    <p:sldId id="303" r:id="rId43"/>
   </p:sldIdLst>
   <p:sldSz cx="12192000" cy="6858000"/>
   <p:notesSz cx="6858000" cy="9144000"/>
@@ -849,7 +850,7 @@
           <a:p>
             <a:fld id="{3FFC207A-36A1-3243-A33F-1510AFB24BC1}" type="slidenum">
               <a:rPr lang="en-US" smtClean="0"/>
-              <a:t>33</a:t>
+              <a:t>34</a:t>
             </a:fld>
             <a:endParaRPr lang="en-US"/>
           </a:p>
@@ -933,7 +934,7 @@
           <a:p>
             <a:fld id="{3FFC207A-36A1-3243-A33F-1510AFB24BC1}" type="slidenum">
               <a:rPr lang="en-US" smtClean="0"/>
-              <a:t>40</a:t>
+              <a:t>41</a:t>
             </a:fld>
             <a:endParaRPr lang="en-US"/>
           </a:p>
@@ -5087,7 +5088,13 @@
       </p:grpSpPr>
       <p:sp>
         <p:nvSpPr>
-          <p:cNvPr id="2" name="Title 1"/>
+          <p:cNvPr id="2" name="Title 1">
+            <a:extLst>
+              <a:ext uri="{FF2B5EF4-FFF2-40B4-BE49-F238E27FC236}">
+                <a16:creationId xmlns:a16="http://schemas.microsoft.com/office/drawing/2014/main" id="{C99ACE75-AB15-2C43-A627-4AF77E76C00C}"/>
+              </a:ext>
+            </a:extLst>
+          </p:cNvPr>
           <p:cNvSpPr>
             <a:spLocks noGrp="1"/>
           </p:cNvSpPr>
@@ -5100,16 +5107,19 @@
           <a:bodyPr/>
           <a:lstStyle/>
           <a:p>
-            <a:r>
-              <a:rPr lang="en-US" dirty="0"/>
-              <a:t>T-tests are powerful</a:t>
-            </a:r>
-          </a:p>
-        </p:txBody>
-      </p:sp>
-      <p:sp>
-        <p:nvSpPr>
-          <p:cNvPr id="3" name="Content Placeholder 2"/>
+            <a:endParaRPr lang="en-US"/>
+          </a:p>
+        </p:txBody>
+      </p:sp>
+      <p:sp>
+        <p:nvSpPr>
+          <p:cNvPr id="3" name="Content Placeholder 2">
+            <a:extLst>
+              <a:ext uri="{FF2B5EF4-FFF2-40B4-BE49-F238E27FC236}">
+                <a16:creationId xmlns:a16="http://schemas.microsoft.com/office/drawing/2014/main" id="{A13D8A58-9F50-FE4E-8A52-32048EACDE2D}"/>
+              </a:ext>
+            </a:extLst>
+          </p:cNvPr>
           <p:cNvSpPr>
             <a:spLocks noGrp="1"/>
           </p:cNvSpPr>
@@ -5124,32 +5134,7 @@
           <a:p>
             <a:r>
               <a:rPr lang="en-US" dirty="0"/>
-              <a:t>T-tests can be very powerful, paired t-tests can be more powerful than unpaired</a:t>
-            </a:r>
-          </a:p>
-          <a:p>
-            <a:pPr lvl="1"/>
-            <a:r>
-              <a:rPr lang="en-US" i="1" dirty="0"/>
-              <a:t>Try changing the amount you adding or subtracting to each forest value, and then running the paired and unpaired tests. What do you find?</a:t>
-            </a:r>
-          </a:p>
-          <a:p>
-            <a:endParaRPr lang="en-US" dirty="0"/>
-          </a:p>
-          <a:p>
-            <a:r>
-              <a:rPr lang="en-US" dirty="0"/>
-              <a:t>We can see that our p-values for a t-test are more powerful than if we did a permutation</a:t>
-            </a:r>
-          </a:p>
-          <a:p>
-            <a:endParaRPr lang="en-US" dirty="0"/>
-          </a:p>
-          <a:p>
-            <a:r>
-              <a:rPr lang="en-US" dirty="0"/>
-              <a:t>But what about the assumptions?</a:t>
+              <a:t>STOPPED HERE!!</a:t>
             </a:r>
           </a:p>
         </p:txBody>
@@ -5157,7 +5142,7 @@
     </p:spTree>
     <p:extLst>
       <p:ext uri="{BB962C8B-B14F-4D97-AF65-F5344CB8AC3E}">
-        <p14:creationId xmlns:p14="http://schemas.microsoft.com/office/powerpoint/2010/main" val="650816266"/>
+        <p14:creationId xmlns:p14="http://schemas.microsoft.com/office/powerpoint/2010/main" val="2496664721"/>
       </p:ext>
     </p:extLst>
   </p:cSld>
@@ -5199,10 +5184,9 @@
           <a:bodyPr/>
           <a:lstStyle/>
           <a:p>
-            <a:pPr algn="ctr"/>
-            <a:r>
-              <a:rPr lang="en-US" dirty="0"/>
-              <a:t>How do I know if my data is normally distributed?</a:t>
+            <a:r>
+              <a:rPr lang="en-US" dirty="0"/>
+              <a:t>T-tests are powerful</a:t>
             </a:r>
           </a:p>
         </p:txBody>
@@ -5219,41 +5203,45 @@
         </p:nvSpPr>
         <p:spPr/>
         <p:txBody>
-          <a:bodyPr>
-            <a:normAutofit/>
-          </a:bodyPr>
-          <a:lstStyle/>
-          <a:p>
-            <a:r>
-              <a:rPr lang="en-US" sz="3600" dirty="0"/>
-              <a:t>There are more tests!</a:t>
-            </a:r>
-          </a:p>
-          <a:p>
-            <a:endParaRPr lang="en-US" sz="3600" dirty="0"/>
-          </a:p>
-          <a:p>
-            <a:r>
-              <a:rPr lang="en-US" sz="3600" dirty="0"/>
-              <a:t>We will cover these in more details for linear models because there are nuances</a:t>
+          <a:bodyPr/>
+          <a:lstStyle/>
+          <a:p>
+            <a:r>
+              <a:rPr lang="en-US" dirty="0"/>
+              <a:t>T-tests can be very powerful, paired t-tests can be more powerful than unpaired</a:t>
             </a:r>
           </a:p>
           <a:p>
             <a:pPr lvl="1"/>
             <a:r>
-              <a:rPr lang="en-US" sz="3600" dirty="0"/>
-              <a:t>these nuances primarily deal with something called the residuals</a:t>
-            </a:r>
-          </a:p>
-          <a:p>
-            <a:endParaRPr lang="en-US" sz="3600" dirty="0"/>
+              <a:rPr lang="en-US" i="1" dirty="0"/>
+              <a:t>Try changing the amount you adding or subtracting to each forest value, and then running the paired and unpaired tests. What do you find?</a:t>
+            </a:r>
+          </a:p>
+          <a:p>
+            <a:endParaRPr lang="en-US" dirty="0"/>
+          </a:p>
+          <a:p>
+            <a:r>
+              <a:rPr lang="en-US" dirty="0"/>
+              <a:t>We can see that our p-values for a t-test are more powerful than if we did a permutation</a:t>
+            </a:r>
+          </a:p>
+          <a:p>
+            <a:endParaRPr lang="en-US" dirty="0"/>
+          </a:p>
+          <a:p>
+            <a:r>
+              <a:rPr lang="en-US" dirty="0"/>
+              <a:t>But what about the assumptions?</a:t>
+            </a:r>
           </a:p>
         </p:txBody>
       </p:sp>
     </p:spTree>
     <p:extLst>
       <p:ext uri="{BB962C8B-B14F-4D97-AF65-F5344CB8AC3E}">
-        <p14:creationId xmlns:p14="http://schemas.microsoft.com/office/powerpoint/2010/main" val="338309575"/>
+        <p14:creationId xmlns:p14="http://schemas.microsoft.com/office/powerpoint/2010/main" val="650816266"/>
       </p:ext>
     </p:extLst>
   </p:cSld>
@@ -5295,9 +5283,10 @@
           <a:bodyPr/>
           <a:lstStyle/>
           <a:p>
-            <a:r>
-              <a:rPr lang="en-US" dirty="0"/>
-              <a:t>Shapiro-Wilk Test</a:t>
+            <a:pPr algn="ctr"/>
+            <a:r>
+              <a:rPr lang="en-US" dirty="0"/>
+              <a:t>How do I know if my data is normally distributed?</a:t>
             </a:r>
           </a:p>
         </p:txBody>
@@ -5315,57 +5304,40 @@
         <p:spPr/>
         <p:txBody>
           <a:bodyPr>
-            <a:normAutofit fontScale="47500" lnSpcReduction="20000"/>
+            <a:normAutofit/>
           </a:bodyPr>
           <a:lstStyle/>
           <a:p>
             <a:r>
-              <a:rPr lang="en-US" sz="5100" dirty="0"/>
-              <a:t>A test of normality  (for data or residuals)</a:t>
-            </a:r>
-          </a:p>
-          <a:p>
-            <a:endParaRPr lang="en-US" sz="5100" dirty="0"/>
-          </a:p>
-          <a:p>
-            <a:r>
-              <a:rPr lang="en-US" sz="5100" dirty="0"/>
-              <a:t>Tests the null hypothesis that a sample (e.g. your data) came from a normally distributed population</a:t>
-            </a:r>
-          </a:p>
-          <a:p>
-            <a:endParaRPr lang="en-US" sz="5100" dirty="0"/>
-          </a:p>
-          <a:p>
-            <a:r>
-              <a:rPr lang="en-US" sz="5100" i="1" u="sng" dirty="0"/>
-              <a:t>The null hypothesis is that the data are normally distributed</a:t>
-            </a:r>
-          </a:p>
-          <a:p>
-            <a:endParaRPr lang="en-US" sz="5100" i="1" dirty="0"/>
-          </a:p>
-          <a:p>
-            <a:r>
-              <a:rPr lang="en-US" sz="5100" dirty="0"/>
-              <a:t>A P-value &lt; 0.05 indicates that data are not normally distributed</a:t>
-            </a:r>
-          </a:p>
-          <a:p>
-            <a:endParaRPr lang="en-US" sz="5100" dirty="0"/>
-          </a:p>
-          <a:p>
-            <a:r>
-              <a:rPr lang="en-US" sz="5100" dirty="0"/>
-              <a:t>Some others that are less powerful: Anderson-Darling, Kolmogorov-Smirnov, Lilliefors (Go to R..)</a:t>
-            </a:r>
+              <a:rPr lang="en-US" sz="3600" dirty="0"/>
+              <a:t>There are more tests!</a:t>
+            </a:r>
+          </a:p>
+          <a:p>
+            <a:endParaRPr lang="en-US" sz="3600" dirty="0"/>
+          </a:p>
+          <a:p>
+            <a:r>
+              <a:rPr lang="en-US" sz="3600" dirty="0"/>
+              <a:t>We will cover these in more details for linear models because there are nuances</a:t>
+            </a:r>
+          </a:p>
+          <a:p>
+            <a:pPr lvl="1"/>
+            <a:r>
+              <a:rPr lang="en-US" sz="3600" dirty="0"/>
+              <a:t>these nuances primarily deal with something called the residuals</a:t>
+            </a:r>
+          </a:p>
+          <a:p>
+            <a:endParaRPr lang="en-US" sz="3600" dirty="0"/>
           </a:p>
         </p:txBody>
       </p:sp>
     </p:spTree>
     <p:extLst>
       <p:ext uri="{BB962C8B-B14F-4D97-AF65-F5344CB8AC3E}">
-        <p14:creationId xmlns:p14="http://schemas.microsoft.com/office/powerpoint/2010/main" val="597949227"/>
+        <p14:creationId xmlns:p14="http://schemas.microsoft.com/office/powerpoint/2010/main" val="338309575"/>
       </p:ext>
     </p:extLst>
   </p:cSld>
@@ -5409,7 +5381,7 @@
           <a:p>
             <a:r>
               <a:rPr lang="en-US" dirty="0"/>
-              <a:t>More complicated permutation questions</a:t>
+              <a:t>Shapiro-Wilk Test</a:t>
             </a:r>
           </a:p>
         </p:txBody>
@@ -5426,45 +5398,58 @@
         </p:nvSpPr>
         <p:spPr/>
         <p:txBody>
-          <a:bodyPr/>
-          <a:lstStyle/>
-          <a:p>
-            <a:r>
-              <a:rPr lang="en-US" dirty="0"/>
-              <a:t>Ant colony distributions - Within each habitat, we can ask whether there is evidence that ant nests are aggregated, or distributed regularly?</a:t>
-            </a:r>
-          </a:p>
-          <a:p>
-            <a:pPr lvl="1"/>
-            <a:r>
-              <a:rPr lang="en-US" dirty="0"/>
-              <a:t>In other words, do they cluster, or avoid each other? Or can’t we tell?</a:t>
-            </a:r>
-          </a:p>
-          <a:p>
-            <a:pPr lvl="1"/>
-            <a:endParaRPr lang="en-US" dirty="0"/>
-          </a:p>
-          <a:p>
-            <a:pPr lvl="1"/>
-            <a:endParaRPr lang="en-US" dirty="0"/>
-          </a:p>
-          <a:p>
-            <a:r>
-              <a:rPr lang="en-US" dirty="0"/>
-              <a:t>A permutation approach would test this by assigning nests randomly to plots at different distances to generate a null distribution</a:t>
-            </a:r>
-            <a:br>
-              <a:rPr lang="en-US" dirty="0"/>
-            </a:br>
-            <a:endParaRPr lang="en-US" dirty="0"/>
+          <a:bodyPr>
+            <a:normAutofit fontScale="47500" lnSpcReduction="20000"/>
+          </a:bodyPr>
+          <a:lstStyle/>
+          <a:p>
+            <a:r>
+              <a:rPr lang="en-US" sz="5100" dirty="0"/>
+              <a:t>A test of normality  (for data or residuals)</a:t>
+            </a:r>
+          </a:p>
+          <a:p>
+            <a:endParaRPr lang="en-US" sz="5100" dirty="0"/>
+          </a:p>
+          <a:p>
+            <a:r>
+              <a:rPr lang="en-US" sz="5100" dirty="0"/>
+              <a:t>Tests the null hypothesis that a sample (e.g. your data) came from a normally distributed population</a:t>
+            </a:r>
+          </a:p>
+          <a:p>
+            <a:endParaRPr lang="en-US" sz="5100" dirty="0"/>
+          </a:p>
+          <a:p>
+            <a:r>
+              <a:rPr lang="en-US" sz="5100" i="1" u="sng" dirty="0"/>
+              <a:t>The null hypothesis is that the data are normally distributed</a:t>
+            </a:r>
+          </a:p>
+          <a:p>
+            <a:endParaRPr lang="en-US" sz="5100" i="1" dirty="0"/>
+          </a:p>
+          <a:p>
+            <a:r>
+              <a:rPr lang="en-US" sz="5100" dirty="0"/>
+              <a:t>A P-value &lt; 0.05 indicates that data are not normally distributed</a:t>
+            </a:r>
+          </a:p>
+          <a:p>
+            <a:endParaRPr lang="en-US" sz="5100" dirty="0"/>
+          </a:p>
+          <a:p>
+            <a:r>
+              <a:rPr lang="en-US" sz="5100" dirty="0"/>
+              <a:t>Some others that are less powerful: Anderson-Darling, Kolmogorov-Smirnov, Lilliefors (Go to R..)</a:t>
+            </a:r>
           </a:p>
         </p:txBody>
       </p:sp>
     </p:spTree>
     <p:extLst>
       <p:ext uri="{BB962C8B-B14F-4D97-AF65-F5344CB8AC3E}">
-        <p14:creationId xmlns:p14="http://schemas.microsoft.com/office/powerpoint/2010/main" val="1200410834"/>
+        <p14:creationId xmlns:p14="http://schemas.microsoft.com/office/powerpoint/2010/main" val="597949227"/>
       </p:ext>
     </p:extLst>
   </p:cSld>
@@ -5508,7 +5493,7 @@
           <a:p>
             <a:r>
               <a:rPr lang="en-US" dirty="0"/>
-              <a:t>Pond nutrients</a:t>
+              <a:t>More complicated permutation questions</a:t>
             </a:r>
           </a:p>
         </p:txBody>
@@ -5530,19 +5515,32 @@
           <a:p>
             <a:r>
               <a:rPr lang="en-US" dirty="0"/>
-              <a:t>We measure correlations between a species of algae and nitrogen and phosphorous levels in natural ponds. Thus, we have a data frame showing N, P and A (for algae).</a:t>
-            </a:r>
-          </a:p>
-          <a:p>
+              <a:t>Ant colony distributions - Within each habitat, we can ask whether there is evidence that ant nests are aggregated, or distributed regularly?</a:t>
+            </a:r>
+          </a:p>
+          <a:p>
+            <a:pPr lvl="1"/>
+            <a:r>
+              <a:rPr lang="en-US" dirty="0"/>
+              <a:t>In other words, do they cluster, or avoid each other? Or can’t we tell?</a:t>
+            </a:r>
+          </a:p>
+          <a:p>
+            <a:pPr lvl="1"/>
             <a:endParaRPr lang="en-US" dirty="0"/>
           </a:p>
           <a:p>
-            <a:r>
-              <a:rPr lang="en-US" dirty="0"/>
-              <a:t>What kinds of tests could we do to see whether the algae are correlated with nutrient levels?</a:t>
-            </a:r>
-          </a:p>
-          <a:p>
+            <a:pPr lvl="1"/>
+            <a:endParaRPr lang="en-US" dirty="0"/>
+          </a:p>
+          <a:p>
+            <a:r>
+              <a:rPr lang="en-US" dirty="0"/>
+              <a:t>A permutation approach would test this by assigning nests randomly to plots at different distances to generate a null distribution</a:t>
+            </a:r>
+            <a:br>
+              <a:rPr lang="en-US" dirty="0"/>
+            </a:br>
             <a:endParaRPr lang="en-US" dirty="0"/>
           </a:p>
         </p:txBody>
@@ -5550,7 +5548,7 @@
     </p:spTree>
     <p:extLst>
       <p:ext uri="{BB962C8B-B14F-4D97-AF65-F5344CB8AC3E}">
-        <p14:creationId xmlns:p14="http://schemas.microsoft.com/office/powerpoint/2010/main" val="326081140"/>
+        <p14:creationId xmlns:p14="http://schemas.microsoft.com/office/powerpoint/2010/main" val="1200410834"/>
       </p:ext>
     </p:extLst>
   </p:cSld>
@@ -5594,15 +5592,7 @@
           <a:p>
             <a:r>
               <a:rPr lang="en-US" dirty="0"/>
-              <a:t>Linear correlation </a:t>
-            </a:r>
-            <a:r>
-              <a:rPr lang="mr-IN" dirty="0"/>
-              <a:t>–</a:t>
-            </a:r>
-            <a:r>
-              <a:rPr lang="en-US" dirty="0"/>
-              <a:t> Pearson r correlation</a:t>
+              <a:t>Pond nutrients</a:t>
             </a:r>
           </a:p>
         </p:txBody>
@@ -5619,14 +5609,12 @@
         </p:nvSpPr>
         <p:spPr/>
         <p:txBody>
-          <a:bodyPr>
-            <a:normAutofit lnSpcReduction="10000"/>
-          </a:bodyPr>
-          <a:lstStyle/>
-          <a:p>
-            <a:r>
-              <a:rPr lang="en-US" dirty="0"/>
-              <a:t>Measures the degree of association between two variables</a:t>
+          <a:bodyPr/>
+          <a:lstStyle/>
+          <a:p>
+            <a:r>
+              <a:rPr lang="en-US" dirty="0"/>
+              <a:t>We measure correlations between a species of algae and nitrogen and phosphorous levels in natural ponds. Thus, we have a data frame showing N, P and A (for algae).</a:t>
             </a:r>
           </a:p>
           <a:p>
@@ -5635,64 +5623,18 @@
           <a:p>
             <a:r>
               <a:rPr lang="en-US" dirty="0"/>
-              <a:t>Gives you r which varies between -1 and 1. </a:t>
-            </a:r>
-          </a:p>
-          <a:p>
-            <a:pPr lvl="1"/>
-            <a:r>
-              <a:rPr lang="en-US" dirty="0"/>
-              <a:t>1 is a 1:1 relationship, so it gives you the strength of the linear correlation. </a:t>
+              <a:t>What kinds of tests could we do to see whether the algae are correlated with nutrient levels?</a:t>
             </a:r>
           </a:p>
           <a:p>
             <a:endParaRPr lang="en-US" dirty="0"/>
-          </a:p>
-          <a:p>
-            <a:r>
-              <a:rPr lang="en-US" dirty="0"/>
-              <a:t>Assumptions:</a:t>
-            </a:r>
-          </a:p>
-          <a:p>
-            <a:pPr lvl="1"/>
-            <a:r>
-              <a:rPr lang="en-US" b="1" u="sng" dirty="0"/>
-              <a:t>Both</a:t>
-            </a:r>
-            <a:r>
-              <a:rPr lang="en-US" dirty="0"/>
-              <a:t> variables are normally distributed</a:t>
-            </a:r>
-          </a:p>
-          <a:p>
-            <a:pPr lvl="1"/>
-            <a:r>
-              <a:rPr lang="en-US" dirty="0"/>
-              <a:t>Variables have a linear relationship (y = mx + b)</a:t>
-            </a:r>
-          </a:p>
-          <a:p>
-            <a:pPr lvl="1"/>
-            <a:r>
-              <a:rPr lang="en-US" dirty="0"/>
-              <a:t>Variables are equally distributed around a regression line (e.g. there isn’t bunching of the data in a given area </a:t>
-            </a:r>
-            <a:r>
-              <a:rPr lang="mr-IN" dirty="0"/>
-              <a:t>–</a:t>
-            </a:r>
-            <a:r>
-              <a:rPr lang="en-US" dirty="0"/>
-              <a:t> this is called homoscedasticity)</a:t>
-            </a:r>
           </a:p>
         </p:txBody>
       </p:sp>
     </p:spTree>
     <p:extLst>
       <p:ext uri="{BB962C8B-B14F-4D97-AF65-F5344CB8AC3E}">
-        <p14:creationId xmlns:p14="http://schemas.microsoft.com/office/powerpoint/2010/main" val="1079663477"/>
+        <p14:creationId xmlns:p14="http://schemas.microsoft.com/office/powerpoint/2010/main" val="326081140"/>
       </p:ext>
     </p:extLst>
   </p:cSld>
@@ -5734,10 +5676,17 @@
           <a:bodyPr/>
           <a:lstStyle/>
           <a:p>
-            <a:pPr algn="ctr"/>
-            <a:r>
-              <a:rPr lang="en-US" dirty="0"/>
-              <a:t>Non-linear? Test a correlation with Kendall Rank Correlation</a:t>
+            <a:r>
+              <a:rPr lang="en-US" dirty="0"/>
+              <a:t>Linear correlation </a:t>
+            </a:r>
+            <a:r>
+              <a:rPr lang="mr-IN" dirty="0"/>
+              <a:t>–</a:t>
+            </a:r>
+            <a:r>
+              <a:rPr lang="en-US" dirty="0"/>
+              <a:t> Pearson r correlation</a:t>
             </a:r>
           </a:p>
         </p:txBody>
@@ -5754,12 +5703,14 @@
         </p:nvSpPr>
         <p:spPr/>
         <p:txBody>
-          <a:bodyPr/>
-          <a:lstStyle/>
-          <a:p>
-            <a:r>
-              <a:rPr lang="en-US" dirty="0"/>
-              <a:t>Kendall rank correlation is a non-parametric test (e.g. non-normal, doesn’t need to be normally distributed)</a:t>
+          <a:bodyPr>
+            <a:normAutofit lnSpcReduction="10000"/>
+          </a:bodyPr>
+          <a:lstStyle/>
+          <a:p>
+            <a:r>
+              <a:rPr lang="en-US" dirty="0"/>
+              <a:t>Measures the degree of association between two variables</a:t>
             </a:r>
           </a:p>
           <a:p>
@@ -5768,7 +5719,14 @@
           <a:p>
             <a:r>
               <a:rPr lang="en-US" dirty="0"/>
-              <a:t>It ranks the order of things in your dataset and then measures the strength of dependence between two variables</a:t>
+              <a:t>Gives you r which varies between -1 and 1. </a:t>
+            </a:r>
+          </a:p>
+          <a:p>
+            <a:pPr lvl="1"/>
+            <a:r>
+              <a:rPr lang="en-US" dirty="0"/>
+              <a:t>1 is a 1:1 relationship, so it gives you the strength of the linear correlation. </a:t>
             </a:r>
           </a:p>
           <a:p>
@@ -5777,7 +5735,40 @@
           <a:p>
             <a:r>
               <a:rPr lang="en-US" dirty="0"/>
-              <a:t>It is less powerful, but still very useful</a:t>
+              <a:t>Assumptions:</a:t>
+            </a:r>
+          </a:p>
+          <a:p>
+            <a:pPr lvl="1"/>
+            <a:r>
+              <a:rPr lang="en-US" b="1" u="sng" dirty="0"/>
+              <a:t>Both</a:t>
+            </a:r>
+            <a:r>
+              <a:rPr lang="en-US" dirty="0"/>
+              <a:t> variables are normally distributed</a:t>
+            </a:r>
+          </a:p>
+          <a:p>
+            <a:pPr lvl="1"/>
+            <a:r>
+              <a:rPr lang="en-US" dirty="0"/>
+              <a:t>Variables have a linear relationship (y = mx + b)</a:t>
+            </a:r>
+          </a:p>
+          <a:p>
+            <a:pPr lvl="1"/>
+            <a:r>
+              <a:rPr lang="en-US" dirty="0"/>
+              <a:t>Variables are equally distributed around a regression line (e.g. there isn’t bunching of the data in a given area </a:t>
+            </a:r>
+            <a:r>
+              <a:rPr lang="mr-IN" dirty="0"/>
+              <a:t>–</a:t>
+            </a:r>
+            <a:r>
+              <a:rPr lang="en-US" dirty="0"/>
+              <a:t> this is called homoscedasticity)</a:t>
             </a:r>
           </a:p>
         </p:txBody>
@@ -5785,7 +5776,7 @@
     </p:spTree>
     <p:extLst>
       <p:ext uri="{BB962C8B-B14F-4D97-AF65-F5344CB8AC3E}">
-        <p14:creationId xmlns:p14="http://schemas.microsoft.com/office/powerpoint/2010/main" val="397136078"/>
+        <p14:creationId xmlns:p14="http://schemas.microsoft.com/office/powerpoint/2010/main" val="1079663477"/>
       </p:ext>
     </p:extLst>
   </p:cSld>
@@ -5827,9 +5818,10 @@
           <a:bodyPr/>
           <a:lstStyle/>
           <a:p>
-            <a:r>
-              <a:rPr lang="en-US" dirty="0"/>
-              <a:t>Note about testing correlations with tests</a:t>
+            <a:pPr algn="ctr"/>
+            <a:r>
+              <a:rPr lang="en-US" dirty="0"/>
+              <a:t>Non-linear? Test a correlation with Kendall Rank Correlation</a:t>
             </a:r>
           </a:p>
         </p:txBody>
@@ -5844,21 +5836,14 @@
             <p:ph idx="1"/>
           </p:nvPr>
         </p:nvSpPr>
-        <p:spPr>
-          <a:xfrm>
-            <a:off x="838200" y="1857156"/>
-            <a:ext cx="10515600" cy="4351338"/>
-          </a:xfrm>
-        </p:spPr>
-        <p:txBody>
-          <a:bodyPr>
-            <a:normAutofit lnSpcReduction="10000"/>
-          </a:bodyPr>
-          <a:lstStyle/>
-          <a:p>
-            <a:r>
-              <a:rPr lang="en-US" dirty="0"/>
-              <a:t>Correlational tests are useful for describing relationships between variables where we don’t have a strong a priori hypothesis about how one affects the others</a:t>
+        <p:spPr/>
+        <p:txBody>
+          <a:bodyPr/>
+          <a:lstStyle/>
+          <a:p>
+            <a:r>
+              <a:rPr lang="en-US" dirty="0"/>
+              <a:t>Kendall rank correlation is a non-parametric test (e.g. non-normal, doesn’t need to be normally distributed)</a:t>
             </a:r>
           </a:p>
           <a:p>
@@ -5867,7 +5852,7 @@
           <a:p>
             <a:r>
               <a:rPr lang="en-US" dirty="0"/>
-              <a:t>My opinion: When we have hypotheses about dependence, we should use models </a:t>
+              <a:t>It ranks the order of things in your dataset and then measures the strength of dependence between two variables</a:t>
             </a:r>
           </a:p>
           <a:p>
@@ -5876,26 +5861,15 @@
           <a:p>
             <a:r>
               <a:rPr lang="en-US" dirty="0"/>
-              <a:t>Which of these would you use a test vs a model?</a:t>
-            </a:r>
-          </a:p>
-          <a:p>
-            <a:pPr lvl="1"/>
-            <a:r>
-              <a:rPr lang="en-US" dirty="0"/>
-              <a:t>Salt intake and growth, fat and weight, temperature and infection, pavement and number of humans, number of frogs and number of fish</a:t>
-            </a:r>
-          </a:p>
-          <a:p>
-            <a:pPr lvl="1"/>
-            <a:endParaRPr lang="en-US" dirty="0"/>
+              <a:t>It is less powerful, but still very useful</a:t>
+            </a:r>
           </a:p>
         </p:txBody>
       </p:sp>
     </p:spTree>
     <p:extLst>
       <p:ext uri="{BB962C8B-B14F-4D97-AF65-F5344CB8AC3E}">
-        <p14:creationId xmlns:p14="http://schemas.microsoft.com/office/powerpoint/2010/main" val="1609073287"/>
+        <p14:creationId xmlns:p14="http://schemas.microsoft.com/office/powerpoint/2010/main" val="397136078"/>
       </p:ext>
     </p:extLst>
   </p:cSld>
@@ -5939,7 +5913,7 @@
           <a:p>
             <a:r>
               <a:rPr lang="en-US" dirty="0"/>
-              <a:t>Correlations with Permutations</a:t>
+              <a:t>Note about testing correlations with tests</a:t>
             </a:r>
           </a:p>
         </p:txBody>
@@ -5954,29 +5928,50 @@
             <p:ph idx="1"/>
           </p:nvPr>
         </p:nvSpPr>
-        <p:spPr/>
-        <p:txBody>
-          <a:bodyPr/>
-          <a:lstStyle/>
-          <a:p>
-            <a:r>
-              <a:rPr lang="en-US" dirty="0"/>
-              <a:t>With permutation tests, we can use any kind of prediction model, any statistic of prediction and any null hypothesis</a:t>
-            </a:r>
-          </a:p>
-          <a:p>
-            <a:r>
-              <a:rPr lang="en-US" dirty="0"/>
-              <a:t>Interchange things that should be interchangeable under the null hypothesis</a:t>
-            </a:r>
-          </a:p>
-          <a:p>
-            <a:r>
-              <a:rPr lang="en-US" dirty="0"/>
-              <a:t>How likely is it that we would observe a prediction as good or better as the one we have, under the null hypothesis that xx is interchangeable?</a:t>
-            </a:r>
-          </a:p>
-          <a:p>
+        <p:spPr>
+          <a:xfrm>
+            <a:off x="838200" y="1857156"/>
+            <a:ext cx="10515600" cy="4351338"/>
+          </a:xfrm>
+        </p:spPr>
+        <p:txBody>
+          <a:bodyPr>
+            <a:normAutofit lnSpcReduction="10000"/>
+          </a:bodyPr>
+          <a:lstStyle/>
+          <a:p>
+            <a:r>
+              <a:rPr lang="en-US" dirty="0"/>
+              <a:t>Correlational tests are useful for describing relationships between variables where we don’t have a strong a priori hypothesis about how one affects the others</a:t>
+            </a:r>
+          </a:p>
+          <a:p>
+            <a:endParaRPr lang="en-US" dirty="0"/>
+          </a:p>
+          <a:p>
+            <a:r>
+              <a:rPr lang="en-US" dirty="0"/>
+              <a:t>My opinion: When we have hypotheses about dependence, we should use models </a:t>
+            </a:r>
+          </a:p>
+          <a:p>
+            <a:endParaRPr lang="en-US" dirty="0"/>
+          </a:p>
+          <a:p>
+            <a:r>
+              <a:rPr lang="en-US" dirty="0"/>
+              <a:t>Which of these would you use a test vs a model?</a:t>
+            </a:r>
+          </a:p>
+          <a:p>
+            <a:pPr lvl="1"/>
+            <a:r>
+              <a:rPr lang="en-US" dirty="0"/>
+              <a:t>Salt intake and growth, fat and weight, temperature and infection, pavement and number of humans, number of frogs and number of fish</a:t>
+            </a:r>
+          </a:p>
+          <a:p>
+            <a:pPr lvl="1"/>
             <a:endParaRPr lang="en-US" dirty="0"/>
           </a:p>
         </p:txBody>
@@ -5984,7 +5979,7 @@
     </p:spTree>
     <p:extLst>
       <p:ext uri="{BB962C8B-B14F-4D97-AF65-F5344CB8AC3E}">
-        <p14:creationId xmlns:p14="http://schemas.microsoft.com/office/powerpoint/2010/main" val="743520985"/>
+        <p14:creationId xmlns:p14="http://schemas.microsoft.com/office/powerpoint/2010/main" val="1609073287"/>
       </p:ext>
     </p:extLst>
   </p:cSld>
@@ -6028,7 +6023,7 @@
           <a:p>
             <a:r>
               <a:rPr lang="en-US" dirty="0"/>
-              <a:t>Time and space</a:t>
+              <a:t>Correlations with Permutations</a:t>
             </a:r>
           </a:p>
         </p:txBody>
@@ -6050,42 +6045,30 @@
           <a:p>
             <a:r>
               <a:rPr lang="en-US" dirty="0"/>
-              <a:t>We can test for correlations between between variables (e.g. space/time) using permutation tests</a:t>
+              <a:t>With permutation tests, we can use any kind of prediction model, any statistic of prediction and any null hypothesis</a:t>
+            </a:r>
+          </a:p>
+          <a:p>
+            <a:r>
+              <a:rPr lang="en-US" dirty="0"/>
+              <a:t>Interchange things that should be interchangeable under the null hypothesis</a:t>
+            </a:r>
+          </a:p>
+          <a:p>
+            <a:r>
+              <a:rPr lang="en-US" dirty="0"/>
+              <a:t>How likely is it that we would observe a prediction as good or better as the one we have, under the null hypothesis that xx is interchangeable?</a:t>
             </a:r>
           </a:p>
           <a:p>
             <a:endParaRPr lang="en-US" dirty="0"/>
-          </a:p>
-          <a:p>
-            <a:r>
-              <a:rPr lang="en-US" dirty="0"/>
-              <a:t>A Mantel test is a type of permutation test</a:t>
-            </a:r>
-          </a:p>
-          <a:p>
-            <a:endParaRPr lang="en-US" dirty="0"/>
-          </a:p>
-          <a:p>
-            <a:r>
-              <a:rPr lang="en-US" dirty="0"/>
-              <a:t>A Fisher exact test is also a kind of permutation test</a:t>
-            </a:r>
-          </a:p>
-          <a:p>
-            <a:endParaRPr lang="en-US" dirty="0"/>
-          </a:p>
-          <a:p>
-            <a:r>
-              <a:rPr lang="en-US" dirty="0"/>
-              <a:t>You could also create your own test statistic!</a:t>
-            </a:r>
           </a:p>
         </p:txBody>
       </p:sp>
     </p:spTree>
     <p:extLst>
       <p:ext uri="{BB962C8B-B14F-4D97-AF65-F5344CB8AC3E}">
-        <p14:creationId xmlns:p14="http://schemas.microsoft.com/office/powerpoint/2010/main" val="111654817"/>
+        <p14:creationId xmlns:p14="http://schemas.microsoft.com/office/powerpoint/2010/main" val="743520985"/>
       </p:ext>
     </p:extLst>
   </p:cSld>
@@ -6232,7 +6215,7 @@
           <a:p>
             <a:r>
               <a:rPr lang="en-US" dirty="0"/>
-              <a:t>Mantel test</a:t>
+              <a:t>Time and space</a:t>
             </a:r>
           </a:p>
         </p:txBody>
@@ -6247,21 +6230,14 @@
             <p:ph idx="1"/>
           </p:nvPr>
         </p:nvSpPr>
-        <p:spPr>
-          <a:xfrm>
-            <a:off x="838200" y="1548384"/>
-            <a:ext cx="10515600" cy="4628579"/>
-          </a:xfrm>
-        </p:spPr>
-        <p:txBody>
-          <a:bodyPr>
-            <a:normAutofit fontScale="85000" lnSpcReduction="20000"/>
-          </a:bodyPr>
-          <a:lstStyle/>
-          <a:p>
-            <a:r>
-              <a:rPr lang="en-US" dirty="0"/>
-              <a:t>This is a statistical test of the correlation between two matrices of the same dimension</a:t>
+        <p:spPr/>
+        <p:txBody>
+          <a:bodyPr/>
+          <a:lstStyle/>
+          <a:p>
+            <a:r>
+              <a:rPr lang="en-US" dirty="0"/>
+              <a:t>We can test for correlations between between variables (e.g. space/time) using permutation tests</a:t>
             </a:r>
           </a:p>
           <a:p>
@@ -6270,14 +6246,7 @@
           <a:p>
             <a:r>
               <a:rPr lang="en-US" dirty="0"/>
-              <a:t>They are most frequently used in ecology where the data are distances between objects</a:t>
-            </a:r>
-          </a:p>
-          <a:p>
-            <a:pPr lvl="1"/>
-            <a:r>
-              <a:rPr lang="en-US" dirty="0"/>
-              <a:t>You might use a mantel test to see if your data are spatially autocorrelated</a:t>
+              <a:t>A Mantel test is a type of permutation test</a:t>
             </a:r>
           </a:p>
           <a:p>
@@ -6286,7 +6255,7 @@
           <a:p>
             <a:r>
               <a:rPr lang="en-US" dirty="0"/>
-              <a:t>For example, you might have one dataset which is a matrix of genetic distances, and one matrix with geographic distances between the range of species to each other species</a:t>
+              <a:t>A Fisher exact test is also a kind of permutation test</a:t>
             </a:r>
           </a:p>
           <a:p>
@@ -6295,28 +6264,15 @@
           <a:p>
             <a:r>
               <a:rPr lang="en-US" dirty="0"/>
-              <a:t>Here is some helpful info on how to do one: </a:t>
-            </a:r>
-            <a:r>
-              <a:rPr lang="en-US" dirty="0">
-                <a:hlinkClick r:id="rId2"/>
-              </a:rPr>
-              <a:t>https://stats.idre.ucla.edu/r/faq/how-can-i-perform-a-mantel-test-in-r/</a:t>
-            </a:r>
-            <a:r>
-              <a:rPr lang="en-US" dirty="0"/>
-              <a:t> </a:t>
-            </a:r>
-          </a:p>
-          <a:p>
-            <a:endParaRPr lang="en-US" dirty="0"/>
+              <a:t>You could also create your own test statistic!</a:t>
+            </a:r>
           </a:p>
         </p:txBody>
       </p:sp>
     </p:spTree>
     <p:extLst>
       <p:ext uri="{BB962C8B-B14F-4D97-AF65-F5344CB8AC3E}">
-        <p14:creationId xmlns:p14="http://schemas.microsoft.com/office/powerpoint/2010/main" val="416448812"/>
+        <p14:creationId xmlns:p14="http://schemas.microsoft.com/office/powerpoint/2010/main" val="111654817"/>
       </p:ext>
     </p:extLst>
   </p:cSld>
@@ -6360,7 +6316,7 @@
           <a:p>
             <a:r>
               <a:rPr lang="en-US" dirty="0"/>
-              <a:t>Fisher’s exact test</a:t>
+              <a:t>Mantel test</a:t>
             </a:r>
           </a:p>
         </p:txBody>
@@ -6375,14 +6331,21 @@
             <p:ph idx="1"/>
           </p:nvPr>
         </p:nvSpPr>
-        <p:spPr/>
-        <p:txBody>
-          <a:bodyPr/>
-          <a:lstStyle/>
-          <a:p>
-            <a:r>
-              <a:rPr lang="en-US" dirty="0"/>
-              <a:t>The fisher’s exact test is a test to analyze contingency tables (e.g. 2 x 2) tables of categorical count data</a:t>
+        <p:spPr>
+          <a:xfrm>
+            <a:off x="838200" y="1548384"/>
+            <a:ext cx="10515600" cy="4628579"/>
+          </a:xfrm>
+        </p:spPr>
+        <p:txBody>
+          <a:bodyPr>
+            <a:normAutofit fontScale="85000" lnSpcReduction="20000"/>
+          </a:bodyPr>
+          <a:lstStyle/>
+          <a:p>
+            <a:r>
+              <a:rPr lang="en-US" dirty="0"/>
+              <a:t>This is a statistical test of the correlation between two matrices of the same dimension</a:t>
             </a:r>
           </a:p>
           <a:p>
@@ -6391,17 +6354,42 @@
           <a:p>
             <a:r>
               <a:rPr lang="en-US" dirty="0"/>
-              <a:t>It’s good for small samples and unbalanced designs (e.g. the numbers in each group are not equal)</a:t>
-            </a:r>
-            <a:br>
-              <a:rPr lang="en-US" dirty="0"/>
-            </a:br>
+              <a:t>They are most frequently used in ecology where the data are distances between objects</a:t>
+            </a:r>
+          </a:p>
+          <a:p>
+            <a:pPr lvl="1"/>
+            <a:r>
+              <a:rPr lang="en-US" dirty="0"/>
+              <a:t>You might use a mantel test to see if your data are spatially autocorrelated</a:t>
+            </a:r>
+          </a:p>
+          <a:p>
             <a:endParaRPr lang="en-US" dirty="0"/>
           </a:p>
           <a:p>
             <a:r>
               <a:rPr lang="en-US" dirty="0"/>
-              <a:t>It uses a quasi-permutation approach to calculate an exact p-value</a:t>
+              <a:t>For example, you might have one dataset which is a matrix of genetic distances, and one matrix with geographic distances between the range of species to each other species</a:t>
+            </a:r>
+          </a:p>
+          <a:p>
+            <a:endParaRPr lang="en-US" dirty="0"/>
+          </a:p>
+          <a:p>
+            <a:r>
+              <a:rPr lang="en-US" dirty="0"/>
+              <a:t>Here is some helpful info on how to do one: </a:t>
+            </a:r>
+            <a:r>
+              <a:rPr lang="en-US" dirty="0">
+                <a:hlinkClick r:id="rId2"/>
+              </a:rPr>
+              <a:t>https://stats.idre.ucla.edu/r/faq/how-can-i-perform-a-mantel-test-in-r/</a:t>
+            </a:r>
+            <a:r>
+              <a:rPr lang="en-US" dirty="0"/>
+              <a:t> </a:t>
             </a:r>
           </a:p>
           <a:p>
@@ -6412,7 +6400,7 @@
     </p:spTree>
     <p:extLst>
       <p:ext uri="{BB962C8B-B14F-4D97-AF65-F5344CB8AC3E}">
-        <p14:creationId xmlns:p14="http://schemas.microsoft.com/office/powerpoint/2010/main" val="174052823"/>
+        <p14:creationId xmlns:p14="http://schemas.microsoft.com/office/powerpoint/2010/main" val="416448812"/>
       </p:ext>
     </p:extLst>
   </p:cSld>
@@ -6455,48 +6443,60 @@
           <a:lstStyle/>
           <a:p>
             <a:r>
-              <a:rPr lang="en-US"/>
-              <a:t>Fisher test example</a:t>
-            </a:r>
+              <a:rPr lang="en-US" dirty="0"/>
+              <a:t>Fisher’s exact test</a:t>
+            </a:r>
+          </a:p>
+        </p:txBody>
+      </p:sp>
+      <p:sp>
+        <p:nvSpPr>
+          <p:cNvPr id="3" name="Content Placeholder 2"/>
+          <p:cNvSpPr>
+            <a:spLocks noGrp="1"/>
+          </p:cNvSpPr>
+          <p:nvPr>
+            <p:ph idx="1"/>
+          </p:nvPr>
+        </p:nvSpPr>
+        <p:spPr/>
+        <p:txBody>
+          <a:bodyPr/>
+          <a:lstStyle/>
+          <a:p>
+            <a:r>
+              <a:rPr lang="en-US" dirty="0"/>
+              <a:t>The fisher’s exact test is a test to analyze contingency tables (e.g. 2 x 2) tables of categorical count data</a:t>
+            </a:r>
+          </a:p>
+          <a:p>
             <a:endParaRPr lang="en-US" dirty="0"/>
           </a:p>
-        </p:txBody>
-      </p:sp>
-      <p:sp>
-        <p:nvSpPr>
-          <p:cNvPr id="3" name="Content Placeholder 2"/>
-          <p:cNvSpPr>
-            <a:spLocks noGrp="1"/>
-          </p:cNvSpPr>
-          <p:nvPr>
-            <p:ph idx="1"/>
-          </p:nvPr>
-        </p:nvSpPr>
-        <p:spPr/>
-        <p:txBody>
-          <a:bodyPr/>
-          <a:lstStyle/>
-          <a:p>
-            <a:r>
-              <a:rPr lang="en-US" dirty="0"/>
-              <a:t>Pinnacles National Park has two different entrances that are unconnected. We went to the east side of Pinnacles 11 times, and 10 of 11 times we saw condors. We went to the west side of Pinnacle 8 times, and 1 of 8 times we saw condors. Is there a statistically significant difference in condor sightings? </a:t>
-            </a:r>
-          </a:p>
-          <a:p>
+          <a:p>
+            <a:r>
+              <a:rPr lang="en-US" dirty="0"/>
+              <a:t>It’s good for small samples and unbalanced designs (e.g. the numbers in each group are not equal)</a:t>
+            </a:r>
+            <a:br>
+              <a:rPr lang="en-US" dirty="0"/>
+            </a:br>
             <a:endParaRPr lang="en-US" dirty="0"/>
           </a:p>
           <a:p>
             <a:r>
               <a:rPr lang="en-US" dirty="0"/>
-              <a:t>Interpretation: Null hypothesis is that the probability is equal. A p-value &lt; 0.05 tells you that the east and west sides differ in the probability of detecting condors</a:t>
-            </a:r>
+              <a:t>It uses a quasi-permutation approach to calculate an exact p-value</a:t>
+            </a:r>
+          </a:p>
+          <a:p>
+            <a:endParaRPr lang="en-US" dirty="0"/>
           </a:p>
         </p:txBody>
       </p:sp>
     </p:spTree>
     <p:extLst>
       <p:ext uri="{BB962C8B-B14F-4D97-AF65-F5344CB8AC3E}">
-        <p14:creationId xmlns:p14="http://schemas.microsoft.com/office/powerpoint/2010/main" val="459422531"/>
+        <p14:creationId xmlns:p14="http://schemas.microsoft.com/office/powerpoint/2010/main" val="174052823"/>
       </p:ext>
     </p:extLst>
   </p:cSld>
@@ -6539,9 +6539,10 @@
           <a:lstStyle/>
           <a:p>
             <a:r>
-              <a:rPr lang="en-US" dirty="0"/>
-              <a:t>Rank tests</a:t>
-            </a:r>
+              <a:rPr lang="en-US"/>
+              <a:t>Fisher test example</a:t>
+            </a:r>
+            <a:endParaRPr lang="en-US" dirty="0"/>
           </a:p>
         </p:txBody>
       </p:sp>
@@ -6555,31 +6556,14 @@
             <p:ph idx="1"/>
           </p:nvPr>
         </p:nvSpPr>
-        <p:spPr>
-          <a:xfrm>
-            <a:off x="838200" y="1731029"/>
-            <a:ext cx="10515600" cy="4351338"/>
-          </a:xfrm>
-        </p:spPr>
-        <p:txBody>
-          <a:bodyPr>
-            <a:normAutofit fontScale="92500" lnSpcReduction="20000"/>
-          </a:bodyPr>
-          <a:lstStyle/>
-          <a:p>
-            <a:r>
-              <a:rPr lang="en-US" b="1" u="sng" dirty="0"/>
-              <a:t>Wilcoxon Signed Rank Test</a:t>
-            </a:r>
-          </a:p>
-          <a:p>
-            <a:r>
-              <a:rPr lang="en-US" b="1" dirty="0"/>
-              <a:t>Non-parametric</a:t>
-            </a:r>
-            <a:r>
-              <a:rPr lang="en-US" dirty="0"/>
-              <a:t> test to compare two related samples to assess whether population ranks differ</a:t>
+        <p:spPr/>
+        <p:txBody>
+          <a:bodyPr/>
+          <a:lstStyle/>
+          <a:p>
+            <a:r>
+              <a:rPr lang="en-US" dirty="0"/>
+              <a:t>Pinnacles National Park has two different entrances that are unconnected. We went to the east side of Pinnacles 11 times, and 10 of 11 times we saw condors. We went to the west side of Pinnacle 8 times, and 1 of 8 times we saw condors. Is there a statistically significant difference in condor sightings? </a:t>
             </a:r>
           </a:p>
           <a:p>
@@ -6588,55 +6572,7 @@
           <a:p>
             <a:r>
               <a:rPr lang="en-US" dirty="0"/>
-              <a:t>It the analogous to the </a:t>
-            </a:r>
-            <a:r>
-              <a:rPr lang="en-US" b="1" u="sng" dirty="0"/>
-              <a:t>paired</a:t>
-            </a:r>
-            <a:r>
-              <a:rPr lang="en-US" dirty="0"/>
-              <a:t> t-test, but for non-normal data (and isn’t as powerful)</a:t>
-            </a:r>
-          </a:p>
-          <a:p>
-            <a:endParaRPr lang="en-US" dirty="0"/>
-          </a:p>
-          <a:p>
-            <a:r>
-              <a:rPr lang="en-US" dirty="0"/>
-              <a:t>The </a:t>
-            </a:r>
-            <a:r>
-              <a:rPr lang="en-US" u="sng" dirty="0"/>
-              <a:t>Wilcoxon rank sum test</a:t>
-            </a:r>
-            <a:r>
-              <a:rPr lang="en-US" dirty="0"/>
-              <a:t> is the non-parametric equivalent to the </a:t>
-            </a:r>
-            <a:r>
-              <a:rPr lang="en-US" b="1" u="sng" dirty="0"/>
-              <a:t>unpaired</a:t>
-            </a:r>
-            <a:r>
-              <a:rPr lang="en-US" b="1" dirty="0"/>
-              <a:t> </a:t>
-            </a:r>
-            <a:r>
-              <a:rPr lang="en-US" dirty="0"/>
-              <a:t>t-test. You can indicate which one you want by specifying paired or unpaired in R. </a:t>
-            </a:r>
-            <a:r>
-              <a:rPr lang="en-US" u="sng" dirty="0"/>
-              <a:t> </a:t>
-            </a:r>
-          </a:p>
-          <a:p>
-            <a:pPr lvl="1"/>
-            <a:r>
-              <a:rPr lang="en-US" dirty="0"/>
-              <a:t>This is also called the Mann-Whitney U test, the Mann-Whitney-Wilcoxon, or the Wilcoxon-Mann-Whitney</a:t>
+              <a:t>Interpretation: Null hypothesis is that the probability is equal. A p-value &lt; 0.05 tells you that the east and west sides differ in the probability of detecting condors</a:t>
             </a:r>
           </a:p>
         </p:txBody>
@@ -6644,7 +6580,7 @@
     </p:spTree>
     <p:extLst>
       <p:ext uri="{BB962C8B-B14F-4D97-AF65-F5344CB8AC3E}">
-        <p14:creationId xmlns:p14="http://schemas.microsoft.com/office/powerpoint/2010/main" val="923724335"/>
+        <p14:creationId xmlns:p14="http://schemas.microsoft.com/office/powerpoint/2010/main" val="459422531"/>
       </p:ext>
     </p:extLst>
   </p:cSld>
@@ -6688,7 +6624,7 @@
           <a:p>
             <a:r>
               <a:rPr lang="en-US" dirty="0"/>
-              <a:t>Permutations and application to evolution</a:t>
+              <a:t>Rank tests</a:t>
             </a:r>
           </a:p>
         </p:txBody>
@@ -6703,14 +6639,31 @@
             <p:ph idx="1"/>
           </p:nvPr>
         </p:nvSpPr>
-        <p:spPr/>
-        <p:txBody>
-          <a:bodyPr/>
-          <a:lstStyle/>
-          <a:p>
-            <a:r>
-              <a:rPr lang="en-US" dirty="0"/>
-              <a:t>Infer a tree and then ask what happens if we relabel nucleotides at each site, or move mutations around the tree</a:t>
+        <p:spPr>
+          <a:xfrm>
+            <a:off x="838200" y="1731029"/>
+            <a:ext cx="10515600" cy="4351338"/>
+          </a:xfrm>
+        </p:spPr>
+        <p:txBody>
+          <a:bodyPr>
+            <a:normAutofit fontScale="92500" lnSpcReduction="20000"/>
+          </a:bodyPr>
+          <a:lstStyle/>
+          <a:p>
+            <a:r>
+              <a:rPr lang="en-US" b="1" u="sng" dirty="0"/>
+              <a:t>Wilcoxon Signed Rank Test</a:t>
+            </a:r>
+          </a:p>
+          <a:p>
+            <a:r>
+              <a:rPr lang="en-US" b="1" dirty="0"/>
+              <a:t>Non-parametric</a:t>
+            </a:r>
+            <a:r>
+              <a:rPr lang="en-US" dirty="0"/>
+              <a:t> test to compare two related samples to assess whether population ranks differ</a:t>
             </a:r>
           </a:p>
           <a:p>
@@ -6719,18 +6672,63 @@
           <a:p>
             <a:r>
               <a:rPr lang="en-US" dirty="0"/>
-              <a:t>Ask if there are differences between nucleotide preference in flu evolution by “relabeling” nucleotides</a:t>
+              <a:t>It the analogous to the </a:t>
+            </a:r>
+            <a:r>
+              <a:rPr lang="en-US" b="1" u="sng" dirty="0"/>
+              <a:t>paired</a:t>
+            </a:r>
+            <a:r>
+              <a:rPr lang="en-US" dirty="0"/>
+              <a:t> t-test, but for non-normal data (and isn’t as powerful)</a:t>
             </a:r>
           </a:p>
           <a:p>
             <a:endParaRPr lang="en-US" dirty="0"/>
+          </a:p>
+          <a:p>
+            <a:r>
+              <a:rPr lang="en-US" dirty="0"/>
+              <a:t>The </a:t>
+            </a:r>
+            <a:r>
+              <a:rPr lang="en-US" u="sng" dirty="0"/>
+              <a:t>Wilcoxon rank sum test</a:t>
+            </a:r>
+            <a:r>
+              <a:rPr lang="en-US" dirty="0"/>
+              <a:t> is the non-parametric equivalent to the </a:t>
+            </a:r>
+            <a:r>
+              <a:rPr lang="en-US" b="1" u="sng" dirty="0"/>
+              <a:t>unpaired</a:t>
+            </a:r>
+            <a:r>
+              <a:rPr lang="en-US" b="1" dirty="0"/>
+              <a:t> </a:t>
+            </a:r>
+            <a:r>
+              <a:rPr lang="en-US" dirty="0"/>
+              <a:t>t-test. You can indicate which one you want by specifying paired or unpaired in R. </a:t>
+            </a:r>
+            <a:r>
+              <a:rPr lang="en-US" u="sng" dirty="0"/>
+              <a:t> </a:t>
+            </a:r>
+          </a:p>
+          <a:p>
+            <a:pPr lvl="1"/>
+            <a:r>
+              <a:rPr lang="en-US" dirty="0"/>
+              <a:t>This is also called the Mann-Whitney U test, the Mann-Whitney-Wilcoxon, or the Wilcoxon-Mann-Whitney</a:t>
+            </a:r>
           </a:p>
         </p:txBody>
       </p:sp>
     </p:spTree>
     <p:extLst>
       <p:ext uri="{BB962C8B-B14F-4D97-AF65-F5344CB8AC3E}">
-        <p14:creationId xmlns:p14="http://schemas.microsoft.com/office/powerpoint/2010/main" val="1038584964"/>
+        <p14:creationId xmlns:p14="http://schemas.microsoft.com/office/powerpoint/2010/main" val="923724335"/>
       </p:ext>
     </p:extLst>
   </p:cSld>
@@ -6774,7 +6772,7 @@
           <a:p>
             <a:r>
               <a:rPr lang="en-US" dirty="0"/>
-              <a:t>Animal behavior</a:t>
+              <a:t>Permutations and application to evolution</a:t>
             </a:r>
           </a:p>
         </p:txBody>
@@ -6796,7 +6794,7 @@
           <a:p>
             <a:r>
               <a:rPr lang="en-US" dirty="0"/>
-              <a:t>Observe behavior of different individual animals. Evaluate observed statistics of (for example) tendency of bachelors to wander off from groups</a:t>
+              <a:t>Infer a tree and then ask what happens if we relabel nucleotides at each site, or move mutations around the tree</a:t>
             </a:r>
           </a:p>
           <a:p>
@@ -6805,13 +6803,7 @@
           <a:p>
             <a:r>
               <a:rPr lang="en-US" dirty="0"/>
-              <a:t>Classic tests don’t account for individual propensities</a:t>
-            </a:r>
-          </a:p>
-          <a:p>
-            <a:r>
-              <a:rPr lang="en-US" dirty="0"/>
-              <a:t>Switch whole “timelines” from one individual to another</a:t>
+              <a:t>Ask if there are differences between nucleotide preference in flu evolution by “relabeling” nucleotides</a:t>
             </a:r>
           </a:p>
           <a:p>
@@ -6822,7 +6814,7 @@
     </p:spTree>
     <p:extLst>
       <p:ext uri="{BB962C8B-B14F-4D97-AF65-F5344CB8AC3E}">
-        <p14:creationId xmlns:p14="http://schemas.microsoft.com/office/powerpoint/2010/main" val="1625008692"/>
+        <p14:creationId xmlns:p14="http://schemas.microsoft.com/office/powerpoint/2010/main" val="1038584964"/>
       </p:ext>
     </p:extLst>
   </p:cSld>
@@ -6866,7 +6858,7 @@
           <a:p>
             <a:r>
               <a:rPr lang="en-US" dirty="0"/>
-              <a:t>Confidence intervals</a:t>
+              <a:t>Animal behavior</a:t>
             </a:r>
           </a:p>
         </p:txBody>
@@ -6888,13 +6880,7 @@
           <a:p>
             <a:r>
               <a:rPr lang="en-US" dirty="0"/>
-              <a:t>The strength of permutation tests is also a weakness</a:t>
-            </a:r>
-          </a:p>
-          <a:p>
-            <a:r>
-              <a:rPr lang="en-US" dirty="0"/>
-              <a:t>Without assumptions about distributions, it’s not easy to get confidence intervals for our statistics</a:t>
+              <a:t>Observe behavior of different individual animals. Evaluate observed statistics of (for example) tendency of bachelors to wander off from groups</a:t>
             </a:r>
           </a:p>
           <a:p>
@@ -6903,18 +6889,16 @@
           <a:p>
             <a:r>
               <a:rPr lang="en-US" dirty="0"/>
-              <a:t>The field of getting confidence intervals from permutation tests is still developing</a:t>
-            </a:r>
-          </a:p>
-          <a:p>
-            <a:pPr lvl="1"/>
-            <a:r>
-              <a:rPr lang="en-US" dirty="0"/>
-              <a:t>Much can be done … but not without assumptions</a:t>
-            </a:r>
-            <a:br>
-              <a:rPr lang="en-US" dirty="0"/>
-            </a:br>
+              <a:t>Classic tests don’t account for individual propensities</a:t>
+            </a:r>
+          </a:p>
+          <a:p>
+            <a:r>
+              <a:rPr lang="en-US" dirty="0"/>
+              <a:t>Switch whole “timelines” from one individual to another</a:t>
+            </a:r>
+          </a:p>
+          <a:p>
             <a:endParaRPr lang="en-US" dirty="0"/>
           </a:p>
         </p:txBody>
@@ -6922,7 +6906,7 @@
     </p:spTree>
     <p:extLst>
       <p:ext uri="{BB962C8B-B14F-4D97-AF65-F5344CB8AC3E}">
-        <p14:creationId xmlns:p14="http://schemas.microsoft.com/office/powerpoint/2010/main" val="1104336559"/>
+        <p14:creationId xmlns:p14="http://schemas.microsoft.com/office/powerpoint/2010/main" val="1625008692"/>
       </p:ext>
     </p:extLst>
   </p:cSld>
@@ -6966,7 +6950,7 @@
           <a:p>
             <a:r>
               <a:rPr lang="en-US" dirty="0"/>
-              <a:t>Confidence intervals from means</a:t>
+              <a:t>Confidence intervals</a:t>
             </a:r>
           </a:p>
         </p:txBody>
@@ -6988,32 +6972,33 @@
           <a:p>
             <a:r>
               <a:rPr lang="en-US" dirty="0"/>
-              <a:t>We can obtain confidence intervals for a single mean if we assume that the data are drawn from a symmetric distribution</a:t>
+              <a:t>The strength of permutation tests is also a weakness</a:t>
+            </a:r>
+          </a:p>
+          <a:p>
+            <a:r>
+              <a:rPr lang="en-US" dirty="0"/>
+              <a:t>Without assumptions about distributions, it’s not easy to get confidence intervals for our statistics</a:t>
+            </a:r>
+          </a:p>
+          <a:p>
+            <a:endParaRPr lang="en-US" dirty="0"/>
+          </a:p>
+          <a:p>
+            <a:r>
+              <a:rPr lang="en-US" dirty="0"/>
+              <a:t>The field of getting confidence intervals from permutation tests is still developing</a:t>
             </a:r>
           </a:p>
           <a:p>
             <a:pPr lvl="1"/>
             <a:r>
               <a:rPr lang="en-US" dirty="0"/>
-              <a:t>It may be good to transform first</a:t>
-            </a:r>
-          </a:p>
-          <a:p>
-            <a:r>
-              <a:rPr lang="en-US" dirty="0"/>
-              <a:t>We can obtain confidence intervals for the difference between two means if we assume that the distributions are identical except for a ‘shift’</a:t>
-            </a:r>
-          </a:p>
-          <a:p>
-            <a:pPr lvl="1"/>
-            <a:r>
-              <a:rPr lang="en-US" dirty="0"/>
-              <a:t>Transformation also helps</a:t>
-            </a:r>
-            <a:r>
-              <a:rPr lang="mr-IN" dirty="0"/>
-              <a:t>…</a:t>
-            </a:r>
+              <a:t>Much can be done … but not without assumptions</a:t>
+            </a:r>
+            <a:br>
+              <a:rPr lang="en-US" dirty="0"/>
+            </a:br>
             <a:endParaRPr lang="en-US" dirty="0"/>
           </a:p>
         </p:txBody>
@@ -7021,7 +7006,7 @@
     </p:spTree>
     <p:extLst>
       <p:ext uri="{BB962C8B-B14F-4D97-AF65-F5344CB8AC3E}">
-        <p14:creationId xmlns:p14="http://schemas.microsoft.com/office/powerpoint/2010/main" val="1519358001"/>
+        <p14:creationId xmlns:p14="http://schemas.microsoft.com/office/powerpoint/2010/main" val="1104336559"/>
       </p:ext>
     </p:extLst>
   </p:cSld>
@@ -7065,7 +7050,7 @@
           <a:p>
             <a:r>
               <a:rPr lang="en-US" dirty="0"/>
-              <a:t>Medians</a:t>
+              <a:t>Confidence intervals from means</a:t>
             </a:r>
           </a:p>
         </p:txBody>
@@ -7087,21 +7072,32 @@
           <a:p>
             <a:r>
               <a:rPr lang="en-US" dirty="0"/>
-              <a:t>Permutation tests are well suited to comparing medians (and other quantiles), because these can be evaluated without distributional assumptions</a:t>
-            </a:r>
-          </a:p>
-          <a:p>
-            <a:endParaRPr lang="en-US" dirty="0"/>
+              <a:t>We can obtain confidence intervals for a single mean if we assume that the data are drawn from a symmetric distribution</a:t>
+            </a:r>
           </a:p>
           <a:p>
             <a:pPr lvl="1"/>
             <a:r>
               <a:rPr lang="en-US" dirty="0"/>
-              <a:t>This approach is related to rank tests</a:t>
-            </a:r>
-            <a:br>
-              <a:rPr lang="en-US" dirty="0"/>
-            </a:br>
+              <a:t>It may be good to transform first</a:t>
+            </a:r>
+          </a:p>
+          <a:p>
+            <a:r>
+              <a:rPr lang="en-US" dirty="0"/>
+              <a:t>We can obtain confidence intervals for the difference between two means if we assume that the distributions are identical except for a ‘shift’</a:t>
+            </a:r>
+          </a:p>
+          <a:p>
+            <a:pPr lvl="1"/>
+            <a:r>
+              <a:rPr lang="en-US" dirty="0"/>
+              <a:t>Transformation also helps</a:t>
+            </a:r>
+            <a:r>
+              <a:rPr lang="mr-IN" dirty="0"/>
+              <a:t>…</a:t>
+            </a:r>
             <a:endParaRPr lang="en-US" dirty="0"/>
           </a:p>
         </p:txBody>
@@ -7109,7 +7105,7 @@
     </p:spTree>
     <p:extLst>
       <p:ext uri="{BB962C8B-B14F-4D97-AF65-F5344CB8AC3E}">
-        <p14:creationId xmlns:p14="http://schemas.microsoft.com/office/powerpoint/2010/main" val="1783477262"/>
+        <p14:creationId xmlns:p14="http://schemas.microsoft.com/office/powerpoint/2010/main" val="1519358001"/>
       </p:ext>
     </p:extLst>
   </p:cSld>
@@ -7153,7 +7149,7 @@
           <a:p>
             <a:r>
               <a:rPr lang="en-US" dirty="0"/>
-              <a:t>A little more about permutations</a:t>
+              <a:t>Medians</a:t>
             </a:r>
           </a:p>
         </p:txBody>
@@ -7175,87 +7171,21 @@
           <a:p>
             <a:r>
               <a:rPr lang="en-US" dirty="0"/>
-              <a:t>There are packages for doing permutations </a:t>
-            </a:r>
-            <a:r>
-              <a:rPr lang="mr-IN" dirty="0"/>
-              <a:t>–</a:t>
-            </a:r>
-            <a:r>
-              <a:rPr lang="en-US" dirty="0"/>
-              <a:t> coin is one</a:t>
-            </a:r>
+              <a:t>Permutation tests are well suited to comparing medians (and other quantiles), because these can be evaluated without distributional assumptions</a:t>
+            </a:r>
+          </a:p>
+          <a:p>
+            <a:endParaRPr lang="en-US" dirty="0"/>
           </a:p>
           <a:p>
             <a:pPr lvl="1"/>
             <a:r>
               <a:rPr lang="en-US" dirty="0"/>
-              <a:t>This package is very powerful (and a bit complicated)</a:t>
-            </a:r>
-          </a:p>
-          <a:p>
-            <a:pPr lvl="1"/>
-            <a:endParaRPr lang="en-US" dirty="0"/>
-          </a:p>
-          <a:p>
-            <a:r>
-              <a:rPr lang="en-US" dirty="0"/>
-              <a:t>They will ask you to choose a type of p-value </a:t>
-            </a:r>
-          </a:p>
-          <a:p>
-            <a:r>
-              <a:rPr lang="en-US" b="1" dirty="0" err="1"/>
-              <a:t>oneway_test</a:t>
-            </a:r>
-            <a:r>
-              <a:rPr lang="en-US" dirty="0"/>
-              <a:t>(</a:t>
-            </a:r>
-            <a:r>
-              <a:rPr lang="en-US" dirty="0" err="1"/>
-              <a:t>colonies~place,data</a:t>
-            </a:r>
-            <a:r>
-              <a:rPr lang="en-US" dirty="0"/>
-              <a:t>=</a:t>
-            </a:r>
-            <a:r>
-              <a:rPr lang="en-US" dirty="0" err="1"/>
-              <a:t>ants,distribution</a:t>
-            </a:r>
-            <a:r>
-              <a:rPr lang="en-US" dirty="0"/>
-              <a:t>=</a:t>
-            </a:r>
-            <a:r>
-              <a:rPr lang="en-US" b="1" dirty="0"/>
-              <a:t>approximate</a:t>
-            </a:r>
-            <a:r>
-              <a:rPr lang="en-US" dirty="0"/>
-              <a:t>(B=9999))</a:t>
-            </a:r>
-          </a:p>
-          <a:p>
-            <a:pPr lvl="1"/>
-            <a:r>
-              <a:rPr lang="en-US" dirty="0"/>
-              <a:t>This should be equivalent to our simulation method</a:t>
-            </a:r>
-          </a:p>
-          <a:p>
-            <a:pPr lvl="1"/>
-            <a:r>
-              <a:rPr lang="en-US" dirty="0"/>
-              <a:t>My opinion: Brute force methods (e.g. writing a loop) still provide a more explicit way to do permutations</a:t>
+              <a:t>This approach is related to rank tests</a:t>
             </a:r>
             <a:br>
               <a:rPr lang="en-US" dirty="0"/>
             </a:br>
-            <a:endParaRPr lang="en-US" dirty="0"/>
-          </a:p>
-          <a:p>
             <a:endParaRPr lang="en-US" dirty="0"/>
           </a:p>
         </p:txBody>
@@ -7263,7 +7193,7 @@
     </p:spTree>
     <p:extLst>
       <p:ext uri="{BB962C8B-B14F-4D97-AF65-F5344CB8AC3E}">
-        <p14:creationId xmlns:p14="http://schemas.microsoft.com/office/powerpoint/2010/main" val="1103709518"/>
+        <p14:creationId xmlns:p14="http://schemas.microsoft.com/office/powerpoint/2010/main" val="1783477262"/>
       </p:ext>
     </p:extLst>
   </p:cSld>
@@ -7412,6 +7342,160 @@
           <a:p>
             <a:r>
               <a:rPr lang="en-US" dirty="0"/>
+              <a:t>A little more about permutations</a:t>
+            </a:r>
+          </a:p>
+        </p:txBody>
+      </p:sp>
+      <p:sp>
+        <p:nvSpPr>
+          <p:cNvPr id="3" name="Content Placeholder 2"/>
+          <p:cNvSpPr>
+            <a:spLocks noGrp="1"/>
+          </p:cNvSpPr>
+          <p:nvPr>
+            <p:ph idx="1"/>
+          </p:nvPr>
+        </p:nvSpPr>
+        <p:spPr/>
+        <p:txBody>
+          <a:bodyPr/>
+          <a:lstStyle/>
+          <a:p>
+            <a:r>
+              <a:rPr lang="en-US" dirty="0"/>
+              <a:t>There are packages for doing permutations </a:t>
+            </a:r>
+            <a:r>
+              <a:rPr lang="mr-IN" dirty="0"/>
+              <a:t>–</a:t>
+            </a:r>
+            <a:r>
+              <a:rPr lang="en-US" dirty="0"/>
+              <a:t> coin is one</a:t>
+            </a:r>
+          </a:p>
+          <a:p>
+            <a:pPr lvl="1"/>
+            <a:r>
+              <a:rPr lang="en-US" dirty="0"/>
+              <a:t>This package is very powerful (and a bit complicated)</a:t>
+            </a:r>
+          </a:p>
+          <a:p>
+            <a:pPr lvl="1"/>
+            <a:endParaRPr lang="en-US" dirty="0"/>
+          </a:p>
+          <a:p>
+            <a:r>
+              <a:rPr lang="en-US" dirty="0"/>
+              <a:t>They will ask you to choose a type of p-value </a:t>
+            </a:r>
+          </a:p>
+          <a:p>
+            <a:r>
+              <a:rPr lang="en-US" b="1" dirty="0" err="1"/>
+              <a:t>oneway_test</a:t>
+            </a:r>
+            <a:r>
+              <a:rPr lang="en-US" dirty="0"/>
+              <a:t>(</a:t>
+            </a:r>
+            <a:r>
+              <a:rPr lang="en-US" dirty="0" err="1"/>
+              <a:t>colonies~place,data</a:t>
+            </a:r>
+            <a:r>
+              <a:rPr lang="en-US" dirty="0"/>
+              <a:t>=</a:t>
+            </a:r>
+            <a:r>
+              <a:rPr lang="en-US" dirty="0" err="1"/>
+              <a:t>ants,distribution</a:t>
+            </a:r>
+            <a:r>
+              <a:rPr lang="en-US" dirty="0"/>
+              <a:t>=</a:t>
+            </a:r>
+            <a:r>
+              <a:rPr lang="en-US" b="1" dirty="0"/>
+              <a:t>approximate</a:t>
+            </a:r>
+            <a:r>
+              <a:rPr lang="en-US" dirty="0"/>
+              <a:t>(B=9999))</a:t>
+            </a:r>
+          </a:p>
+          <a:p>
+            <a:pPr lvl="1"/>
+            <a:r>
+              <a:rPr lang="en-US" dirty="0"/>
+              <a:t>This should be equivalent to our simulation method</a:t>
+            </a:r>
+          </a:p>
+          <a:p>
+            <a:pPr lvl="1"/>
+            <a:r>
+              <a:rPr lang="en-US" dirty="0"/>
+              <a:t>My opinion: Brute force methods (e.g. writing a loop) still provide a more explicit way to do permutations</a:t>
+            </a:r>
+            <a:br>
+              <a:rPr lang="en-US" dirty="0"/>
+            </a:br>
+            <a:endParaRPr lang="en-US" dirty="0"/>
+          </a:p>
+          <a:p>
+            <a:endParaRPr lang="en-US" dirty="0"/>
+          </a:p>
+        </p:txBody>
+      </p:sp>
+    </p:spTree>
+    <p:extLst>
+      <p:ext uri="{BB962C8B-B14F-4D97-AF65-F5344CB8AC3E}">
+        <p14:creationId xmlns:p14="http://schemas.microsoft.com/office/powerpoint/2010/main" val="1103709518"/>
+      </p:ext>
+    </p:extLst>
+  </p:cSld>
+  <p:clrMapOvr>
+    <a:masterClrMapping/>
+  </p:clrMapOvr>
+</p:sld>
+</file>
+
+<file path=ppt/slides/slide41.xml><?xml version="1.0" encoding="utf-8"?>
+<p:sld xmlns:a="http://schemas.openxmlformats.org/drawingml/2006/main" xmlns:r="http://schemas.openxmlformats.org/officeDocument/2006/relationships" xmlns:p="http://schemas.openxmlformats.org/presentationml/2006/main">
+  <p:cSld>
+    <p:spTree>
+      <p:nvGrpSpPr>
+        <p:cNvPr id="1" name=""/>
+        <p:cNvGrpSpPr/>
+        <p:nvPr/>
+      </p:nvGrpSpPr>
+      <p:grpSpPr>
+        <a:xfrm>
+          <a:off x="0" y="0"/>
+          <a:ext cx="0" cy="0"/>
+          <a:chOff x="0" y="0"/>
+          <a:chExt cx="0" cy="0"/>
+        </a:xfrm>
+      </p:grpSpPr>
+      <p:sp>
+        <p:nvSpPr>
+          <p:cNvPr id="2" name="Title 1"/>
+          <p:cNvSpPr>
+            <a:spLocks noGrp="1"/>
+          </p:cNvSpPr>
+          <p:nvPr>
+            <p:ph type="title"/>
+          </p:nvPr>
+        </p:nvSpPr>
+        <p:spPr/>
+        <p:txBody>
+          <a:bodyPr/>
+          <a:lstStyle/>
+          <a:p>
+            <a:r>
+              <a:rPr lang="en-US" dirty="0"/>
               <a:t>Permutation Summary</a:t>
             </a:r>
           </a:p>
@@ -7508,7 +7592,7 @@
 </p:sld>
 </file>
 
-<file path=ppt/slides/slide41.xml><?xml version="1.0" encoding="utf-8"?>
+<file path=ppt/slides/slide42.xml><?xml version="1.0" encoding="utf-8"?>
 <p:sld xmlns:a="http://schemas.openxmlformats.org/drawingml/2006/main" xmlns:r="http://schemas.openxmlformats.org/officeDocument/2006/relationships" xmlns:p="http://schemas.openxmlformats.org/presentationml/2006/main">
   <p:cSld>
     <p:spTree>

</xml_diff>

<commit_message>
sending week 5 updates to github
</commit_message>
<xml_diff>
--- a/lectures/le_5_tests.pptx
+++ b/lectures/le_5_tests.pptx
@@ -5,7 +5,7 @@
     <p:sldMasterId id="2147483648" r:id="rId1"/>
   </p:sldMasterIdLst>
   <p:notesMasterIdLst>
-    <p:notesMasterId r:id="rId44"/>
+    <p:notesMasterId r:id="rId36"/>
   </p:notesMasterIdLst>
   <p:sldIdLst>
     <p:sldId id="256" r:id="rId2"/>
@@ -24,32 +24,24 @@
     <p:sldId id="266" r:id="rId15"/>
     <p:sldId id="268" r:id="rId16"/>
     <p:sldId id="269" r:id="rId17"/>
-    <p:sldId id="289" r:id="rId18"/>
-    <p:sldId id="291" r:id="rId19"/>
-    <p:sldId id="292" r:id="rId20"/>
-    <p:sldId id="305" r:id="rId21"/>
-    <p:sldId id="293" r:id="rId22"/>
-    <p:sldId id="290" r:id="rId23"/>
-    <p:sldId id="294" r:id="rId24"/>
-    <p:sldId id="270" r:id="rId25"/>
-    <p:sldId id="271" r:id="rId26"/>
-    <p:sldId id="295" r:id="rId27"/>
-    <p:sldId id="296" r:id="rId28"/>
-    <p:sldId id="297" r:id="rId29"/>
-    <p:sldId id="298" r:id="rId30"/>
-    <p:sldId id="273" r:id="rId31"/>
-    <p:sldId id="274" r:id="rId32"/>
-    <p:sldId id="275" r:id="rId33"/>
-    <p:sldId id="299" r:id="rId34"/>
-    <p:sldId id="304" r:id="rId35"/>
-    <p:sldId id="276" r:id="rId36"/>
-    <p:sldId id="277" r:id="rId37"/>
-    <p:sldId id="278" r:id="rId38"/>
-    <p:sldId id="300" r:id="rId39"/>
-    <p:sldId id="279" r:id="rId40"/>
-    <p:sldId id="301" r:id="rId41"/>
-    <p:sldId id="284" r:id="rId42"/>
-    <p:sldId id="303" r:id="rId43"/>
+    <p:sldId id="301" r:id="rId18"/>
+    <p:sldId id="284" r:id="rId19"/>
+    <p:sldId id="306" r:id="rId20"/>
+    <p:sldId id="289" r:id="rId21"/>
+    <p:sldId id="291" r:id="rId22"/>
+    <p:sldId id="292" r:id="rId23"/>
+    <p:sldId id="293" r:id="rId24"/>
+    <p:sldId id="290" r:id="rId25"/>
+    <p:sldId id="294" r:id="rId26"/>
+    <p:sldId id="271" r:id="rId27"/>
+    <p:sldId id="295" r:id="rId28"/>
+    <p:sldId id="296" r:id="rId29"/>
+    <p:sldId id="297" r:id="rId30"/>
+    <p:sldId id="274" r:id="rId31"/>
+    <p:sldId id="275" r:id="rId32"/>
+    <p:sldId id="299" r:id="rId33"/>
+    <p:sldId id="304" r:id="rId34"/>
+    <p:sldId id="303" r:id="rId35"/>
   </p:sldIdLst>
   <p:sldSz cx="12192000" cy="6858000"/>
   <p:notesSz cx="6858000" cy="9144000"/>
@@ -238,7 +230,7 @@
           <a:p>
             <a:fld id="{6EBC5869-D15C-3840-B050-90A5C35E6518}" type="datetimeFigureOut">
               <a:rPr lang="en-US" smtClean="0"/>
-              <a:t>2/19/19</a:t>
+              <a:t>2/18/20</a:t>
             </a:fld>
             <a:endParaRPr lang="en-US"/>
           </a:p>
@@ -850,7 +842,7 @@
           <a:p>
             <a:fld id="{3FFC207A-36A1-3243-A33F-1510AFB24BC1}" type="slidenum">
               <a:rPr lang="en-US" smtClean="0"/>
-              <a:t>34</a:t>
+              <a:t>18</a:t>
             </a:fld>
             <a:endParaRPr lang="en-US"/>
           </a:p>
@@ -859,7 +851,7 @@
     </p:spTree>
     <p:extLst>
       <p:ext uri="{BB962C8B-B14F-4D97-AF65-F5344CB8AC3E}">
-        <p14:creationId xmlns:p14="http://schemas.microsoft.com/office/powerpoint/2010/main" val="875614182"/>
+        <p14:creationId xmlns:p14="http://schemas.microsoft.com/office/powerpoint/2010/main" val="2867127433"/>
       </p:ext>
     </p:extLst>
   </p:cSld>
@@ -934,7 +926,7 @@
           <a:p>
             <a:fld id="{3FFC207A-36A1-3243-A33F-1510AFB24BC1}" type="slidenum">
               <a:rPr lang="en-US" smtClean="0"/>
-              <a:t>41</a:t>
+              <a:t>33</a:t>
             </a:fld>
             <a:endParaRPr lang="en-US"/>
           </a:p>
@@ -943,7 +935,7 @@
     </p:spTree>
     <p:extLst>
       <p:ext uri="{BB962C8B-B14F-4D97-AF65-F5344CB8AC3E}">
-        <p14:creationId xmlns:p14="http://schemas.microsoft.com/office/powerpoint/2010/main" val="1967646473"/>
+        <p14:creationId xmlns:p14="http://schemas.microsoft.com/office/powerpoint/2010/main" val="875614182"/>
       </p:ext>
     </p:extLst>
   </p:cSld>
@@ -1082,7 +1074,7 @@
           <a:p>
             <a:fld id="{7D5693D1-C5E8-7D40-8B0E-476CF8AD55E4}" type="datetimeFigureOut">
               <a:rPr lang="en-US" smtClean="0"/>
-              <a:t>2/19/19</a:t>
+              <a:t>2/18/20</a:t>
             </a:fld>
             <a:endParaRPr lang="en-US"/>
           </a:p>
@@ -1250,7 +1242,7 @@
           <a:p>
             <a:fld id="{7D5693D1-C5E8-7D40-8B0E-476CF8AD55E4}" type="datetimeFigureOut">
               <a:rPr lang="en-US" smtClean="0"/>
-              <a:t>2/19/19</a:t>
+              <a:t>2/18/20</a:t>
             </a:fld>
             <a:endParaRPr lang="en-US"/>
           </a:p>
@@ -1428,7 +1420,7 @@
           <a:p>
             <a:fld id="{7D5693D1-C5E8-7D40-8B0E-476CF8AD55E4}" type="datetimeFigureOut">
               <a:rPr lang="en-US" smtClean="0"/>
-              <a:t>2/19/19</a:t>
+              <a:t>2/18/20</a:t>
             </a:fld>
             <a:endParaRPr lang="en-US"/>
           </a:p>
@@ -1596,7 +1588,7 @@
           <a:p>
             <a:fld id="{7D5693D1-C5E8-7D40-8B0E-476CF8AD55E4}" type="datetimeFigureOut">
               <a:rPr lang="en-US" smtClean="0"/>
-              <a:t>2/19/19</a:t>
+              <a:t>2/18/20</a:t>
             </a:fld>
             <a:endParaRPr lang="en-US"/>
           </a:p>
@@ -1841,7 +1833,7 @@
           <a:p>
             <a:fld id="{7D5693D1-C5E8-7D40-8B0E-476CF8AD55E4}" type="datetimeFigureOut">
               <a:rPr lang="en-US" smtClean="0"/>
-              <a:t>2/19/19</a:t>
+              <a:t>2/18/20</a:t>
             </a:fld>
             <a:endParaRPr lang="en-US"/>
           </a:p>
@@ -2070,7 +2062,7 @@
           <a:p>
             <a:fld id="{7D5693D1-C5E8-7D40-8B0E-476CF8AD55E4}" type="datetimeFigureOut">
               <a:rPr lang="en-US" smtClean="0"/>
-              <a:t>2/19/19</a:t>
+              <a:t>2/18/20</a:t>
             </a:fld>
             <a:endParaRPr lang="en-US"/>
           </a:p>
@@ -2434,7 +2426,7 @@
           <a:p>
             <a:fld id="{7D5693D1-C5E8-7D40-8B0E-476CF8AD55E4}" type="datetimeFigureOut">
               <a:rPr lang="en-US" smtClean="0"/>
-              <a:t>2/19/19</a:t>
+              <a:t>2/18/20</a:t>
             </a:fld>
             <a:endParaRPr lang="en-US"/>
           </a:p>
@@ -2551,7 +2543,7 @@
           <a:p>
             <a:fld id="{7D5693D1-C5E8-7D40-8B0E-476CF8AD55E4}" type="datetimeFigureOut">
               <a:rPr lang="en-US" smtClean="0"/>
-              <a:t>2/19/19</a:t>
+              <a:t>2/18/20</a:t>
             </a:fld>
             <a:endParaRPr lang="en-US"/>
           </a:p>
@@ -2646,7 +2638,7 @@
           <a:p>
             <a:fld id="{7D5693D1-C5E8-7D40-8B0E-476CF8AD55E4}" type="datetimeFigureOut">
               <a:rPr lang="en-US" smtClean="0"/>
-              <a:t>2/19/19</a:t>
+              <a:t>2/18/20</a:t>
             </a:fld>
             <a:endParaRPr lang="en-US"/>
           </a:p>
@@ -2921,7 +2913,7 @@
           <a:p>
             <a:fld id="{7D5693D1-C5E8-7D40-8B0E-476CF8AD55E4}" type="datetimeFigureOut">
               <a:rPr lang="en-US" smtClean="0"/>
-              <a:t>2/19/19</a:t>
+              <a:t>2/18/20</a:t>
             </a:fld>
             <a:endParaRPr lang="en-US"/>
           </a:p>
@@ -3173,7 +3165,7 @@
           <a:p>
             <a:fld id="{7D5693D1-C5E8-7D40-8B0E-476CF8AD55E4}" type="datetimeFigureOut">
               <a:rPr lang="en-US" smtClean="0"/>
-              <a:t>2/19/19</a:t>
+              <a:t>2/18/20</a:t>
             </a:fld>
             <a:endParaRPr lang="en-US"/>
           </a:p>
@@ -3384,7 +3376,7 @@
           <a:p>
             <a:fld id="{7D5693D1-C5E8-7D40-8B0E-476CF8AD55E4}" type="datetimeFigureOut">
               <a:rPr lang="en-US" smtClean="0"/>
-              <a:t>2/19/19</a:t>
+              <a:t>2/18/20</a:t>
             </a:fld>
             <a:endParaRPr lang="en-US"/>
           </a:p>
@@ -3927,7 +3919,7 @@
           <a:p>
             <a:r>
               <a:rPr lang="en-US" dirty="0"/>
-              <a:t>loops are tricky to write, but very handy for doing, usually a function, that you want to apply to every row in your data set, doing simulations, or doing permutations</a:t>
+              <a:t>loops are tricky to write, but very handy for doing things, usually a function, that you want to apply to every row in your data set, doing simulations, or doing permutations</a:t>
             </a:r>
           </a:p>
           <a:p>
@@ -4720,7 +4712,7 @@
           <a:p>
             <a:r>
               <a:rPr lang="en-US" dirty="0"/>
-              <a:t>T-test (two-sample, one-sample, paired)</a:t>
+              <a:t>A little more about permutations</a:t>
             </a:r>
           </a:p>
         </p:txBody>
@@ -4737,21 +4729,27 @@
         </p:nvSpPr>
         <p:spPr/>
         <p:txBody>
-          <a:bodyPr>
-            <a:normAutofit fontScale="85000" lnSpcReduction="20000"/>
-          </a:bodyPr>
-          <a:lstStyle/>
-          <a:p>
-            <a:r>
-              <a:rPr lang="en-US" dirty="0"/>
-              <a:t>Two-sample: Used to ask if two means are significantly different</a:t>
+          <a:bodyPr/>
+          <a:lstStyle/>
+          <a:p>
+            <a:r>
+              <a:rPr lang="en-US" dirty="0"/>
+              <a:t>There are packages for doing permutations </a:t>
+            </a:r>
+            <a:r>
+              <a:rPr lang="mr-IN" dirty="0"/>
+              <a:t>–</a:t>
+            </a:r>
+            <a:r>
+              <a:rPr lang="en-US" dirty="0"/>
+              <a:t> coin is one</a:t>
             </a:r>
           </a:p>
           <a:p>
             <a:pPr lvl="1"/>
             <a:r>
               <a:rPr lang="en-US" dirty="0"/>
-              <a:t>Often called a Student’s t-test, unpaired t-test, or independent samples t-test</a:t>
+              <a:t>This package is very powerful (and a bit complicated)</a:t>
             </a:r>
           </a:p>
           <a:p>
@@ -4761,51 +4759,70 @@
           <a:p>
             <a:r>
               <a:rPr lang="en-US" dirty="0"/>
-              <a:t>One-sample: Used to ask if one thing is significantly different from some value (e.g. confidence intervals)</a:t>
-            </a:r>
-          </a:p>
-          <a:p>
+              <a:t>They will ask you to choose a type of p-value </a:t>
+            </a:r>
+          </a:p>
+          <a:p>
+            <a:r>
+              <a:rPr lang="en-US" b="1" dirty="0" err="1"/>
+              <a:t>oneway_test</a:t>
+            </a:r>
+            <a:r>
+              <a:rPr lang="en-US" dirty="0"/>
+              <a:t>(</a:t>
+            </a:r>
+            <a:r>
+              <a:rPr lang="en-US" dirty="0" err="1"/>
+              <a:t>colonies~place,data</a:t>
+            </a:r>
+            <a:r>
+              <a:rPr lang="en-US" dirty="0"/>
+              <a:t>=</a:t>
+            </a:r>
+            <a:r>
+              <a:rPr lang="en-US" dirty="0" err="1"/>
+              <a:t>ants,distribution</a:t>
+            </a:r>
+            <a:r>
+              <a:rPr lang="en-US" dirty="0"/>
+              <a:t>=</a:t>
+            </a:r>
+            <a:r>
+              <a:rPr lang="en-US" b="1" dirty="0"/>
+              <a:t>approximate</a:t>
+            </a:r>
+            <a:r>
+              <a:rPr lang="en-US" dirty="0"/>
+              <a:t>(B=9999))</a:t>
+            </a:r>
+          </a:p>
+          <a:p>
+            <a:pPr lvl="1"/>
+            <a:r>
+              <a:rPr lang="en-US" dirty="0"/>
+              <a:t>This should be equivalent to our simulation method</a:t>
+            </a:r>
+          </a:p>
+          <a:p>
+            <a:pPr lvl="1"/>
+            <a:r>
+              <a:rPr lang="en-US" dirty="0"/>
+              <a:t>My opinion: Brute force methods (e.g. writing a loop) still provide a more explicit way to do permutations</a:t>
+            </a:r>
+            <a:br>
+              <a:rPr lang="en-US" dirty="0"/>
+            </a:br>
             <a:endParaRPr lang="en-US" dirty="0"/>
           </a:p>
           <a:p>
-            <a:r>
-              <a:rPr lang="en-US" dirty="0"/>
-              <a:t>Paired: Used to ask if two samples from the same “unit” (e.g. plot, person, site) are significantly different</a:t>
-            </a:r>
-          </a:p>
-          <a:p>
-            <a:pPr lvl="1"/>
-            <a:r>
-              <a:rPr lang="en-US" dirty="0"/>
-              <a:t>E.g. Was bat infection on more or less after our treatment?</a:t>
-            </a:r>
-          </a:p>
-          <a:p>
-            <a:pPr lvl="1"/>
-            <a:r>
-              <a:rPr lang="en-US" dirty="0"/>
-              <a:t>The unit could be an individual bat, (e.g. Susie before treatment or Susie after treatment) OR the unit could be prevalence of infection at a site (e.g. Bear Cave before and after treatment)</a:t>
-            </a:r>
-          </a:p>
-          <a:p>
-            <a:pPr lvl="1"/>
-            <a:r>
-              <a:rPr lang="en-US" dirty="0"/>
-              <a:t>The many units would then be 15 bats measured before and after treatment, or 15 caves measured before and after treatment</a:t>
-            </a:r>
-          </a:p>
-          <a:p>
-            <a:r>
-              <a:rPr lang="en-US" dirty="0"/>
-              <a:t>To use a T-test, each of the two populations should follow a normal distribution</a:t>
-            </a:r>
+            <a:endParaRPr lang="en-US" dirty="0"/>
           </a:p>
         </p:txBody>
       </p:sp>
     </p:spTree>
     <p:extLst>
       <p:ext uri="{BB962C8B-B14F-4D97-AF65-F5344CB8AC3E}">
-        <p14:creationId xmlns:p14="http://schemas.microsoft.com/office/powerpoint/2010/main" val="1227985366"/>
+        <p14:creationId xmlns:p14="http://schemas.microsoft.com/office/powerpoint/2010/main" val="811180735"/>
       </p:ext>
     </p:extLst>
   </p:cSld>
@@ -4849,7 +4866,7 @@
           <a:p>
             <a:r>
               <a:rPr lang="en-US" dirty="0"/>
-              <a:t>T-test variance</a:t>
+              <a:t>Permutation Summary</a:t>
             </a:r>
           </a:p>
         </p:txBody>
@@ -4866,12 +4883,38 @@
         </p:nvSpPr>
         <p:spPr/>
         <p:txBody>
-          <a:bodyPr/>
-          <a:lstStyle/>
-          <a:p>
-            <a:r>
-              <a:rPr lang="en-US" dirty="0"/>
-              <a:t>A slightly silly nuance is that a classical student’s t-test assumes variances are also equal</a:t>
+          <a:bodyPr>
+            <a:normAutofit fontScale="92500" lnSpcReduction="20000"/>
+          </a:bodyPr>
+          <a:lstStyle/>
+          <a:p>
+            <a:r>
+              <a:rPr lang="en-US" dirty="0"/>
+              <a:t>Advantages</a:t>
+            </a:r>
+          </a:p>
+          <a:p>
+            <a:r>
+              <a:rPr lang="en-US" dirty="0"/>
+              <a:t>General applicability</a:t>
+            </a:r>
+          </a:p>
+          <a:p>
+            <a:r>
+              <a:rPr lang="en-US" dirty="0"/>
+              <a:t>Conceptual clarity</a:t>
+            </a:r>
+          </a:p>
+          <a:p>
+            <a:r>
+              <a:rPr lang="en-US" dirty="0"/>
+              <a:t>Flexibility</a:t>
+            </a:r>
+          </a:p>
+          <a:p>
+            <a:r>
+              <a:rPr lang="en-US" dirty="0"/>
+              <a:t>Fewer assumptions</a:t>
             </a:r>
           </a:p>
           <a:p>
@@ -4880,15 +4923,36 @@
           <a:p>
             <a:r>
               <a:rPr lang="en-US" dirty="0"/>
-              <a:t>If you don’t want to add that assumption, you are technically doing Welch’s t-test (and this is the default in R)</a:t>
-            </a:r>
+              <a:t>Disadvantages</a:t>
+            </a:r>
+          </a:p>
+          <a:p>
+            <a:r>
+              <a:rPr lang="en-US" dirty="0"/>
+              <a:t>Hard to implement</a:t>
+            </a:r>
+          </a:p>
+          <a:p>
+            <a:r>
+              <a:rPr lang="en-US" dirty="0"/>
+              <a:t>May take a lot of computer time</a:t>
+            </a:r>
+          </a:p>
+          <a:p>
+            <a:r>
+              <a:rPr lang="en-US" dirty="0"/>
+              <a:t>May be hard to obtain confidence intervals without distributional assumptions</a:t>
+            </a:r>
+          </a:p>
+          <a:p>
+            <a:endParaRPr lang="en-US" dirty="0"/>
           </a:p>
         </p:txBody>
       </p:sp>
     </p:spTree>
     <p:extLst>
       <p:ext uri="{BB962C8B-B14F-4D97-AF65-F5344CB8AC3E}">
-        <p14:creationId xmlns:p14="http://schemas.microsoft.com/office/powerpoint/2010/main" val="726402733"/>
+        <p14:creationId xmlns:p14="http://schemas.microsoft.com/office/powerpoint/2010/main" val="1856310743"/>
       </p:ext>
     </p:extLst>
   </p:cSld>
@@ -4917,7 +4981,13 @@
       </p:grpSpPr>
       <p:sp>
         <p:nvSpPr>
-          <p:cNvPr id="2" name="Title 1"/>
+          <p:cNvPr id="2" name="Title 1">
+            <a:extLst>
+              <a:ext uri="{FF2B5EF4-FFF2-40B4-BE49-F238E27FC236}">
+                <a16:creationId xmlns:a16="http://schemas.microsoft.com/office/drawing/2014/main" id="{59A3B0B6-FF46-2248-87C1-42576F4061CB}"/>
+              </a:ext>
+            </a:extLst>
+          </p:cNvPr>
           <p:cNvSpPr>
             <a:spLocks noGrp="1"/>
           </p:cNvSpPr>
@@ -4932,22 +5002,20 @@
           <a:p>
             <a:r>
               <a:rPr lang="en-US" dirty="0"/>
-              <a:t>Go to R</a:t>
-            </a:r>
-            <a:r>
-              <a:rPr lang="mr-IN" dirty="0"/>
-              <a:t>…</a:t>
-            </a:r>
-            <a:r>
-              <a:rPr lang="en-US" dirty="0"/>
-              <a:t>.t-tests</a:t>
-            </a:r>
-          </a:p>
-        </p:txBody>
-      </p:sp>
-      <p:sp>
-        <p:nvSpPr>
-          <p:cNvPr id="3" name="Content Placeholder 2"/>
+              <a:t>“Classical” tests</a:t>
+            </a:r>
+          </a:p>
+        </p:txBody>
+      </p:sp>
+      <p:sp>
+        <p:nvSpPr>
+          <p:cNvPr id="3" name="Content Placeholder 2">
+            <a:extLst>
+              <a:ext uri="{FF2B5EF4-FFF2-40B4-BE49-F238E27FC236}">
+                <a16:creationId xmlns:a16="http://schemas.microsoft.com/office/drawing/2014/main" id="{0F57B95E-DFBD-A64E-A691-6375B64E9341}"/>
+              </a:ext>
+            </a:extLst>
+          </p:cNvPr>
           <p:cNvSpPr>
             <a:spLocks noGrp="1"/>
           </p:cNvSpPr>
@@ -4960,14 +5028,34 @@
           <a:bodyPr/>
           <a:lstStyle/>
           <a:p>
-            <a:endParaRPr lang="en-US"/>
+            <a:r>
+              <a:rPr lang="en-US" dirty="0"/>
+              <a:t>There are lots of pre-packaged tests implemented in R</a:t>
+            </a:r>
+          </a:p>
+          <a:p>
+            <a:endParaRPr lang="en-US" dirty="0"/>
+          </a:p>
+          <a:p>
+            <a:r>
+              <a:rPr lang="en-US" dirty="0"/>
+              <a:t>We’ll talk about some of the commonly used ones and leave the rest for you to review on your own in the </a:t>
+            </a:r>
+            <a:r>
+              <a:rPr lang="en-US" dirty="0" err="1"/>
+              <a:t>powerpoint</a:t>
+            </a:r>
+            <a:r>
+              <a:rPr lang="en-US" dirty="0"/>
+              <a:t> slides</a:t>
+            </a:r>
           </a:p>
         </p:txBody>
       </p:sp>
     </p:spTree>
     <p:extLst>
       <p:ext uri="{BB962C8B-B14F-4D97-AF65-F5344CB8AC3E}">
-        <p14:creationId xmlns:p14="http://schemas.microsoft.com/office/powerpoint/2010/main" val="175530512"/>
+        <p14:creationId xmlns:p14="http://schemas.microsoft.com/office/powerpoint/2010/main" val="3544176793"/>
       </p:ext>
     </p:extLst>
   </p:cSld>
@@ -5088,13 +5176,7 @@
       </p:grpSpPr>
       <p:sp>
         <p:nvSpPr>
-          <p:cNvPr id="2" name="Title 1">
-            <a:extLst>
-              <a:ext uri="{FF2B5EF4-FFF2-40B4-BE49-F238E27FC236}">
-                <a16:creationId xmlns:a16="http://schemas.microsoft.com/office/drawing/2014/main" id="{C99ACE75-AB15-2C43-A627-4AF77E76C00C}"/>
-              </a:ext>
-            </a:extLst>
-          </p:cNvPr>
+          <p:cNvPr id="2" name="Title 1"/>
           <p:cNvSpPr>
             <a:spLocks noGrp="1"/>
           </p:cNvSpPr>
@@ -5107,19 +5189,16 @@
           <a:bodyPr/>
           <a:lstStyle/>
           <a:p>
-            <a:endParaRPr lang="en-US"/>
-          </a:p>
-        </p:txBody>
-      </p:sp>
-      <p:sp>
-        <p:nvSpPr>
-          <p:cNvPr id="3" name="Content Placeholder 2">
-            <a:extLst>
-              <a:ext uri="{FF2B5EF4-FFF2-40B4-BE49-F238E27FC236}">
-                <a16:creationId xmlns:a16="http://schemas.microsoft.com/office/drawing/2014/main" id="{A13D8A58-9F50-FE4E-8A52-32048EACDE2D}"/>
-              </a:ext>
-            </a:extLst>
-          </p:cNvPr>
+            <a:r>
+              <a:rPr lang="en-US" dirty="0"/>
+              <a:t>T-test (two-sample, one-sample, paired)</a:t>
+            </a:r>
+          </a:p>
+        </p:txBody>
+      </p:sp>
+      <p:sp>
+        <p:nvSpPr>
+          <p:cNvPr id="3" name="Content Placeholder 2"/>
           <p:cNvSpPr>
             <a:spLocks noGrp="1"/>
           </p:cNvSpPr>
@@ -5129,12 +5208,67 @@
         </p:nvSpPr>
         <p:spPr/>
         <p:txBody>
-          <a:bodyPr/>
-          <a:lstStyle/>
-          <a:p>
-            <a:r>
-              <a:rPr lang="en-US" dirty="0"/>
-              <a:t>STOPPED HERE!!</a:t>
+          <a:bodyPr>
+            <a:normAutofit fontScale="85000" lnSpcReduction="20000"/>
+          </a:bodyPr>
+          <a:lstStyle/>
+          <a:p>
+            <a:r>
+              <a:rPr lang="en-US" dirty="0"/>
+              <a:t>Two-sample: Used to ask if two means are significantly different</a:t>
+            </a:r>
+          </a:p>
+          <a:p>
+            <a:pPr lvl="1"/>
+            <a:r>
+              <a:rPr lang="en-US" dirty="0"/>
+              <a:t>Often called a Student’s t-test, unpaired t-test, or independent samples t-test</a:t>
+            </a:r>
+          </a:p>
+          <a:p>
+            <a:pPr lvl="1"/>
+            <a:endParaRPr lang="en-US" dirty="0"/>
+          </a:p>
+          <a:p>
+            <a:r>
+              <a:rPr lang="en-US" dirty="0"/>
+              <a:t>One-sample: Used to ask if one thing is significantly different from some value (e.g. confidence intervals)</a:t>
+            </a:r>
+          </a:p>
+          <a:p>
+            <a:endParaRPr lang="en-US" dirty="0"/>
+          </a:p>
+          <a:p>
+            <a:r>
+              <a:rPr lang="en-US" dirty="0"/>
+              <a:t>Paired: Used to ask if two samples from the same “unit” (e.g. plot, person, site) are significantly different</a:t>
+            </a:r>
+          </a:p>
+          <a:p>
+            <a:pPr lvl="1"/>
+            <a:r>
+              <a:rPr lang="en-US" dirty="0"/>
+              <a:t>E.g. Was bat infection on more or less after our treatment?</a:t>
+            </a:r>
+          </a:p>
+          <a:p>
+            <a:pPr lvl="1"/>
+            <a:r>
+              <a:rPr lang="en-US" dirty="0"/>
+              <a:t>The unit could be an individual bat, (e.g. Susie before treatment or Susie after treatment) OR the unit could be prevalence of infection at a site (e.g. Bear Cave before and after treatment)</a:t>
+            </a:r>
+          </a:p>
+          <a:p>
+            <a:pPr lvl="1"/>
+            <a:r>
+              <a:rPr lang="en-US" dirty="0"/>
+              <a:t>The many units would then be 15 bats measured before and after treatment, or 15 caves measured before and after treatment</a:t>
+            </a:r>
+          </a:p>
+          <a:p>
+            <a:r>
+              <a:rPr lang="en-US" dirty="0"/>
+              <a:t>To use a T-test, each of the two populations should follow a normal distribution</a:t>
             </a:r>
           </a:p>
         </p:txBody>
@@ -5142,7 +5276,7 @@
     </p:spTree>
     <p:extLst>
       <p:ext uri="{BB962C8B-B14F-4D97-AF65-F5344CB8AC3E}">
-        <p14:creationId xmlns:p14="http://schemas.microsoft.com/office/powerpoint/2010/main" val="2496664721"/>
+        <p14:creationId xmlns:p14="http://schemas.microsoft.com/office/powerpoint/2010/main" val="1227985366"/>
       </p:ext>
     </p:extLst>
   </p:cSld>
@@ -5186,7 +5320,7 @@
           <a:p>
             <a:r>
               <a:rPr lang="en-US" dirty="0"/>
-              <a:t>T-tests are powerful</a:t>
+              <a:t>T-test variance</a:t>
             </a:r>
           </a:p>
         </p:txBody>
@@ -5208,14 +5342,7 @@
           <a:p>
             <a:r>
               <a:rPr lang="en-US" dirty="0"/>
-              <a:t>T-tests can be very powerful, paired t-tests can be more powerful than unpaired</a:t>
-            </a:r>
-          </a:p>
-          <a:p>
-            <a:pPr lvl="1"/>
-            <a:r>
-              <a:rPr lang="en-US" i="1" dirty="0"/>
-              <a:t>Try changing the amount you adding or subtracting to each forest value, and then running the paired and unpaired tests. What do you find?</a:t>
+              <a:t>A slightly silly nuance is that a classical student’s t-test assumes variances are also equal</a:t>
             </a:r>
           </a:p>
           <a:p>
@@ -5224,16 +5351,7 @@
           <a:p>
             <a:r>
               <a:rPr lang="en-US" dirty="0"/>
-              <a:t>We can see that our p-values for a t-test are more powerful than if we did a permutation</a:t>
-            </a:r>
-          </a:p>
-          <a:p>
-            <a:endParaRPr lang="en-US" dirty="0"/>
-          </a:p>
-          <a:p>
-            <a:r>
-              <a:rPr lang="en-US" dirty="0"/>
-              <a:t>But what about the assumptions?</a:t>
+              <a:t>If you don’t want to add that assumption, you are technically doing Welch’s t-test (and this is the default in R)</a:t>
             </a:r>
           </a:p>
         </p:txBody>
@@ -5241,7 +5359,7 @@
     </p:spTree>
     <p:extLst>
       <p:ext uri="{BB962C8B-B14F-4D97-AF65-F5344CB8AC3E}">
-        <p14:creationId xmlns:p14="http://schemas.microsoft.com/office/powerpoint/2010/main" val="650816266"/>
+        <p14:creationId xmlns:p14="http://schemas.microsoft.com/office/powerpoint/2010/main" val="726402733"/>
       </p:ext>
     </p:extLst>
   </p:cSld>
@@ -5283,10 +5401,17 @@
           <a:bodyPr/>
           <a:lstStyle/>
           <a:p>
-            <a:pPr algn="ctr"/>
-            <a:r>
-              <a:rPr lang="en-US" dirty="0"/>
-              <a:t>How do I know if my data is normally distributed?</a:t>
+            <a:r>
+              <a:rPr lang="en-US" dirty="0"/>
+              <a:t>Go to R</a:t>
+            </a:r>
+            <a:r>
+              <a:rPr lang="mr-IN" dirty="0"/>
+              <a:t>…</a:t>
+            </a:r>
+            <a:r>
+              <a:rPr lang="en-US" dirty="0"/>
+              <a:t>.t-tests</a:t>
             </a:r>
           </a:p>
         </p:txBody>
@@ -5303,41 +5428,17 @@
         </p:nvSpPr>
         <p:spPr/>
         <p:txBody>
-          <a:bodyPr>
-            <a:normAutofit/>
-          </a:bodyPr>
-          <a:lstStyle/>
-          <a:p>
-            <a:r>
-              <a:rPr lang="en-US" sz="3600" dirty="0"/>
-              <a:t>There are more tests!</a:t>
-            </a:r>
-          </a:p>
-          <a:p>
-            <a:endParaRPr lang="en-US" sz="3600" dirty="0"/>
-          </a:p>
-          <a:p>
-            <a:r>
-              <a:rPr lang="en-US" sz="3600" dirty="0"/>
-              <a:t>We will cover these in more details for linear models because there are nuances</a:t>
-            </a:r>
-          </a:p>
-          <a:p>
-            <a:pPr lvl="1"/>
-            <a:r>
-              <a:rPr lang="en-US" sz="3600" dirty="0"/>
-              <a:t>these nuances primarily deal with something called the residuals</a:t>
-            </a:r>
-          </a:p>
-          <a:p>
-            <a:endParaRPr lang="en-US" sz="3600" dirty="0"/>
+          <a:bodyPr/>
+          <a:lstStyle/>
+          <a:p>
+            <a:endParaRPr lang="en-US"/>
           </a:p>
         </p:txBody>
       </p:sp>
     </p:spTree>
     <p:extLst>
       <p:ext uri="{BB962C8B-B14F-4D97-AF65-F5344CB8AC3E}">
-        <p14:creationId xmlns:p14="http://schemas.microsoft.com/office/powerpoint/2010/main" val="338309575"/>
+        <p14:creationId xmlns:p14="http://schemas.microsoft.com/office/powerpoint/2010/main" val="175530512"/>
       </p:ext>
     </p:extLst>
   </p:cSld>
@@ -5381,7 +5482,7 @@
           <a:p>
             <a:r>
               <a:rPr lang="en-US" dirty="0"/>
-              <a:t>Shapiro-Wilk Test</a:t>
+              <a:t>T-tests are powerful</a:t>
             </a:r>
           </a:p>
         </p:txBody>
@@ -5398,50 +5499,37 @@
         </p:nvSpPr>
         <p:spPr/>
         <p:txBody>
-          <a:bodyPr>
-            <a:normAutofit fontScale="47500" lnSpcReduction="20000"/>
-          </a:bodyPr>
-          <a:lstStyle/>
-          <a:p>
-            <a:r>
-              <a:rPr lang="en-US" sz="5100" dirty="0"/>
-              <a:t>A test of normality  (for data or residuals)</a:t>
-            </a:r>
-          </a:p>
-          <a:p>
-            <a:endParaRPr lang="en-US" sz="5100" dirty="0"/>
-          </a:p>
-          <a:p>
-            <a:r>
-              <a:rPr lang="en-US" sz="5100" dirty="0"/>
-              <a:t>Tests the null hypothesis that a sample (e.g. your data) came from a normally distributed population</a:t>
-            </a:r>
-          </a:p>
-          <a:p>
-            <a:endParaRPr lang="en-US" sz="5100" dirty="0"/>
-          </a:p>
-          <a:p>
-            <a:r>
-              <a:rPr lang="en-US" sz="5100" i="1" u="sng" dirty="0"/>
-              <a:t>The null hypothesis is that the data are normally distributed</a:t>
-            </a:r>
-          </a:p>
-          <a:p>
-            <a:endParaRPr lang="en-US" sz="5100" i="1" dirty="0"/>
-          </a:p>
-          <a:p>
-            <a:r>
-              <a:rPr lang="en-US" sz="5100" dirty="0"/>
-              <a:t>A P-value &lt; 0.05 indicates that data are not normally distributed</a:t>
-            </a:r>
-          </a:p>
-          <a:p>
-            <a:endParaRPr lang="en-US" sz="5100" dirty="0"/>
-          </a:p>
-          <a:p>
-            <a:r>
-              <a:rPr lang="en-US" sz="5100" dirty="0"/>
-              <a:t>Some others that are less powerful: Anderson-Darling, Kolmogorov-Smirnov, Lilliefors (Go to R..)</a:t>
+          <a:bodyPr/>
+          <a:lstStyle/>
+          <a:p>
+            <a:r>
+              <a:rPr lang="en-US" dirty="0"/>
+              <a:t>T-tests can be very powerful, paired t-tests can be more powerful than unpaired</a:t>
+            </a:r>
+          </a:p>
+          <a:p>
+            <a:pPr lvl="1"/>
+            <a:r>
+              <a:rPr lang="en-US" i="1" dirty="0"/>
+              <a:t>Try changing the amount you adding or subtracting to each forest value, and then running the paired and unpaired tests. What do you find?</a:t>
+            </a:r>
+          </a:p>
+          <a:p>
+            <a:endParaRPr lang="en-US" dirty="0"/>
+          </a:p>
+          <a:p>
+            <a:r>
+              <a:rPr lang="en-US" dirty="0"/>
+              <a:t>We can see that our p-values for a t-test are more powerful than if we did a permutation</a:t>
+            </a:r>
+          </a:p>
+          <a:p>
+            <a:endParaRPr lang="en-US" dirty="0"/>
+          </a:p>
+          <a:p>
+            <a:r>
+              <a:rPr lang="en-US" dirty="0"/>
+              <a:t>But what about the assumptions?</a:t>
             </a:r>
           </a:p>
         </p:txBody>
@@ -5449,7 +5537,7 @@
     </p:spTree>
     <p:extLst>
       <p:ext uri="{BB962C8B-B14F-4D97-AF65-F5344CB8AC3E}">
-        <p14:creationId xmlns:p14="http://schemas.microsoft.com/office/powerpoint/2010/main" val="597949227"/>
+        <p14:creationId xmlns:p14="http://schemas.microsoft.com/office/powerpoint/2010/main" val="650816266"/>
       </p:ext>
     </p:extLst>
   </p:cSld>
@@ -5491,9 +5579,10 @@
           <a:bodyPr/>
           <a:lstStyle/>
           <a:p>
-            <a:r>
-              <a:rPr lang="en-US" dirty="0"/>
-              <a:t>More complicated permutation questions</a:t>
+            <a:pPr algn="ctr"/>
+            <a:r>
+              <a:rPr lang="en-US" dirty="0"/>
+              <a:t>How do I know if my data is normally distributed?</a:t>
             </a:r>
           </a:p>
         </p:txBody>
@@ -5510,45 +5599,41 @@
         </p:nvSpPr>
         <p:spPr/>
         <p:txBody>
-          <a:bodyPr/>
-          <a:lstStyle/>
-          <a:p>
-            <a:r>
-              <a:rPr lang="en-US" dirty="0"/>
-              <a:t>Ant colony distributions - Within each habitat, we can ask whether there is evidence that ant nests are aggregated, or distributed regularly?</a:t>
+          <a:bodyPr>
+            <a:normAutofit/>
+          </a:bodyPr>
+          <a:lstStyle/>
+          <a:p>
+            <a:r>
+              <a:rPr lang="en-US" sz="3600" dirty="0"/>
+              <a:t>There are more tests!</a:t>
+            </a:r>
+          </a:p>
+          <a:p>
+            <a:endParaRPr lang="en-US" sz="3600" dirty="0"/>
+          </a:p>
+          <a:p>
+            <a:r>
+              <a:rPr lang="en-US" sz="3600" dirty="0"/>
+              <a:t>We will cover these in more details for linear models because there are nuances</a:t>
             </a:r>
           </a:p>
           <a:p>
             <a:pPr lvl="1"/>
             <a:r>
-              <a:rPr lang="en-US" dirty="0"/>
-              <a:t>In other words, do they cluster, or avoid each other? Or can’t we tell?</a:t>
-            </a:r>
-          </a:p>
-          <a:p>
-            <a:pPr lvl="1"/>
-            <a:endParaRPr lang="en-US" dirty="0"/>
-          </a:p>
-          <a:p>
-            <a:pPr lvl="1"/>
-            <a:endParaRPr lang="en-US" dirty="0"/>
-          </a:p>
-          <a:p>
-            <a:r>
-              <a:rPr lang="en-US" dirty="0"/>
-              <a:t>A permutation approach would test this by assigning nests randomly to plots at different distances to generate a null distribution</a:t>
-            </a:r>
-            <a:br>
-              <a:rPr lang="en-US" dirty="0"/>
-            </a:br>
-            <a:endParaRPr lang="en-US" dirty="0"/>
+              <a:rPr lang="en-US" sz="3600" dirty="0"/>
+              <a:t>these nuances primarily deal with something called the residuals</a:t>
+            </a:r>
+          </a:p>
+          <a:p>
+            <a:endParaRPr lang="en-US" sz="3600" dirty="0"/>
           </a:p>
         </p:txBody>
       </p:sp>
     </p:spTree>
     <p:extLst>
       <p:ext uri="{BB962C8B-B14F-4D97-AF65-F5344CB8AC3E}">
-        <p14:creationId xmlns:p14="http://schemas.microsoft.com/office/powerpoint/2010/main" val="1200410834"/>
+        <p14:creationId xmlns:p14="http://schemas.microsoft.com/office/powerpoint/2010/main" val="338309575"/>
       </p:ext>
     </p:extLst>
   </p:cSld>
@@ -5592,7 +5677,7 @@
           <a:p>
             <a:r>
               <a:rPr lang="en-US" dirty="0"/>
-              <a:t>Pond nutrients</a:t>
+              <a:t>Shapiro-Wilk Test</a:t>
             </a:r>
           </a:p>
         </p:txBody>
@@ -5609,32 +5694,58 @@
         </p:nvSpPr>
         <p:spPr/>
         <p:txBody>
-          <a:bodyPr/>
-          <a:lstStyle/>
-          <a:p>
-            <a:r>
-              <a:rPr lang="en-US" dirty="0"/>
-              <a:t>We measure correlations between a species of algae and nitrogen and phosphorous levels in natural ponds. Thus, we have a data frame showing N, P and A (for algae).</a:t>
-            </a:r>
-          </a:p>
-          <a:p>
-            <a:endParaRPr lang="en-US" dirty="0"/>
-          </a:p>
-          <a:p>
-            <a:r>
-              <a:rPr lang="en-US" dirty="0"/>
-              <a:t>What kinds of tests could we do to see whether the algae are correlated with nutrient levels?</a:t>
-            </a:r>
-          </a:p>
-          <a:p>
-            <a:endParaRPr lang="en-US" dirty="0"/>
+          <a:bodyPr>
+            <a:normAutofit fontScale="47500" lnSpcReduction="20000"/>
+          </a:bodyPr>
+          <a:lstStyle/>
+          <a:p>
+            <a:r>
+              <a:rPr lang="en-US" sz="5100" dirty="0"/>
+              <a:t>A test of normality  (for data or residuals)</a:t>
+            </a:r>
+          </a:p>
+          <a:p>
+            <a:endParaRPr lang="en-US" sz="5100" dirty="0"/>
+          </a:p>
+          <a:p>
+            <a:r>
+              <a:rPr lang="en-US" sz="5100" dirty="0"/>
+              <a:t>Tests the null hypothesis that a sample (e.g. your data) came from a normally distributed population</a:t>
+            </a:r>
+          </a:p>
+          <a:p>
+            <a:endParaRPr lang="en-US" sz="5100" dirty="0"/>
+          </a:p>
+          <a:p>
+            <a:r>
+              <a:rPr lang="en-US" sz="5100" i="1" u="sng" dirty="0"/>
+              <a:t>The null hypothesis is that the data are normally distributed</a:t>
+            </a:r>
+          </a:p>
+          <a:p>
+            <a:endParaRPr lang="en-US" sz="5100" i="1" dirty="0"/>
+          </a:p>
+          <a:p>
+            <a:r>
+              <a:rPr lang="en-US" sz="5100" dirty="0"/>
+              <a:t>A P-value &lt; 0.05 indicates that data are not normally distributed</a:t>
+            </a:r>
+          </a:p>
+          <a:p>
+            <a:endParaRPr lang="en-US" sz="5100" dirty="0"/>
+          </a:p>
+          <a:p>
+            <a:r>
+              <a:rPr lang="en-US" sz="5100" dirty="0"/>
+              <a:t>Some others that are less powerful: Anderson-Darling, Kolmogorov-Smirnov, Lilliefors (Go to R..)</a:t>
+            </a:r>
           </a:p>
         </p:txBody>
       </p:sp>
     </p:spTree>
     <p:extLst>
       <p:ext uri="{BB962C8B-B14F-4D97-AF65-F5344CB8AC3E}">
-        <p14:creationId xmlns:p14="http://schemas.microsoft.com/office/powerpoint/2010/main" val="326081140"/>
+        <p14:creationId xmlns:p14="http://schemas.microsoft.com/office/powerpoint/2010/main" val="597949227"/>
       </p:ext>
     </p:extLst>
   </p:cSld>
@@ -5678,15 +5789,7 @@
           <a:p>
             <a:r>
               <a:rPr lang="en-US" dirty="0"/>
-              <a:t>Linear correlation </a:t>
-            </a:r>
-            <a:r>
-              <a:rPr lang="mr-IN" dirty="0"/>
-              <a:t>–</a:t>
-            </a:r>
-            <a:r>
-              <a:rPr lang="en-US" dirty="0"/>
-              <a:t> Pearson r correlation</a:t>
+              <a:t>Pond nutrients</a:t>
             </a:r>
           </a:p>
         </p:txBody>
@@ -5703,14 +5806,12 @@
         </p:nvSpPr>
         <p:spPr/>
         <p:txBody>
-          <a:bodyPr>
-            <a:normAutofit lnSpcReduction="10000"/>
-          </a:bodyPr>
-          <a:lstStyle/>
-          <a:p>
-            <a:r>
-              <a:rPr lang="en-US" dirty="0"/>
-              <a:t>Measures the degree of association between two variables</a:t>
+          <a:bodyPr/>
+          <a:lstStyle/>
+          <a:p>
+            <a:r>
+              <a:rPr lang="en-US" dirty="0"/>
+              <a:t>We measure correlations between a species of algae and nitrogen and phosphorous levels in natural ponds. Thus, we have a data frame showing N, P and A (for algae).</a:t>
             </a:r>
           </a:p>
           <a:p>
@@ -5719,64 +5820,18 @@
           <a:p>
             <a:r>
               <a:rPr lang="en-US" dirty="0"/>
-              <a:t>Gives you r which varies between -1 and 1. </a:t>
-            </a:r>
-          </a:p>
-          <a:p>
-            <a:pPr lvl="1"/>
-            <a:r>
-              <a:rPr lang="en-US" dirty="0"/>
-              <a:t>1 is a 1:1 relationship, so it gives you the strength of the linear correlation. </a:t>
+              <a:t>What kinds of tests could we do to see whether the algae are correlated with nutrient levels?</a:t>
             </a:r>
           </a:p>
           <a:p>
             <a:endParaRPr lang="en-US" dirty="0"/>
-          </a:p>
-          <a:p>
-            <a:r>
-              <a:rPr lang="en-US" dirty="0"/>
-              <a:t>Assumptions:</a:t>
-            </a:r>
-          </a:p>
-          <a:p>
-            <a:pPr lvl="1"/>
-            <a:r>
-              <a:rPr lang="en-US" b="1" u="sng" dirty="0"/>
-              <a:t>Both</a:t>
-            </a:r>
-            <a:r>
-              <a:rPr lang="en-US" dirty="0"/>
-              <a:t> variables are normally distributed</a:t>
-            </a:r>
-          </a:p>
-          <a:p>
-            <a:pPr lvl="1"/>
-            <a:r>
-              <a:rPr lang="en-US" dirty="0"/>
-              <a:t>Variables have a linear relationship (y = mx + b)</a:t>
-            </a:r>
-          </a:p>
-          <a:p>
-            <a:pPr lvl="1"/>
-            <a:r>
-              <a:rPr lang="en-US" dirty="0"/>
-              <a:t>Variables are equally distributed around a regression line (e.g. there isn’t bunching of the data in a given area </a:t>
-            </a:r>
-            <a:r>
-              <a:rPr lang="mr-IN" dirty="0"/>
-              <a:t>–</a:t>
-            </a:r>
-            <a:r>
-              <a:rPr lang="en-US" dirty="0"/>
-              <a:t> this is called homoscedasticity)</a:t>
-            </a:r>
           </a:p>
         </p:txBody>
       </p:sp>
     </p:spTree>
     <p:extLst>
       <p:ext uri="{BB962C8B-B14F-4D97-AF65-F5344CB8AC3E}">
-        <p14:creationId xmlns:p14="http://schemas.microsoft.com/office/powerpoint/2010/main" val="1079663477"/>
+        <p14:creationId xmlns:p14="http://schemas.microsoft.com/office/powerpoint/2010/main" val="326081140"/>
       </p:ext>
     </p:extLst>
   </p:cSld>
@@ -5818,10 +5873,17 @@
           <a:bodyPr/>
           <a:lstStyle/>
           <a:p>
-            <a:pPr algn="ctr"/>
-            <a:r>
-              <a:rPr lang="en-US" dirty="0"/>
-              <a:t>Non-linear? Test a correlation with Kendall Rank Correlation</a:t>
+            <a:r>
+              <a:rPr lang="en-US" dirty="0"/>
+              <a:t>Linear correlation </a:t>
+            </a:r>
+            <a:r>
+              <a:rPr lang="mr-IN" dirty="0"/>
+              <a:t>–</a:t>
+            </a:r>
+            <a:r>
+              <a:rPr lang="en-US" dirty="0"/>
+              <a:t> Pearson r correlation</a:t>
             </a:r>
           </a:p>
         </p:txBody>
@@ -5838,12 +5900,14 @@
         </p:nvSpPr>
         <p:spPr/>
         <p:txBody>
-          <a:bodyPr/>
-          <a:lstStyle/>
-          <a:p>
-            <a:r>
-              <a:rPr lang="en-US" dirty="0"/>
-              <a:t>Kendall rank correlation is a non-parametric test (e.g. non-normal, doesn’t need to be normally distributed)</a:t>
+          <a:bodyPr>
+            <a:normAutofit lnSpcReduction="10000"/>
+          </a:bodyPr>
+          <a:lstStyle/>
+          <a:p>
+            <a:r>
+              <a:rPr lang="en-US" dirty="0"/>
+              <a:t>Measures the degree of association between two variables</a:t>
             </a:r>
           </a:p>
           <a:p>
@@ -5852,7 +5916,14 @@
           <a:p>
             <a:r>
               <a:rPr lang="en-US" dirty="0"/>
-              <a:t>It ranks the order of things in your dataset and then measures the strength of dependence between two variables</a:t>
+              <a:t>Gives you r which varies between -1 and 1. </a:t>
+            </a:r>
+          </a:p>
+          <a:p>
+            <a:pPr lvl="1"/>
+            <a:r>
+              <a:rPr lang="en-US" dirty="0"/>
+              <a:t>1 is a 1:1 relationship, so it gives you the strength of the linear correlation. </a:t>
             </a:r>
           </a:p>
           <a:p>
@@ -5861,7 +5932,40 @@
           <a:p>
             <a:r>
               <a:rPr lang="en-US" dirty="0"/>
-              <a:t>It is less powerful, but still very useful</a:t>
+              <a:t>Assumptions:</a:t>
+            </a:r>
+          </a:p>
+          <a:p>
+            <a:pPr lvl="1"/>
+            <a:r>
+              <a:rPr lang="en-US" b="1" u="sng" dirty="0"/>
+              <a:t>Both</a:t>
+            </a:r>
+            <a:r>
+              <a:rPr lang="en-US" dirty="0"/>
+              <a:t> variables are normally distributed</a:t>
+            </a:r>
+          </a:p>
+          <a:p>
+            <a:pPr lvl="1"/>
+            <a:r>
+              <a:rPr lang="en-US" dirty="0"/>
+              <a:t>Variables have a linear relationship (y = mx + b)</a:t>
+            </a:r>
+          </a:p>
+          <a:p>
+            <a:pPr lvl="1"/>
+            <a:r>
+              <a:rPr lang="en-US" dirty="0"/>
+              <a:t>Variables are equally distributed around a regression line (e.g. there isn’t bunching of the data in a given area </a:t>
+            </a:r>
+            <a:r>
+              <a:rPr lang="mr-IN" dirty="0"/>
+              <a:t>–</a:t>
+            </a:r>
+            <a:r>
+              <a:rPr lang="en-US" dirty="0"/>
+              <a:t> this is called homoscedasticity)</a:t>
             </a:r>
           </a:p>
         </p:txBody>
@@ -5869,7 +5973,7 @@
     </p:spTree>
     <p:extLst>
       <p:ext uri="{BB962C8B-B14F-4D97-AF65-F5344CB8AC3E}">
-        <p14:creationId xmlns:p14="http://schemas.microsoft.com/office/powerpoint/2010/main" val="397136078"/>
+        <p14:creationId xmlns:p14="http://schemas.microsoft.com/office/powerpoint/2010/main" val="1079663477"/>
       </p:ext>
     </p:extLst>
   </p:cSld>
@@ -5911,9 +6015,10 @@
           <a:bodyPr/>
           <a:lstStyle/>
           <a:p>
-            <a:r>
-              <a:rPr lang="en-US" dirty="0"/>
-              <a:t>Note about testing correlations with tests</a:t>
+            <a:pPr algn="ctr"/>
+            <a:r>
+              <a:rPr lang="en-US" dirty="0"/>
+              <a:t>Non-linear? Test a correlation with Kendall Rank Correlation</a:t>
             </a:r>
           </a:p>
         </p:txBody>
@@ -5928,21 +6033,14 @@
             <p:ph idx="1"/>
           </p:nvPr>
         </p:nvSpPr>
-        <p:spPr>
-          <a:xfrm>
-            <a:off x="838200" y="1857156"/>
-            <a:ext cx="10515600" cy="4351338"/>
-          </a:xfrm>
-        </p:spPr>
-        <p:txBody>
-          <a:bodyPr>
-            <a:normAutofit lnSpcReduction="10000"/>
-          </a:bodyPr>
-          <a:lstStyle/>
-          <a:p>
-            <a:r>
-              <a:rPr lang="en-US" dirty="0"/>
-              <a:t>Correlational tests are useful for describing relationships between variables where we don’t have a strong a priori hypothesis about how one affects the others</a:t>
+        <p:spPr/>
+        <p:txBody>
+          <a:bodyPr/>
+          <a:lstStyle/>
+          <a:p>
+            <a:r>
+              <a:rPr lang="en-US" dirty="0"/>
+              <a:t>Kendall rank correlation is a non-parametric test (e.g. non-normal, doesn’t need to be normally distributed)</a:t>
             </a:r>
           </a:p>
           <a:p>
@@ -5951,7 +6049,7 @@
           <a:p>
             <a:r>
               <a:rPr lang="en-US" dirty="0"/>
-              <a:t>My opinion: When we have hypotheses about dependence, we should use models </a:t>
+              <a:t>It ranks the order of things in your dataset and then measures the strength of dependence between two variables</a:t>
             </a:r>
           </a:p>
           <a:p>
@@ -5960,26 +6058,15 @@
           <a:p>
             <a:r>
               <a:rPr lang="en-US" dirty="0"/>
-              <a:t>Which of these would you use a test vs a model?</a:t>
-            </a:r>
-          </a:p>
-          <a:p>
-            <a:pPr lvl="1"/>
-            <a:r>
-              <a:rPr lang="en-US" dirty="0"/>
-              <a:t>Salt intake and growth, fat and weight, temperature and infection, pavement and number of humans, number of frogs and number of fish</a:t>
-            </a:r>
-          </a:p>
-          <a:p>
-            <a:pPr lvl="1"/>
-            <a:endParaRPr lang="en-US" dirty="0"/>
+              <a:t>It is less powerful, but still very useful</a:t>
+            </a:r>
           </a:p>
         </p:txBody>
       </p:sp>
     </p:spTree>
     <p:extLst>
       <p:ext uri="{BB962C8B-B14F-4D97-AF65-F5344CB8AC3E}">
-        <p14:creationId xmlns:p14="http://schemas.microsoft.com/office/powerpoint/2010/main" val="1609073287"/>
+        <p14:creationId xmlns:p14="http://schemas.microsoft.com/office/powerpoint/2010/main" val="397136078"/>
       </p:ext>
     </p:extLst>
   </p:cSld>
@@ -6023,7 +6110,7 @@
           <a:p>
             <a:r>
               <a:rPr lang="en-US" dirty="0"/>
-              <a:t>Correlations with Permutations</a:t>
+              <a:t>Note about testing correlations with tests</a:t>
             </a:r>
           </a:p>
         </p:txBody>
@@ -6038,29 +6125,50 @@
             <p:ph idx="1"/>
           </p:nvPr>
         </p:nvSpPr>
-        <p:spPr/>
-        <p:txBody>
-          <a:bodyPr/>
-          <a:lstStyle/>
-          <a:p>
-            <a:r>
-              <a:rPr lang="en-US" dirty="0"/>
-              <a:t>With permutation tests, we can use any kind of prediction model, any statistic of prediction and any null hypothesis</a:t>
-            </a:r>
-          </a:p>
-          <a:p>
-            <a:r>
-              <a:rPr lang="en-US" dirty="0"/>
-              <a:t>Interchange things that should be interchangeable under the null hypothesis</a:t>
-            </a:r>
-          </a:p>
-          <a:p>
-            <a:r>
-              <a:rPr lang="en-US" dirty="0"/>
-              <a:t>How likely is it that we would observe a prediction as good or better as the one we have, under the null hypothesis that xx is interchangeable?</a:t>
-            </a:r>
-          </a:p>
-          <a:p>
+        <p:spPr>
+          <a:xfrm>
+            <a:off x="838200" y="1857156"/>
+            <a:ext cx="10515600" cy="4351338"/>
+          </a:xfrm>
+        </p:spPr>
+        <p:txBody>
+          <a:bodyPr>
+            <a:normAutofit lnSpcReduction="10000"/>
+          </a:bodyPr>
+          <a:lstStyle/>
+          <a:p>
+            <a:r>
+              <a:rPr lang="en-US" dirty="0"/>
+              <a:t>Correlational tests are useful for describing relationships between variables where we don’t have a strong a priori hypothesis about how one affects the others</a:t>
+            </a:r>
+          </a:p>
+          <a:p>
+            <a:endParaRPr lang="en-US" dirty="0"/>
+          </a:p>
+          <a:p>
+            <a:r>
+              <a:rPr lang="en-US" dirty="0"/>
+              <a:t>My opinion: When we have hypotheses about dependence, we should use models </a:t>
+            </a:r>
+          </a:p>
+          <a:p>
+            <a:endParaRPr lang="en-US" dirty="0"/>
+          </a:p>
+          <a:p>
+            <a:r>
+              <a:rPr lang="en-US" dirty="0"/>
+              <a:t>Which of these would you use a test vs a model?</a:t>
+            </a:r>
+          </a:p>
+          <a:p>
+            <a:pPr lvl="1"/>
+            <a:r>
+              <a:rPr lang="en-US" dirty="0"/>
+              <a:t>Salt intake and growth, fat and weight, temperature and infection, pavement and number of humans, number of frogs and number of fish</a:t>
+            </a:r>
+          </a:p>
+          <a:p>
+            <a:pPr lvl="1"/>
             <a:endParaRPr lang="en-US" dirty="0"/>
           </a:p>
         </p:txBody>
@@ -6068,7 +6176,7 @@
     </p:spTree>
     <p:extLst>
       <p:ext uri="{BB962C8B-B14F-4D97-AF65-F5344CB8AC3E}">
-        <p14:creationId xmlns:p14="http://schemas.microsoft.com/office/powerpoint/2010/main" val="743520985"/>
+        <p14:creationId xmlns:p14="http://schemas.microsoft.com/office/powerpoint/2010/main" val="1609073287"/>
       </p:ext>
     </p:extLst>
   </p:cSld>
@@ -6215,7 +6323,7 @@
           <a:p>
             <a:r>
               <a:rPr lang="en-US" dirty="0"/>
-              <a:t>Time and space</a:t>
+              <a:t>Mantel test</a:t>
             </a:r>
           </a:p>
         </p:txBody>
@@ -6230,14 +6338,21 @@
             <p:ph idx="1"/>
           </p:nvPr>
         </p:nvSpPr>
-        <p:spPr/>
-        <p:txBody>
-          <a:bodyPr/>
-          <a:lstStyle/>
-          <a:p>
-            <a:r>
-              <a:rPr lang="en-US" dirty="0"/>
-              <a:t>We can test for correlations between between variables (e.g. space/time) using permutation tests</a:t>
+        <p:spPr>
+          <a:xfrm>
+            <a:off x="838200" y="1548384"/>
+            <a:ext cx="10515600" cy="4628579"/>
+          </a:xfrm>
+        </p:spPr>
+        <p:txBody>
+          <a:bodyPr>
+            <a:normAutofit fontScale="85000" lnSpcReduction="20000"/>
+          </a:bodyPr>
+          <a:lstStyle/>
+          <a:p>
+            <a:r>
+              <a:rPr lang="en-US" dirty="0"/>
+              <a:t>This is a statistical test of the correlation between two matrices of the same dimension</a:t>
             </a:r>
           </a:p>
           <a:p>
@@ -6246,7 +6361,14 @@
           <a:p>
             <a:r>
               <a:rPr lang="en-US" dirty="0"/>
-              <a:t>A Mantel test is a type of permutation test</a:t>
+              <a:t>They are most frequently used in ecology where the data are distances between objects</a:t>
+            </a:r>
+          </a:p>
+          <a:p>
+            <a:pPr lvl="1"/>
+            <a:r>
+              <a:rPr lang="en-US" dirty="0"/>
+              <a:t>You might use a mantel test to see if your data are spatially autocorrelated</a:t>
             </a:r>
           </a:p>
           <a:p>
@@ -6255,7 +6377,7 @@
           <a:p>
             <a:r>
               <a:rPr lang="en-US" dirty="0"/>
-              <a:t>A Fisher exact test is also a kind of permutation test</a:t>
+              <a:t>For example, you might have one dataset which is a matrix of genetic distances, and one matrix with geographic distances between the range of species to each other species</a:t>
             </a:r>
           </a:p>
           <a:p>
@@ -6264,15 +6386,28 @@
           <a:p>
             <a:r>
               <a:rPr lang="en-US" dirty="0"/>
-              <a:t>You could also create your own test statistic!</a:t>
-            </a:r>
+              <a:t>Here is some helpful info on how to do one: </a:t>
+            </a:r>
+            <a:r>
+              <a:rPr lang="en-US" dirty="0">
+                <a:hlinkClick r:id="rId2"/>
+              </a:rPr>
+              <a:t>https://stats.idre.ucla.edu/r/faq/how-can-i-perform-a-mantel-test-in-r/</a:t>
+            </a:r>
+            <a:r>
+              <a:rPr lang="en-US" dirty="0"/>
+              <a:t> </a:t>
+            </a:r>
+          </a:p>
+          <a:p>
+            <a:endParaRPr lang="en-US" dirty="0"/>
           </a:p>
         </p:txBody>
       </p:sp>
     </p:spTree>
     <p:extLst>
       <p:ext uri="{BB962C8B-B14F-4D97-AF65-F5344CB8AC3E}">
-        <p14:creationId xmlns:p14="http://schemas.microsoft.com/office/powerpoint/2010/main" val="111654817"/>
+        <p14:creationId xmlns:p14="http://schemas.microsoft.com/office/powerpoint/2010/main" val="416448812"/>
       </p:ext>
     </p:extLst>
   </p:cSld>
@@ -6316,7 +6451,7 @@
           <a:p>
             <a:r>
               <a:rPr lang="en-US" dirty="0"/>
-              <a:t>Mantel test</a:t>
+              <a:t>Fisher’s exact test</a:t>
             </a:r>
           </a:p>
         </p:txBody>
@@ -6331,21 +6466,14 @@
             <p:ph idx="1"/>
           </p:nvPr>
         </p:nvSpPr>
-        <p:spPr>
-          <a:xfrm>
-            <a:off x="838200" y="1548384"/>
-            <a:ext cx="10515600" cy="4628579"/>
-          </a:xfrm>
-        </p:spPr>
-        <p:txBody>
-          <a:bodyPr>
-            <a:normAutofit fontScale="85000" lnSpcReduction="20000"/>
-          </a:bodyPr>
-          <a:lstStyle/>
-          <a:p>
-            <a:r>
-              <a:rPr lang="en-US" dirty="0"/>
-              <a:t>This is a statistical test of the correlation between two matrices of the same dimension</a:t>
+        <p:spPr/>
+        <p:txBody>
+          <a:bodyPr/>
+          <a:lstStyle/>
+          <a:p>
+            <a:r>
+              <a:rPr lang="en-US" dirty="0"/>
+              <a:t>The fisher’s exact test is a test to analyze contingency tables (e.g. 2 x 2) tables of categorical count data</a:t>
             </a:r>
           </a:p>
           <a:p>
@@ -6354,42 +6482,17 @@
           <a:p>
             <a:r>
               <a:rPr lang="en-US" dirty="0"/>
-              <a:t>They are most frequently used in ecology where the data are distances between objects</a:t>
-            </a:r>
-          </a:p>
-          <a:p>
-            <a:pPr lvl="1"/>
-            <a:r>
-              <a:rPr lang="en-US" dirty="0"/>
-              <a:t>You might use a mantel test to see if your data are spatially autocorrelated</a:t>
-            </a:r>
-          </a:p>
-          <a:p>
+              <a:t>It’s good for small samples and unbalanced designs (e.g. the numbers in each group are not equal)</a:t>
+            </a:r>
+            <a:br>
+              <a:rPr lang="en-US" dirty="0"/>
+            </a:br>
             <a:endParaRPr lang="en-US" dirty="0"/>
           </a:p>
           <a:p>
             <a:r>
               <a:rPr lang="en-US" dirty="0"/>
-              <a:t>For example, you might have one dataset which is a matrix of genetic distances, and one matrix with geographic distances between the range of species to each other species</a:t>
-            </a:r>
-          </a:p>
-          <a:p>
-            <a:endParaRPr lang="en-US" dirty="0"/>
-          </a:p>
-          <a:p>
-            <a:r>
-              <a:rPr lang="en-US" dirty="0"/>
-              <a:t>Here is some helpful info on how to do one: </a:t>
-            </a:r>
-            <a:r>
-              <a:rPr lang="en-US" dirty="0">
-                <a:hlinkClick r:id="rId2"/>
-              </a:rPr>
-              <a:t>https://stats.idre.ucla.edu/r/faq/how-can-i-perform-a-mantel-test-in-r/</a:t>
-            </a:r>
-            <a:r>
-              <a:rPr lang="en-US" dirty="0"/>
-              <a:t> </a:t>
+              <a:t>It uses a quasi-permutation approach to calculate an exact p-value</a:t>
             </a:r>
           </a:p>
           <a:p>
@@ -6400,7 +6503,7 @@
     </p:spTree>
     <p:extLst>
       <p:ext uri="{BB962C8B-B14F-4D97-AF65-F5344CB8AC3E}">
-        <p14:creationId xmlns:p14="http://schemas.microsoft.com/office/powerpoint/2010/main" val="416448812"/>
+        <p14:creationId xmlns:p14="http://schemas.microsoft.com/office/powerpoint/2010/main" val="174052823"/>
       </p:ext>
     </p:extLst>
   </p:cSld>
@@ -6443,9 +6546,10 @@
           <a:lstStyle/>
           <a:p>
             <a:r>
-              <a:rPr lang="en-US" dirty="0"/>
-              <a:t>Fisher’s exact test</a:t>
-            </a:r>
+              <a:rPr lang="en-US"/>
+              <a:t>Fisher test example</a:t>
+            </a:r>
+            <a:endParaRPr lang="en-US" dirty="0"/>
           </a:p>
         </p:txBody>
       </p:sp>
@@ -6466,7 +6570,7 @@
           <a:p>
             <a:r>
               <a:rPr lang="en-US" dirty="0"/>
-              <a:t>The fisher’s exact test is a test to analyze contingency tables (e.g. 2 x 2) tables of categorical count data</a:t>
+              <a:t>Pinnacles National Park has two different entrances that are unconnected. We went to the east side of Pinnacles 11 times, and 10 of 11 times we saw condors. We went to the west side of Pinnacle 8 times, and 1 of 8 times we saw condors. Is there a statistically significant difference in condor sightings? </a:t>
             </a:r>
           </a:p>
           <a:p>
@@ -6475,28 +6579,15 @@
           <a:p>
             <a:r>
               <a:rPr lang="en-US" dirty="0"/>
-              <a:t>It’s good for small samples and unbalanced designs (e.g. the numbers in each group are not equal)</a:t>
-            </a:r>
-            <a:br>
-              <a:rPr lang="en-US" dirty="0"/>
-            </a:br>
-            <a:endParaRPr lang="en-US" dirty="0"/>
-          </a:p>
-          <a:p>
-            <a:r>
-              <a:rPr lang="en-US" dirty="0"/>
-              <a:t>It uses a quasi-permutation approach to calculate an exact p-value</a:t>
-            </a:r>
-          </a:p>
-          <a:p>
-            <a:endParaRPr lang="en-US" dirty="0"/>
+              <a:t>Interpretation: Null hypothesis is that the probability is equal. A p-value &lt; 0.05 tells you that the east and west sides differ in the probability of detecting condors</a:t>
+            </a:r>
           </a:p>
         </p:txBody>
       </p:sp>
     </p:spTree>
     <p:extLst>
       <p:ext uri="{BB962C8B-B14F-4D97-AF65-F5344CB8AC3E}">
-        <p14:creationId xmlns:p14="http://schemas.microsoft.com/office/powerpoint/2010/main" val="174052823"/>
+        <p14:creationId xmlns:p14="http://schemas.microsoft.com/office/powerpoint/2010/main" val="459422531"/>
       </p:ext>
     </p:extLst>
   </p:cSld>
@@ -6539,31 +6630,64 @@
           <a:lstStyle/>
           <a:p>
             <a:r>
-              <a:rPr lang="en-US"/>
-              <a:t>Fisher test example</a:t>
-            </a:r>
+              <a:rPr lang="en-US" dirty="0"/>
+              <a:t>Rank tests</a:t>
+            </a:r>
+          </a:p>
+        </p:txBody>
+      </p:sp>
+      <p:sp>
+        <p:nvSpPr>
+          <p:cNvPr id="3" name="Content Placeholder 2"/>
+          <p:cNvSpPr>
+            <a:spLocks noGrp="1"/>
+          </p:cNvSpPr>
+          <p:nvPr>
+            <p:ph idx="1"/>
+          </p:nvPr>
+        </p:nvSpPr>
+        <p:spPr>
+          <a:xfrm>
+            <a:off x="838200" y="1731029"/>
+            <a:ext cx="10515600" cy="4351338"/>
+          </a:xfrm>
+        </p:spPr>
+        <p:txBody>
+          <a:bodyPr>
+            <a:normAutofit fontScale="92500" lnSpcReduction="20000"/>
+          </a:bodyPr>
+          <a:lstStyle/>
+          <a:p>
+            <a:r>
+              <a:rPr lang="en-US" b="1" u="sng" dirty="0"/>
+              <a:t>Wilcoxon Signed Rank Test</a:t>
+            </a:r>
+          </a:p>
+          <a:p>
+            <a:r>
+              <a:rPr lang="en-US" b="1" dirty="0"/>
+              <a:t>Non-parametric</a:t>
+            </a:r>
+            <a:r>
+              <a:rPr lang="en-US" dirty="0"/>
+              <a:t> test to compare two related samples to assess whether population ranks differ</a:t>
+            </a:r>
+          </a:p>
+          <a:p>
             <a:endParaRPr lang="en-US" dirty="0"/>
           </a:p>
-        </p:txBody>
-      </p:sp>
-      <p:sp>
-        <p:nvSpPr>
-          <p:cNvPr id="3" name="Content Placeholder 2"/>
-          <p:cNvSpPr>
-            <a:spLocks noGrp="1"/>
-          </p:cNvSpPr>
-          <p:nvPr>
-            <p:ph idx="1"/>
-          </p:nvPr>
-        </p:nvSpPr>
-        <p:spPr/>
-        <p:txBody>
-          <a:bodyPr/>
-          <a:lstStyle/>
-          <a:p>
-            <a:r>
-              <a:rPr lang="en-US" dirty="0"/>
-              <a:t>Pinnacles National Park has two different entrances that are unconnected. We went to the east side of Pinnacles 11 times, and 10 of 11 times we saw condors. We went to the west side of Pinnacle 8 times, and 1 of 8 times we saw condors. Is there a statistically significant difference in condor sightings? </a:t>
+          <a:p>
+            <a:r>
+              <a:rPr lang="en-US" dirty="0"/>
+              <a:t>It the analogous to the </a:t>
+            </a:r>
+            <a:r>
+              <a:rPr lang="en-US" b="1" u="sng" dirty="0"/>
+              <a:t>paired</a:t>
+            </a:r>
+            <a:r>
+              <a:rPr lang="en-US" dirty="0"/>
+              <a:t> t-test, but for non-normal data (and isn’t as powerful)</a:t>
             </a:r>
           </a:p>
           <a:p>
@@ -6572,7 +6696,38 @@
           <a:p>
             <a:r>
               <a:rPr lang="en-US" dirty="0"/>
-              <a:t>Interpretation: Null hypothesis is that the probability is equal. A p-value &lt; 0.05 tells you that the east and west sides differ in the probability of detecting condors</a:t>
+              <a:t>The </a:t>
+            </a:r>
+            <a:r>
+              <a:rPr lang="en-US" u="sng" dirty="0"/>
+              <a:t>Wilcoxon rank sum test</a:t>
+            </a:r>
+            <a:r>
+              <a:rPr lang="en-US" dirty="0"/>
+              <a:t> is the non-parametric equivalent to the </a:t>
+            </a:r>
+            <a:r>
+              <a:rPr lang="en-US" b="1" u="sng" dirty="0"/>
+              <a:t>unpaired</a:t>
+            </a:r>
+            <a:r>
+              <a:rPr lang="en-US" b="1" dirty="0"/>
+              <a:t> </a:t>
+            </a:r>
+            <a:r>
+              <a:rPr lang="en-US" dirty="0"/>
+              <a:t>t-test. You can indicate which one you want by specifying paired or unpaired in R. </a:t>
+            </a:r>
+            <a:r>
+              <a:rPr lang="en-US" u="sng" dirty="0"/>
+              <a:t> </a:t>
+            </a:r>
+          </a:p>
+          <a:p>
+            <a:pPr lvl="1"/>
+            <a:r>
+              <a:rPr lang="en-US" dirty="0"/>
+              <a:t>This is also called the Mann-Whitney U test, the Mann-Whitney-Wilcoxon, or the Wilcoxon-Mann-Whitney</a:t>
             </a:r>
           </a:p>
         </p:txBody>
@@ -6580,7 +6735,7 @@
     </p:spTree>
     <p:extLst>
       <p:ext uri="{BB962C8B-B14F-4D97-AF65-F5344CB8AC3E}">
-        <p14:creationId xmlns:p14="http://schemas.microsoft.com/office/powerpoint/2010/main" val="459422531"/>
+        <p14:creationId xmlns:p14="http://schemas.microsoft.com/office/powerpoint/2010/main" val="923724335"/>
       </p:ext>
     </p:extLst>
   </p:cSld>
@@ -6622,9 +6777,10 @@
           <a:bodyPr/>
           <a:lstStyle/>
           <a:p>
-            <a:r>
-              <a:rPr lang="en-US" dirty="0"/>
-              <a:t>Rank tests</a:t>
+            <a:pPr algn="ctr"/>
+            <a:r>
+              <a:rPr lang="en-US" dirty="0"/>
+              <a:t>Assignment</a:t>
             </a:r>
           </a:p>
         </p:txBody>
@@ -6639,88 +6795,118 @@
             <p:ph idx="1"/>
           </p:nvPr>
         </p:nvSpPr>
-        <p:spPr>
-          <a:xfrm>
-            <a:off x="838200" y="1731029"/>
-            <a:ext cx="10515600" cy="4351338"/>
-          </a:xfrm>
-        </p:spPr>
+        <p:spPr/>
         <p:txBody>
           <a:bodyPr>
-            <a:normAutofit fontScale="92500" lnSpcReduction="20000"/>
+            <a:normAutofit fontScale="62500" lnSpcReduction="20000"/>
           </a:bodyPr>
           <a:lstStyle/>
           <a:p>
+            <a:pPr marL="514350" indent="-514350">
+              <a:buAutoNum type="arabicPeriod"/>
+            </a:pPr>
+            <a:r>
+              <a:rPr lang="en-US" dirty="0"/>
+              <a:t>Formulate </a:t>
+            </a:r>
             <a:r>
               <a:rPr lang="en-US" b="1" u="sng" dirty="0"/>
-              <a:t>Wilcoxon Signed Rank Test</a:t>
-            </a:r>
-          </a:p>
-          <a:p>
+              <a:t>two different </a:t>
+            </a:r>
+            <a:r>
+              <a:rPr lang="en-US" dirty="0"/>
+              <a:t>hypotheses about your data, one that can be tested using a permutation test and one that can be tested using a “classical” test.</a:t>
+            </a:r>
+          </a:p>
+          <a:p>
+            <a:pPr marL="0" indent="0">
+              <a:buNone/>
+            </a:pPr>
+            <a:endParaRPr lang="en-US" dirty="0"/>
+          </a:p>
+          <a:p>
+            <a:pPr marL="514350" indent="-514350">
+              <a:buAutoNum type="arabicPeriod"/>
+            </a:pPr>
+            <a:r>
+              <a:rPr lang="en-US" dirty="0"/>
+              <a:t>Write these hypotheses the in the Week 5 section of your README.</a:t>
+            </a:r>
+          </a:p>
+          <a:p>
+            <a:pPr marL="0" indent="0">
+              <a:buNone/>
+            </a:pPr>
+            <a:endParaRPr lang="en-US" dirty="0"/>
+          </a:p>
+          <a:p>
+            <a:pPr marL="0" indent="0">
+              <a:buNone/>
+            </a:pPr>
+            <a:r>
+              <a:rPr lang="en-US" dirty="0"/>
+              <a:t>2. Implement both of these tests in R. Annotate your code so I know which hypothesis you are testing. </a:t>
+            </a:r>
+          </a:p>
+          <a:p>
+            <a:pPr marL="0" indent="0">
+              <a:buNone/>
+            </a:pPr>
+            <a:endParaRPr lang="en-US" dirty="0"/>
+          </a:p>
+          <a:p>
+            <a:pPr marL="0" indent="0">
+              <a:buNone/>
+            </a:pPr>
+            <a:r>
+              <a:rPr lang="en-US" dirty="0"/>
+              <a:t>3. Try to use a loop for your permutation test (e.g. a brute force method). And use any classical test you learned about (or know previously) to test your other hypothesis.</a:t>
+            </a:r>
+          </a:p>
+          <a:p>
+            <a:pPr marL="0" indent="0">
+              <a:buNone/>
+            </a:pPr>
+            <a:endParaRPr lang="en-US" dirty="0"/>
+          </a:p>
+          <a:p>
+            <a:pPr marL="0" indent="0">
+              <a:buNone/>
+            </a:pPr>
+            <a:r>
+              <a:rPr lang="en-US" dirty="0"/>
+              <a:t>3. Advanced: Describe how you would test a third hypothesis with a permutation test. You don’t have to execute it, but think creatively about how to do. </a:t>
+            </a:r>
+          </a:p>
+          <a:p>
+            <a:pPr marL="0" indent="0">
+              <a:buNone/>
+            </a:pPr>
+            <a:endParaRPr lang="en-US" dirty="0"/>
+          </a:p>
+          <a:p>
+            <a:pPr marL="0" indent="0">
+              <a:buNone/>
+            </a:pPr>
+            <a:r>
+              <a:rPr lang="en-US" dirty="0"/>
+              <a:t>When you have completed the assignment: </a:t>
+            </a:r>
             <a:r>
               <a:rPr lang="en-US" b="1" dirty="0"/>
-              <a:t>Non-parametric</a:t>
-            </a:r>
-            <a:r>
-              <a:rPr lang="en-US" dirty="0"/>
-              <a:t> test to compare two related samples to assess whether population ranks differ</a:t>
-            </a:r>
-          </a:p>
-          <a:p>
-            <a:endParaRPr lang="en-US" dirty="0"/>
-          </a:p>
-          <a:p>
-            <a:r>
-              <a:rPr lang="en-US" dirty="0"/>
-              <a:t>It the analogous to the </a:t>
+              <a:t>commit your changes, and push your README and code file to GITHUB</a:t>
+            </a:r>
+            <a:r>
+              <a:rPr lang="en-US" dirty="0"/>
+              <a:t>. Submit a text entry via canvas that says: </a:t>
+            </a:r>
+            <a:r>
+              <a:rPr lang="en-US" b="1" u="sng" dirty="0" err="1"/>
+              <a:t>github_repo_name</a:t>
             </a:r>
             <a:r>
               <a:rPr lang="en-US" b="1" u="sng" dirty="0"/>
-              <a:t>paired</a:t>
-            </a:r>
-            <a:r>
-              <a:rPr lang="en-US" dirty="0"/>
-              <a:t> t-test, but for non-normal data (and isn’t as powerful)</a:t>
-            </a:r>
-          </a:p>
-          <a:p>
-            <a:endParaRPr lang="en-US" dirty="0"/>
-          </a:p>
-          <a:p>
-            <a:r>
-              <a:rPr lang="en-US" dirty="0"/>
-              <a:t>The </a:t>
-            </a:r>
-            <a:r>
-              <a:rPr lang="en-US" u="sng" dirty="0"/>
-              <a:t>Wilcoxon rank sum test</a:t>
-            </a:r>
-            <a:r>
-              <a:rPr lang="en-US" dirty="0"/>
-              <a:t> is the non-parametric equivalent to the </a:t>
-            </a:r>
-            <a:r>
-              <a:rPr lang="en-US" b="1" u="sng" dirty="0"/>
-              <a:t>unpaired</a:t>
-            </a:r>
-            <a:r>
-              <a:rPr lang="en-US" b="1" dirty="0"/>
-              <a:t> </a:t>
-            </a:r>
-            <a:r>
-              <a:rPr lang="en-US" dirty="0"/>
-              <a:t>t-test. You can indicate which one you want by specifying paired or unpaired in R. </a:t>
-            </a:r>
-            <a:r>
-              <a:rPr lang="en-US" u="sng" dirty="0"/>
-              <a:t> </a:t>
-            </a:r>
-          </a:p>
-          <a:p>
-            <a:pPr lvl="1"/>
-            <a:r>
-              <a:rPr lang="en-US" dirty="0"/>
-              <a:t>This is also called the Mann-Whitney U test, the Mann-Whitney-Wilcoxon, or the Wilcoxon-Mann-Whitney</a:t>
+              <a:t>, (Enrollment status), DONE</a:t>
             </a:r>
           </a:p>
         </p:txBody>
@@ -6728,472 +6914,7 @@
     </p:spTree>
     <p:extLst>
       <p:ext uri="{BB962C8B-B14F-4D97-AF65-F5344CB8AC3E}">
-        <p14:creationId xmlns:p14="http://schemas.microsoft.com/office/powerpoint/2010/main" val="923724335"/>
-      </p:ext>
-    </p:extLst>
-  </p:cSld>
-  <p:clrMapOvr>
-    <a:masterClrMapping/>
-  </p:clrMapOvr>
-</p:sld>
-</file>
-
-<file path=ppt/slides/slide35.xml><?xml version="1.0" encoding="utf-8"?>
-<p:sld xmlns:a="http://schemas.openxmlformats.org/drawingml/2006/main" xmlns:r="http://schemas.openxmlformats.org/officeDocument/2006/relationships" xmlns:p="http://schemas.openxmlformats.org/presentationml/2006/main">
-  <p:cSld>
-    <p:spTree>
-      <p:nvGrpSpPr>
-        <p:cNvPr id="1" name=""/>
-        <p:cNvGrpSpPr/>
-        <p:nvPr/>
-      </p:nvGrpSpPr>
-      <p:grpSpPr>
-        <a:xfrm>
-          <a:off x="0" y="0"/>
-          <a:ext cx="0" cy="0"/>
-          <a:chOff x="0" y="0"/>
-          <a:chExt cx="0" cy="0"/>
-        </a:xfrm>
-      </p:grpSpPr>
-      <p:sp>
-        <p:nvSpPr>
-          <p:cNvPr id="2" name="Title 1"/>
-          <p:cNvSpPr>
-            <a:spLocks noGrp="1"/>
-          </p:cNvSpPr>
-          <p:nvPr>
-            <p:ph type="title"/>
-          </p:nvPr>
-        </p:nvSpPr>
-        <p:spPr/>
-        <p:txBody>
-          <a:bodyPr/>
-          <a:lstStyle/>
-          <a:p>
-            <a:r>
-              <a:rPr lang="en-US" dirty="0"/>
-              <a:t>Permutations and application to evolution</a:t>
-            </a:r>
-          </a:p>
-        </p:txBody>
-      </p:sp>
-      <p:sp>
-        <p:nvSpPr>
-          <p:cNvPr id="3" name="Content Placeholder 2"/>
-          <p:cNvSpPr>
-            <a:spLocks noGrp="1"/>
-          </p:cNvSpPr>
-          <p:nvPr>
-            <p:ph idx="1"/>
-          </p:nvPr>
-        </p:nvSpPr>
-        <p:spPr/>
-        <p:txBody>
-          <a:bodyPr/>
-          <a:lstStyle/>
-          <a:p>
-            <a:r>
-              <a:rPr lang="en-US" dirty="0"/>
-              <a:t>Infer a tree and then ask what happens if we relabel nucleotides at each site, or move mutations around the tree</a:t>
-            </a:r>
-          </a:p>
-          <a:p>
-            <a:endParaRPr lang="en-US" dirty="0"/>
-          </a:p>
-          <a:p>
-            <a:r>
-              <a:rPr lang="en-US" dirty="0"/>
-              <a:t>Ask if there are differences between nucleotide preference in flu evolution by “relabeling” nucleotides</a:t>
-            </a:r>
-          </a:p>
-          <a:p>
-            <a:endParaRPr lang="en-US" dirty="0"/>
-          </a:p>
-        </p:txBody>
-      </p:sp>
-    </p:spTree>
-    <p:extLst>
-      <p:ext uri="{BB962C8B-B14F-4D97-AF65-F5344CB8AC3E}">
-        <p14:creationId xmlns:p14="http://schemas.microsoft.com/office/powerpoint/2010/main" val="1038584964"/>
-      </p:ext>
-    </p:extLst>
-  </p:cSld>
-  <p:clrMapOvr>
-    <a:masterClrMapping/>
-  </p:clrMapOvr>
-</p:sld>
-</file>
-
-<file path=ppt/slides/slide36.xml><?xml version="1.0" encoding="utf-8"?>
-<p:sld xmlns:a="http://schemas.openxmlformats.org/drawingml/2006/main" xmlns:r="http://schemas.openxmlformats.org/officeDocument/2006/relationships" xmlns:p="http://schemas.openxmlformats.org/presentationml/2006/main">
-  <p:cSld>
-    <p:spTree>
-      <p:nvGrpSpPr>
-        <p:cNvPr id="1" name=""/>
-        <p:cNvGrpSpPr/>
-        <p:nvPr/>
-      </p:nvGrpSpPr>
-      <p:grpSpPr>
-        <a:xfrm>
-          <a:off x="0" y="0"/>
-          <a:ext cx="0" cy="0"/>
-          <a:chOff x="0" y="0"/>
-          <a:chExt cx="0" cy="0"/>
-        </a:xfrm>
-      </p:grpSpPr>
-      <p:sp>
-        <p:nvSpPr>
-          <p:cNvPr id="2" name="Title 1"/>
-          <p:cNvSpPr>
-            <a:spLocks noGrp="1"/>
-          </p:cNvSpPr>
-          <p:nvPr>
-            <p:ph type="title"/>
-          </p:nvPr>
-        </p:nvSpPr>
-        <p:spPr/>
-        <p:txBody>
-          <a:bodyPr/>
-          <a:lstStyle/>
-          <a:p>
-            <a:r>
-              <a:rPr lang="en-US" dirty="0"/>
-              <a:t>Animal behavior</a:t>
-            </a:r>
-          </a:p>
-        </p:txBody>
-      </p:sp>
-      <p:sp>
-        <p:nvSpPr>
-          <p:cNvPr id="3" name="Content Placeholder 2"/>
-          <p:cNvSpPr>
-            <a:spLocks noGrp="1"/>
-          </p:cNvSpPr>
-          <p:nvPr>
-            <p:ph idx="1"/>
-          </p:nvPr>
-        </p:nvSpPr>
-        <p:spPr/>
-        <p:txBody>
-          <a:bodyPr/>
-          <a:lstStyle/>
-          <a:p>
-            <a:r>
-              <a:rPr lang="en-US" dirty="0"/>
-              <a:t>Observe behavior of different individual animals. Evaluate observed statistics of (for example) tendency of bachelors to wander off from groups</a:t>
-            </a:r>
-          </a:p>
-          <a:p>
-            <a:endParaRPr lang="en-US" dirty="0"/>
-          </a:p>
-          <a:p>
-            <a:r>
-              <a:rPr lang="en-US" dirty="0"/>
-              <a:t>Classic tests don’t account for individual propensities</a:t>
-            </a:r>
-          </a:p>
-          <a:p>
-            <a:r>
-              <a:rPr lang="en-US" dirty="0"/>
-              <a:t>Switch whole “timelines” from one individual to another</a:t>
-            </a:r>
-          </a:p>
-          <a:p>
-            <a:endParaRPr lang="en-US" dirty="0"/>
-          </a:p>
-        </p:txBody>
-      </p:sp>
-    </p:spTree>
-    <p:extLst>
-      <p:ext uri="{BB962C8B-B14F-4D97-AF65-F5344CB8AC3E}">
-        <p14:creationId xmlns:p14="http://schemas.microsoft.com/office/powerpoint/2010/main" val="1625008692"/>
-      </p:ext>
-    </p:extLst>
-  </p:cSld>
-  <p:clrMapOvr>
-    <a:masterClrMapping/>
-  </p:clrMapOvr>
-</p:sld>
-</file>
-
-<file path=ppt/slides/slide37.xml><?xml version="1.0" encoding="utf-8"?>
-<p:sld xmlns:a="http://schemas.openxmlformats.org/drawingml/2006/main" xmlns:r="http://schemas.openxmlformats.org/officeDocument/2006/relationships" xmlns:p="http://schemas.openxmlformats.org/presentationml/2006/main">
-  <p:cSld>
-    <p:spTree>
-      <p:nvGrpSpPr>
-        <p:cNvPr id="1" name=""/>
-        <p:cNvGrpSpPr/>
-        <p:nvPr/>
-      </p:nvGrpSpPr>
-      <p:grpSpPr>
-        <a:xfrm>
-          <a:off x="0" y="0"/>
-          <a:ext cx="0" cy="0"/>
-          <a:chOff x="0" y="0"/>
-          <a:chExt cx="0" cy="0"/>
-        </a:xfrm>
-      </p:grpSpPr>
-      <p:sp>
-        <p:nvSpPr>
-          <p:cNvPr id="2" name="Title 1"/>
-          <p:cNvSpPr>
-            <a:spLocks noGrp="1"/>
-          </p:cNvSpPr>
-          <p:nvPr>
-            <p:ph type="title"/>
-          </p:nvPr>
-        </p:nvSpPr>
-        <p:spPr/>
-        <p:txBody>
-          <a:bodyPr/>
-          <a:lstStyle/>
-          <a:p>
-            <a:r>
-              <a:rPr lang="en-US" dirty="0"/>
-              <a:t>Confidence intervals</a:t>
-            </a:r>
-          </a:p>
-        </p:txBody>
-      </p:sp>
-      <p:sp>
-        <p:nvSpPr>
-          <p:cNvPr id="3" name="Content Placeholder 2"/>
-          <p:cNvSpPr>
-            <a:spLocks noGrp="1"/>
-          </p:cNvSpPr>
-          <p:nvPr>
-            <p:ph idx="1"/>
-          </p:nvPr>
-        </p:nvSpPr>
-        <p:spPr/>
-        <p:txBody>
-          <a:bodyPr/>
-          <a:lstStyle/>
-          <a:p>
-            <a:r>
-              <a:rPr lang="en-US" dirty="0"/>
-              <a:t>The strength of permutation tests is also a weakness</a:t>
-            </a:r>
-          </a:p>
-          <a:p>
-            <a:r>
-              <a:rPr lang="en-US" dirty="0"/>
-              <a:t>Without assumptions about distributions, it’s not easy to get confidence intervals for our statistics</a:t>
-            </a:r>
-          </a:p>
-          <a:p>
-            <a:endParaRPr lang="en-US" dirty="0"/>
-          </a:p>
-          <a:p>
-            <a:r>
-              <a:rPr lang="en-US" dirty="0"/>
-              <a:t>The field of getting confidence intervals from permutation tests is still developing</a:t>
-            </a:r>
-          </a:p>
-          <a:p>
-            <a:pPr lvl="1"/>
-            <a:r>
-              <a:rPr lang="en-US" dirty="0"/>
-              <a:t>Much can be done … but not without assumptions</a:t>
-            </a:r>
-            <a:br>
-              <a:rPr lang="en-US" dirty="0"/>
-            </a:br>
-            <a:endParaRPr lang="en-US" dirty="0"/>
-          </a:p>
-        </p:txBody>
-      </p:sp>
-    </p:spTree>
-    <p:extLst>
-      <p:ext uri="{BB962C8B-B14F-4D97-AF65-F5344CB8AC3E}">
-        <p14:creationId xmlns:p14="http://schemas.microsoft.com/office/powerpoint/2010/main" val="1104336559"/>
-      </p:ext>
-    </p:extLst>
-  </p:cSld>
-  <p:clrMapOvr>
-    <a:masterClrMapping/>
-  </p:clrMapOvr>
-</p:sld>
-</file>
-
-<file path=ppt/slides/slide38.xml><?xml version="1.0" encoding="utf-8"?>
-<p:sld xmlns:a="http://schemas.openxmlformats.org/drawingml/2006/main" xmlns:r="http://schemas.openxmlformats.org/officeDocument/2006/relationships" xmlns:p="http://schemas.openxmlformats.org/presentationml/2006/main">
-  <p:cSld>
-    <p:spTree>
-      <p:nvGrpSpPr>
-        <p:cNvPr id="1" name=""/>
-        <p:cNvGrpSpPr/>
-        <p:nvPr/>
-      </p:nvGrpSpPr>
-      <p:grpSpPr>
-        <a:xfrm>
-          <a:off x="0" y="0"/>
-          <a:ext cx="0" cy="0"/>
-          <a:chOff x="0" y="0"/>
-          <a:chExt cx="0" cy="0"/>
-        </a:xfrm>
-      </p:grpSpPr>
-      <p:sp>
-        <p:nvSpPr>
-          <p:cNvPr id="2" name="Title 1"/>
-          <p:cNvSpPr>
-            <a:spLocks noGrp="1"/>
-          </p:cNvSpPr>
-          <p:nvPr>
-            <p:ph type="title"/>
-          </p:nvPr>
-        </p:nvSpPr>
-        <p:spPr/>
-        <p:txBody>
-          <a:bodyPr/>
-          <a:lstStyle/>
-          <a:p>
-            <a:r>
-              <a:rPr lang="en-US" dirty="0"/>
-              <a:t>Confidence intervals from means</a:t>
-            </a:r>
-          </a:p>
-        </p:txBody>
-      </p:sp>
-      <p:sp>
-        <p:nvSpPr>
-          <p:cNvPr id="3" name="Content Placeholder 2"/>
-          <p:cNvSpPr>
-            <a:spLocks noGrp="1"/>
-          </p:cNvSpPr>
-          <p:nvPr>
-            <p:ph idx="1"/>
-          </p:nvPr>
-        </p:nvSpPr>
-        <p:spPr/>
-        <p:txBody>
-          <a:bodyPr/>
-          <a:lstStyle/>
-          <a:p>
-            <a:r>
-              <a:rPr lang="en-US" dirty="0"/>
-              <a:t>We can obtain confidence intervals for a single mean if we assume that the data are drawn from a symmetric distribution</a:t>
-            </a:r>
-          </a:p>
-          <a:p>
-            <a:pPr lvl="1"/>
-            <a:r>
-              <a:rPr lang="en-US" dirty="0"/>
-              <a:t>It may be good to transform first</a:t>
-            </a:r>
-          </a:p>
-          <a:p>
-            <a:r>
-              <a:rPr lang="en-US" dirty="0"/>
-              <a:t>We can obtain confidence intervals for the difference between two means if we assume that the distributions are identical except for a ‘shift’</a:t>
-            </a:r>
-          </a:p>
-          <a:p>
-            <a:pPr lvl="1"/>
-            <a:r>
-              <a:rPr lang="en-US" dirty="0"/>
-              <a:t>Transformation also helps</a:t>
-            </a:r>
-            <a:r>
-              <a:rPr lang="mr-IN" dirty="0"/>
-              <a:t>…</a:t>
-            </a:r>
-            <a:endParaRPr lang="en-US" dirty="0"/>
-          </a:p>
-        </p:txBody>
-      </p:sp>
-    </p:spTree>
-    <p:extLst>
-      <p:ext uri="{BB962C8B-B14F-4D97-AF65-F5344CB8AC3E}">
-        <p14:creationId xmlns:p14="http://schemas.microsoft.com/office/powerpoint/2010/main" val="1519358001"/>
-      </p:ext>
-    </p:extLst>
-  </p:cSld>
-  <p:clrMapOvr>
-    <a:masterClrMapping/>
-  </p:clrMapOvr>
-</p:sld>
-</file>
-
-<file path=ppt/slides/slide39.xml><?xml version="1.0" encoding="utf-8"?>
-<p:sld xmlns:a="http://schemas.openxmlformats.org/drawingml/2006/main" xmlns:r="http://schemas.openxmlformats.org/officeDocument/2006/relationships" xmlns:p="http://schemas.openxmlformats.org/presentationml/2006/main">
-  <p:cSld>
-    <p:spTree>
-      <p:nvGrpSpPr>
-        <p:cNvPr id="1" name=""/>
-        <p:cNvGrpSpPr/>
-        <p:nvPr/>
-      </p:nvGrpSpPr>
-      <p:grpSpPr>
-        <a:xfrm>
-          <a:off x="0" y="0"/>
-          <a:ext cx="0" cy="0"/>
-          <a:chOff x="0" y="0"/>
-          <a:chExt cx="0" cy="0"/>
-        </a:xfrm>
-      </p:grpSpPr>
-      <p:sp>
-        <p:nvSpPr>
-          <p:cNvPr id="2" name="Title 1"/>
-          <p:cNvSpPr>
-            <a:spLocks noGrp="1"/>
-          </p:cNvSpPr>
-          <p:nvPr>
-            <p:ph type="title"/>
-          </p:nvPr>
-        </p:nvSpPr>
-        <p:spPr/>
-        <p:txBody>
-          <a:bodyPr/>
-          <a:lstStyle/>
-          <a:p>
-            <a:r>
-              <a:rPr lang="en-US" dirty="0"/>
-              <a:t>Medians</a:t>
-            </a:r>
-          </a:p>
-        </p:txBody>
-      </p:sp>
-      <p:sp>
-        <p:nvSpPr>
-          <p:cNvPr id="3" name="Content Placeholder 2"/>
-          <p:cNvSpPr>
-            <a:spLocks noGrp="1"/>
-          </p:cNvSpPr>
-          <p:nvPr>
-            <p:ph idx="1"/>
-          </p:nvPr>
-        </p:nvSpPr>
-        <p:spPr/>
-        <p:txBody>
-          <a:bodyPr/>
-          <a:lstStyle/>
-          <a:p>
-            <a:r>
-              <a:rPr lang="en-US" dirty="0"/>
-              <a:t>Permutation tests are well suited to comparing medians (and other quantiles), because these can be evaluated without distributional assumptions</a:t>
-            </a:r>
-          </a:p>
-          <a:p>
-            <a:endParaRPr lang="en-US" dirty="0"/>
-          </a:p>
-          <a:p>
-            <a:pPr lvl="1"/>
-            <a:r>
-              <a:rPr lang="en-US" dirty="0"/>
-              <a:t>This approach is related to rank tests</a:t>
-            </a:r>
-            <a:br>
-              <a:rPr lang="en-US" dirty="0"/>
-            </a:br>
-            <a:endParaRPr lang="en-US" dirty="0"/>
-          </a:p>
-        </p:txBody>
-      </p:sp>
-    </p:spTree>
-    <p:extLst>
-      <p:ext uri="{BB962C8B-B14F-4D97-AF65-F5344CB8AC3E}">
-        <p14:creationId xmlns:p14="http://schemas.microsoft.com/office/powerpoint/2010/main" val="1783477262"/>
+        <p14:creationId xmlns:p14="http://schemas.microsoft.com/office/powerpoint/2010/main" val="820378817"/>
       </p:ext>
     </p:extLst>
   </p:cSld>
@@ -7299,439 +7020,6 @@
     <p:extLst>
       <p:ext uri="{BB962C8B-B14F-4D97-AF65-F5344CB8AC3E}">
         <p14:creationId xmlns:p14="http://schemas.microsoft.com/office/powerpoint/2010/main" val="2089782546"/>
-      </p:ext>
-    </p:extLst>
-  </p:cSld>
-  <p:clrMapOvr>
-    <a:masterClrMapping/>
-  </p:clrMapOvr>
-</p:sld>
-</file>
-
-<file path=ppt/slides/slide40.xml><?xml version="1.0" encoding="utf-8"?>
-<p:sld xmlns:a="http://schemas.openxmlformats.org/drawingml/2006/main" xmlns:r="http://schemas.openxmlformats.org/officeDocument/2006/relationships" xmlns:p="http://schemas.openxmlformats.org/presentationml/2006/main">
-  <p:cSld>
-    <p:spTree>
-      <p:nvGrpSpPr>
-        <p:cNvPr id="1" name=""/>
-        <p:cNvGrpSpPr/>
-        <p:nvPr/>
-      </p:nvGrpSpPr>
-      <p:grpSpPr>
-        <a:xfrm>
-          <a:off x="0" y="0"/>
-          <a:ext cx="0" cy="0"/>
-          <a:chOff x="0" y="0"/>
-          <a:chExt cx="0" cy="0"/>
-        </a:xfrm>
-      </p:grpSpPr>
-      <p:sp>
-        <p:nvSpPr>
-          <p:cNvPr id="2" name="Title 1"/>
-          <p:cNvSpPr>
-            <a:spLocks noGrp="1"/>
-          </p:cNvSpPr>
-          <p:nvPr>
-            <p:ph type="title"/>
-          </p:nvPr>
-        </p:nvSpPr>
-        <p:spPr/>
-        <p:txBody>
-          <a:bodyPr/>
-          <a:lstStyle/>
-          <a:p>
-            <a:r>
-              <a:rPr lang="en-US" dirty="0"/>
-              <a:t>A little more about permutations</a:t>
-            </a:r>
-          </a:p>
-        </p:txBody>
-      </p:sp>
-      <p:sp>
-        <p:nvSpPr>
-          <p:cNvPr id="3" name="Content Placeholder 2"/>
-          <p:cNvSpPr>
-            <a:spLocks noGrp="1"/>
-          </p:cNvSpPr>
-          <p:nvPr>
-            <p:ph idx="1"/>
-          </p:nvPr>
-        </p:nvSpPr>
-        <p:spPr/>
-        <p:txBody>
-          <a:bodyPr/>
-          <a:lstStyle/>
-          <a:p>
-            <a:r>
-              <a:rPr lang="en-US" dirty="0"/>
-              <a:t>There are packages for doing permutations </a:t>
-            </a:r>
-            <a:r>
-              <a:rPr lang="mr-IN" dirty="0"/>
-              <a:t>–</a:t>
-            </a:r>
-            <a:r>
-              <a:rPr lang="en-US" dirty="0"/>
-              <a:t> coin is one</a:t>
-            </a:r>
-          </a:p>
-          <a:p>
-            <a:pPr lvl="1"/>
-            <a:r>
-              <a:rPr lang="en-US" dirty="0"/>
-              <a:t>This package is very powerful (and a bit complicated)</a:t>
-            </a:r>
-          </a:p>
-          <a:p>
-            <a:pPr lvl="1"/>
-            <a:endParaRPr lang="en-US" dirty="0"/>
-          </a:p>
-          <a:p>
-            <a:r>
-              <a:rPr lang="en-US" dirty="0"/>
-              <a:t>They will ask you to choose a type of p-value </a:t>
-            </a:r>
-          </a:p>
-          <a:p>
-            <a:r>
-              <a:rPr lang="en-US" b="1" dirty="0" err="1"/>
-              <a:t>oneway_test</a:t>
-            </a:r>
-            <a:r>
-              <a:rPr lang="en-US" dirty="0"/>
-              <a:t>(</a:t>
-            </a:r>
-            <a:r>
-              <a:rPr lang="en-US" dirty="0" err="1"/>
-              <a:t>colonies~place,data</a:t>
-            </a:r>
-            <a:r>
-              <a:rPr lang="en-US" dirty="0"/>
-              <a:t>=</a:t>
-            </a:r>
-            <a:r>
-              <a:rPr lang="en-US" dirty="0" err="1"/>
-              <a:t>ants,distribution</a:t>
-            </a:r>
-            <a:r>
-              <a:rPr lang="en-US" dirty="0"/>
-              <a:t>=</a:t>
-            </a:r>
-            <a:r>
-              <a:rPr lang="en-US" b="1" dirty="0"/>
-              <a:t>approximate</a:t>
-            </a:r>
-            <a:r>
-              <a:rPr lang="en-US" dirty="0"/>
-              <a:t>(B=9999))</a:t>
-            </a:r>
-          </a:p>
-          <a:p>
-            <a:pPr lvl="1"/>
-            <a:r>
-              <a:rPr lang="en-US" dirty="0"/>
-              <a:t>This should be equivalent to our simulation method</a:t>
-            </a:r>
-          </a:p>
-          <a:p>
-            <a:pPr lvl="1"/>
-            <a:r>
-              <a:rPr lang="en-US" dirty="0"/>
-              <a:t>My opinion: Brute force methods (e.g. writing a loop) still provide a more explicit way to do permutations</a:t>
-            </a:r>
-            <a:br>
-              <a:rPr lang="en-US" dirty="0"/>
-            </a:br>
-            <a:endParaRPr lang="en-US" dirty="0"/>
-          </a:p>
-          <a:p>
-            <a:endParaRPr lang="en-US" dirty="0"/>
-          </a:p>
-        </p:txBody>
-      </p:sp>
-    </p:spTree>
-    <p:extLst>
-      <p:ext uri="{BB962C8B-B14F-4D97-AF65-F5344CB8AC3E}">
-        <p14:creationId xmlns:p14="http://schemas.microsoft.com/office/powerpoint/2010/main" val="1103709518"/>
-      </p:ext>
-    </p:extLst>
-  </p:cSld>
-  <p:clrMapOvr>
-    <a:masterClrMapping/>
-  </p:clrMapOvr>
-</p:sld>
-</file>
-
-<file path=ppt/slides/slide41.xml><?xml version="1.0" encoding="utf-8"?>
-<p:sld xmlns:a="http://schemas.openxmlformats.org/drawingml/2006/main" xmlns:r="http://schemas.openxmlformats.org/officeDocument/2006/relationships" xmlns:p="http://schemas.openxmlformats.org/presentationml/2006/main">
-  <p:cSld>
-    <p:spTree>
-      <p:nvGrpSpPr>
-        <p:cNvPr id="1" name=""/>
-        <p:cNvGrpSpPr/>
-        <p:nvPr/>
-      </p:nvGrpSpPr>
-      <p:grpSpPr>
-        <a:xfrm>
-          <a:off x="0" y="0"/>
-          <a:ext cx="0" cy="0"/>
-          <a:chOff x="0" y="0"/>
-          <a:chExt cx="0" cy="0"/>
-        </a:xfrm>
-      </p:grpSpPr>
-      <p:sp>
-        <p:nvSpPr>
-          <p:cNvPr id="2" name="Title 1"/>
-          <p:cNvSpPr>
-            <a:spLocks noGrp="1"/>
-          </p:cNvSpPr>
-          <p:nvPr>
-            <p:ph type="title"/>
-          </p:nvPr>
-        </p:nvSpPr>
-        <p:spPr/>
-        <p:txBody>
-          <a:bodyPr/>
-          <a:lstStyle/>
-          <a:p>
-            <a:r>
-              <a:rPr lang="en-US" dirty="0"/>
-              <a:t>Permutation Summary</a:t>
-            </a:r>
-          </a:p>
-        </p:txBody>
-      </p:sp>
-      <p:sp>
-        <p:nvSpPr>
-          <p:cNvPr id="3" name="Content Placeholder 2"/>
-          <p:cNvSpPr>
-            <a:spLocks noGrp="1"/>
-          </p:cNvSpPr>
-          <p:nvPr>
-            <p:ph idx="1"/>
-          </p:nvPr>
-        </p:nvSpPr>
-        <p:spPr/>
-        <p:txBody>
-          <a:bodyPr>
-            <a:normAutofit fontScale="92500" lnSpcReduction="20000"/>
-          </a:bodyPr>
-          <a:lstStyle/>
-          <a:p>
-            <a:r>
-              <a:rPr lang="en-US" dirty="0"/>
-              <a:t>Advantages</a:t>
-            </a:r>
-          </a:p>
-          <a:p>
-            <a:r>
-              <a:rPr lang="en-US" dirty="0"/>
-              <a:t>General applicability</a:t>
-            </a:r>
-          </a:p>
-          <a:p>
-            <a:r>
-              <a:rPr lang="en-US" dirty="0"/>
-              <a:t>Conceptual clarity</a:t>
-            </a:r>
-          </a:p>
-          <a:p>
-            <a:r>
-              <a:rPr lang="en-US" dirty="0"/>
-              <a:t>Flexibility</a:t>
-            </a:r>
-          </a:p>
-          <a:p>
-            <a:r>
-              <a:rPr lang="en-US" dirty="0"/>
-              <a:t>Fewer assumptions</a:t>
-            </a:r>
-          </a:p>
-          <a:p>
-            <a:endParaRPr lang="en-US" dirty="0"/>
-          </a:p>
-          <a:p>
-            <a:r>
-              <a:rPr lang="en-US" dirty="0"/>
-              <a:t>Disadvantages</a:t>
-            </a:r>
-          </a:p>
-          <a:p>
-            <a:r>
-              <a:rPr lang="en-US" dirty="0"/>
-              <a:t>Hard to implement</a:t>
-            </a:r>
-          </a:p>
-          <a:p>
-            <a:r>
-              <a:rPr lang="en-US" dirty="0"/>
-              <a:t>May take a lot of computer time</a:t>
-            </a:r>
-          </a:p>
-          <a:p>
-            <a:r>
-              <a:rPr lang="en-US" dirty="0"/>
-              <a:t>May be hard to obtain confidence intervals</a:t>
-            </a:r>
-          </a:p>
-          <a:p>
-            <a:endParaRPr lang="en-US" dirty="0"/>
-          </a:p>
-        </p:txBody>
-      </p:sp>
-    </p:spTree>
-    <p:extLst>
-      <p:ext uri="{BB962C8B-B14F-4D97-AF65-F5344CB8AC3E}">
-        <p14:creationId xmlns:p14="http://schemas.microsoft.com/office/powerpoint/2010/main" val="1769201116"/>
-      </p:ext>
-    </p:extLst>
-  </p:cSld>
-  <p:clrMapOvr>
-    <a:masterClrMapping/>
-  </p:clrMapOvr>
-</p:sld>
-</file>
-
-<file path=ppt/slides/slide42.xml><?xml version="1.0" encoding="utf-8"?>
-<p:sld xmlns:a="http://schemas.openxmlformats.org/drawingml/2006/main" xmlns:r="http://schemas.openxmlformats.org/officeDocument/2006/relationships" xmlns:p="http://schemas.openxmlformats.org/presentationml/2006/main">
-  <p:cSld>
-    <p:spTree>
-      <p:nvGrpSpPr>
-        <p:cNvPr id="1" name=""/>
-        <p:cNvGrpSpPr/>
-        <p:nvPr/>
-      </p:nvGrpSpPr>
-      <p:grpSpPr>
-        <a:xfrm>
-          <a:off x="0" y="0"/>
-          <a:ext cx="0" cy="0"/>
-          <a:chOff x="0" y="0"/>
-          <a:chExt cx="0" cy="0"/>
-        </a:xfrm>
-      </p:grpSpPr>
-      <p:sp>
-        <p:nvSpPr>
-          <p:cNvPr id="2" name="Title 1"/>
-          <p:cNvSpPr>
-            <a:spLocks noGrp="1"/>
-          </p:cNvSpPr>
-          <p:nvPr>
-            <p:ph type="title"/>
-          </p:nvPr>
-        </p:nvSpPr>
-        <p:spPr/>
-        <p:txBody>
-          <a:bodyPr/>
-          <a:lstStyle/>
-          <a:p>
-            <a:pPr algn="ctr"/>
-            <a:r>
-              <a:rPr lang="en-US" dirty="0"/>
-              <a:t>Assignment</a:t>
-            </a:r>
-          </a:p>
-        </p:txBody>
-      </p:sp>
-      <p:sp>
-        <p:nvSpPr>
-          <p:cNvPr id="3" name="Content Placeholder 2"/>
-          <p:cNvSpPr>
-            <a:spLocks noGrp="1"/>
-          </p:cNvSpPr>
-          <p:nvPr>
-            <p:ph idx="1"/>
-          </p:nvPr>
-        </p:nvSpPr>
-        <p:spPr/>
-        <p:txBody>
-          <a:bodyPr>
-            <a:normAutofit fontScale="77500" lnSpcReduction="20000"/>
-          </a:bodyPr>
-          <a:lstStyle/>
-          <a:p>
-            <a:pPr marL="0" indent="0">
-              <a:buNone/>
-            </a:pPr>
-            <a:r>
-              <a:rPr lang="en-US" dirty="0"/>
-              <a:t>1. Formulate </a:t>
-            </a:r>
-            <a:r>
-              <a:rPr lang="en-US" b="1" u="sng" dirty="0"/>
-              <a:t>two different </a:t>
-            </a:r>
-            <a:r>
-              <a:rPr lang="en-US" dirty="0"/>
-              <a:t>hypotheses about your data, and describe how you would test them with 1) a permutation test, and 2) a classic test. Write these the in the Week 5 section of your README.</a:t>
-            </a:r>
-          </a:p>
-          <a:p>
-            <a:pPr marL="0" indent="0">
-              <a:buNone/>
-            </a:pPr>
-            <a:endParaRPr lang="en-US" dirty="0"/>
-          </a:p>
-          <a:p>
-            <a:pPr marL="0" indent="0">
-              <a:buNone/>
-            </a:pPr>
-            <a:r>
-              <a:rPr lang="en-US" dirty="0"/>
-              <a:t>2. Implement both of these tests in R. Annotate your code so I know which hypothesis you are testing. Try to use a loop for your permutation test (e.g. a brute force method).</a:t>
-            </a:r>
-          </a:p>
-          <a:p>
-            <a:pPr marL="0" indent="0">
-              <a:buNone/>
-            </a:pPr>
-            <a:endParaRPr lang="en-US" dirty="0"/>
-          </a:p>
-          <a:p>
-            <a:pPr marL="0" indent="0">
-              <a:buNone/>
-            </a:pPr>
-            <a:r>
-              <a:rPr lang="en-US" dirty="0"/>
-              <a:t>3. Extra credit: Describe how you would test a third hypothesis with a permutation test. You don’t have to execute it, but think creatively about how to do. </a:t>
-            </a:r>
-          </a:p>
-          <a:p>
-            <a:pPr marL="0" indent="0">
-              <a:buNone/>
-            </a:pPr>
-            <a:endParaRPr lang="en-US" dirty="0"/>
-          </a:p>
-          <a:p>
-            <a:pPr marL="0" indent="0">
-              <a:buNone/>
-            </a:pPr>
-            <a:r>
-              <a:rPr lang="en-US" dirty="0"/>
-              <a:t>When you have completed the assignment: </a:t>
-            </a:r>
-            <a:r>
-              <a:rPr lang="en-US" b="1" dirty="0"/>
-              <a:t>commit your changes, and push your README and code file to GITHUB</a:t>
-            </a:r>
-            <a:r>
-              <a:rPr lang="en-US" dirty="0"/>
-              <a:t>. Submit a text entry via canvas that says: </a:t>
-            </a:r>
-            <a:r>
-              <a:rPr lang="en-US" b="1" u="sng" dirty="0" err="1"/>
-              <a:t>github_repo_name</a:t>
-            </a:r>
-            <a:r>
-              <a:rPr lang="en-US" b="1" u="sng" dirty="0"/>
-              <a:t>, (Enrollment status), DONE</a:t>
-            </a:r>
-          </a:p>
-        </p:txBody>
-      </p:sp>
-    </p:spTree>
-    <p:extLst>
-      <p:ext uri="{BB962C8B-B14F-4D97-AF65-F5344CB8AC3E}">
-        <p14:creationId xmlns:p14="http://schemas.microsoft.com/office/powerpoint/2010/main" val="820378817"/>
       </p:ext>
     </p:extLst>
   </p:cSld>

</xml_diff>

<commit_message>
updating week 5 materials
</commit_message>
<xml_diff>
--- a/lectures/le_5_tests.pptx
+++ b/lectures/le_5_tests.pptx
@@ -5,43 +5,44 @@
     <p:sldMasterId id="2147483648" r:id="rId1"/>
   </p:sldMasterIdLst>
   <p:notesMasterIdLst>
-    <p:notesMasterId r:id="rId36"/>
+    <p:notesMasterId r:id="rId37"/>
   </p:notesMasterIdLst>
   <p:sldIdLst>
     <p:sldId id="256" r:id="rId2"/>
-    <p:sldId id="257" r:id="rId3"/>
-    <p:sldId id="258" r:id="rId4"/>
-    <p:sldId id="259" r:id="rId5"/>
-    <p:sldId id="262" r:id="rId6"/>
-    <p:sldId id="260" r:id="rId7"/>
-    <p:sldId id="261" r:id="rId8"/>
-    <p:sldId id="263" r:id="rId9"/>
-    <p:sldId id="264" r:id="rId10"/>
-    <p:sldId id="286" r:id="rId11"/>
-    <p:sldId id="287" r:id="rId12"/>
-    <p:sldId id="288" r:id="rId13"/>
-    <p:sldId id="265" r:id="rId14"/>
-    <p:sldId id="266" r:id="rId15"/>
-    <p:sldId id="268" r:id="rId16"/>
-    <p:sldId id="269" r:id="rId17"/>
-    <p:sldId id="301" r:id="rId18"/>
-    <p:sldId id="284" r:id="rId19"/>
-    <p:sldId id="306" r:id="rId20"/>
-    <p:sldId id="289" r:id="rId21"/>
-    <p:sldId id="291" r:id="rId22"/>
-    <p:sldId id="292" r:id="rId23"/>
-    <p:sldId id="293" r:id="rId24"/>
-    <p:sldId id="290" r:id="rId25"/>
-    <p:sldId id="294" r:id="rId26"/>
-    <p:sldId id="271" r:id="rId27"/>
-    <p:sldId id="295" r:id="rId28"/>
-    <p:sldId id="296" r:id="rId29"/>
-    <p:sldId id="297" r:id="rId30"/>
-    <p:sldId id="274" r:id="rId31"/>
-    <p:sldId id="275" r:id="rId32"/>
-    <p:sldId id="299" r:id="rId33"/>
-    <p:sldId id="304" r:id="rId34"/>
-    <p:sldId id="303" r:id="rId35"/>
+    <p:sldId id="283" r:id="rId3"/>
+    <p:sldId id="257" r:id="rId4"/>
+    <p:sldId id="258" r:id="rId5"/>
+    <p:sldId id="259" r:id="rId6"/>
+    <p:sldId id="262" r:id="rId7"/>
+    <p:sldId id="260" r:id="rId8"/>
+    <p:sldId id="261" r:id="rId9"/>
+    <p:sldId id="263" r:id="rId10"/>
+    <p:sldId id="264" r:id="rId11"/>
+    <p:sldId id="286" r:id="rId12"/>
+    <p:sldId id="287" r:id="rId13"/>
+    <p:sldId id="288" r:id="rId14"/>
+    <p:sldId id="265" r:id="rId15"/>
+    <p:sldId id="266" r:id="rId16"/>
+    <p:sldId id="268" r:id="rId17"/>
+    <p:sldId id="269" r:id="rId18"/>
+    <p:sldId id="301" r:id="rId19"/>
+    <p:sldId id="284" r:id="rId20"/>
+    <p:sldId id="306" r:id="rId21"/>
+    <p:sldId id="289" r:id="rId22"/>
+    <p:sldId id="291" r:id="rId23"/>
+    <p:sldId id="292" r:id="rId24"/>
+    <p:sldId id="293" r:id="rId25"/>
+    <p:sldId id="290" r:id="rId26"/>
+    <p:sldId id="294" r:id="rId27"/>
+    <p:sldId id="271" r:id="rId28"/>
+    <p:sldId id="295" r:id="rId29"/>
+    <p:sldId id="296" r:id="rId30"/>
+    <p:sldId id="297" r:id="rId31"/>
+    <p:sldId id="274" r:id="rId32"/>
+    <p:sldId id="275" r:id="rId33"/>
+    <p:sldId id="299" r:id="rId34"/>
+    <p:sldId id="304" r:id="rId35"/>
+    <p:sldId id="303" r:id="rId36"/>
   </p:sldIdLst>
   <p:sldSz cx="12192000" cy="6858000"/>
   <p:notesSz cx="6858000" cy="9144000"/>
@@ -541,36 +542,8 @@
           <a:bodyPr/>
           <a:lstStyle/>
           <a:p>
-            <a:pPr marL="0" marR="0" lvl="1" indent="0" algn="l" defTabSz="914400" rtl="0" eaLnBrk="1" fontAlgn="auto" latinLnBrk="0" hangingPunct="1">
-              <a:lnSpc>
-                <a:spcPct val="100000"/>
-              </a:lnSpc>
-              <a:spcBef>
-                <a:spcPts val="0"/>
-              </a:spcBef>
-              <a:spcAft>
-                <a:spcPts val="0"/>
-              </a:spcAft>
-              <a:buClrTx/>
-              <a:buSzTx/>
-              <a:buFontTx/>
-              <a:buNone/>
-              <a:tabLst/>
-              <a:defRPr/>
-            </a:pPr>
-            <a:r>
-              <a:rPr lang="en-US" dirty="0"/>
-              <a:t>A woman is walking down the street at night and sees another man on his hands and knees searching the ground under a lamppost. The man explains he has lost</a:t>
-            </a:r>
-            <a:r>
-              <a:rPr lang="en-US" baseline="0" dirty="0"/>
-              <a:t> his wedding ring. The woman helps him search. After a while, she asks “Are you sure you lost it here?”, and the man say’s “No, I dropped it over there, but this is where the light is!” </a:t>
-            </a:r>
             <a:endParaRPr lang="en-US" dirty="0"/>
           </a:p>
-          <a:p>
-            <a:endParaRPr lang="en-US" dirty="0"/>
-          </a:p>
         </p:txBody>
       </p:sp>
       <p:sp>
@@ -580,17 +553,17 @@
             <a:spLocks noGrp="1"/>
           </p:cNvSpPr>
           <p:nvPr>
-            <p:ph type="sldNum" sz="quarter" idx="10"/>
-          </p:nvPr>
-        </p:nvSpPr>
-        <p:spPr/>
-        <p:txBody>
-          <a:bodyPr/>
-          <a:lstStyle/>
-          <a:p>
-            <a:fld id="{3FFC207A-36A1-3243-A33F-1510AFB24BC1}" type="slidenum">
+            <p:ph type="sldNum" sz="quarter" idx="5"/>
+          </p:nvPr>
+        </p:nvSpPr>
+        <p:spPr/>
+        <p:txBody>
+          <a:bodyPr/>
+          <a:lstStyle/>
+          <a:p>
+            <a:fld id="{AB338687-A7AF-CA41-9DA3-11909A50B352}" type="slidenum">
               <a:rPr lang="en-US" smtClean="0"/>
-              <a:t>5</a:t>
+              <a:t>2</a:t>
             </a:fld>
             <a:endParaRPr lang="en-US"/>
           </a:p>
@@ -599,7 +572,7 @@
     </p:spTree>
     <p:extLst>
       <p:ext uri="{BB962C8B-B14F-4D97-AF65-F5344CB8AC3E}">
-        <p14:creationId xmlns:p14="http://schemas.microsoft.com/office/powerpoint/2010/main" val="989978376"/>
+        <p14:creationId xmlns:p14="http://schemas.microsoft.com/office/powerpoint/2010/main" val="1223108111"/>
       </p:ext>
     </p:extLst>
   </p:cSld>
@@ -653,6 +626,34 @@
           <a:bodyPr/>
           <a:lstStyle/>
           <a:p>
+            <a:pPr marL="0" marR="0" lvl="1" indent="0" algn="l" defTabSz="914400" rtl="0" eaLnBrk="1" fontAlgn="auto" latinLnBrk="0" hangingPunct="1">
+              <a:lnSpc>
+                <a:spcPct val="100000"/>
+              </a:lnSpc>
+              <a:spcBef>
+                <a:spcPts val="0"/>
+              </a:spcBef>
+              <a:spcAft>
+                <a:spcPts val="0"/>
+              </a:spcAft>
+              <a:buClrTx/>
+              <a:buSzTx/>
+              <a:buFontTx/>
+              <a:buNone/>
+              <a:tabLst/>
+              <a:defRPr/>
+            </a:pPr>
+            <a:r>
+              <a:rPr lang="en-US" dirty="0"/>
+              <a:t>A woman is walking down the street at night and sees another man on his hands and knees searching the ground under a lamppost. The man explains he has lost</a:t>
+            </a:r>
+            <a:r>
+              <a:rPr lang="en-US" baseline="0" dirty="0"/>
+              <a:t> his wedding ring. The woman helps him search. After a while, she asks “Are you sure you lost it here?”, and the man say’s “No, I dropped it over there, but this is where the light is!” </a:t>
+            </a:r>
+            <a:endParaRPr lang="en-US" dirty="0"/>
+          </a:p>
+          <a:p>
             <a:endParaRPr lang="en-US" dirty="0"/>
           </a:p>
         </p:txBody>
@@ -674,7 +675,7 @@
           <a:p>
             <a:fld id="{3FFC207A-36A1-3243-A33F-1510AFB24BC1}" type="slidenum">
               <a:rPr lang="en-US" smtClean="0"/>
-              <a:t>14</a:t>
+              <a:t>6</a:t>
             </a:fld>
             <a:endParaRPr lang="en-US"/>
           </a:p>
@@ -683,7 +684,7 @@
     </p:spTree>
     <p:extLst>
       <p:ext uri="{BB962C8B-B14F-4D97-AF65-F5344CB8AC3E}">
-        <p14:creationId xmlns:p14="http://schemas.microsoft.com/office/powerpoint/2010/main" val="1317016362"/>
+        <p14:creationId xmlns:p14="http://schemas.microsoft.com/office/powerpoint/2010/main" val="989978376"/>
       </p:ext>
     </p:extLst>
   </p:cSld>
@@ -767,7 +768,7 @@
     </p:spTree>
     <p:extLst>
       <p:ext uri="{BB962C8B-B14F-4D97-AF65-F5344CB8AC3E}">
-        <p14:creationId xmlns:p14="http://schemas.microsoft.com/office/powerpoint/2010/main" val="980046505"/>
+        <p14:creationId xmlns:p14="http://schemas.microsoft.com/office/powerpoint/2010/main" val="1317016362"/>
       </p:ext>
     </p:extLst>
   </p:cSld>
@@ -842,7 +843,7 @@
           <a:p>
             <a:fld id="{3FFC207A-36A1-3243-A33F-1510AFB24BC1}" type="slidenum">
               <a:rPr lang="en-US" smtClean="0"/>
-              <a:t>18</a:t>
+              <a:t>16</a:t>
             </a:fld>
             <a:endParaRPr lang="en-US"/>
           </a:p>
@@ -851,7 +852,7 @@
     </p:spTree>
     <p:extLst>
       <p:ext uri="{BB962C8B-B14F-4D97-AF65-F5344CB8AC3E}">
-        <p14:creationId xmlns:p14="http://schemas.microsoft.com/office/powerpoint/2010/main" val="2867127433"/>
+        <p14:creationId xmlns:p14="http://schemas.microsoft.com/office/powerpoint/2010/main" val="980046505"/>
       </p:ext>
     </p:extLst>
   </p:cSld>
@@ -926,7 +927,91 @@
           <a:p>
             <a:fld id="{3FFC207A-36A1-3243-A33F-1510AFB24BC1}" type="slidenum">
               <a:rPr lang="en-US" smtClean="0"/>
-              <a:t>33</a:t>
+              <a:t>19</a:t>
+            </a:fld>
+            <a:endParaRPr lang="en-US"/>
+          </a:p>
+        </p:txBody>
+      </p:sp>
+    </p:spTree>
+    <p:extLst>
+      <p:ext uri="{BB962C8B-B14F-4D97-AF65-F5344CB8AC3E}">
+        <p14:creationId xmlns:p14="http://schemas.microsoft.com/office/powerpoint/2010/main" val="2867127433"/>
+      </p:ext>
+    </p:extLst>
+  </p:cSld>
+  <p:clrMapOvr>
+    <a:masterClrMapping/>
+  </p:clrMapOvr>
+</p:notes>
+</file>
+
+<file path=ppt/notesSlides/notesSlide6.xml><?xml version="1.0" encoding="utf-8"?>
+<p:notes xmlns:a="http://schemas.openxmlformats.org/drawingml/2006/main" xmlns:r="http://schemas.openxmlformats.org/officeDocument/2006/relationships" xmlns:p="http://schemas.openxmlformats.org/presentationml/2006/main">
+  <p:cSld>
+    <p:spTree>
+      <p:nvGrpSpPr>
+        <p:cNvPr id="1" name=""/>
+        <p:cNvGrpSpPr/>
+        <p:nvPr/>
+      </p:nvGrpSpPr>
+      <p:grpSpPr>
+        <a:xfrm>
+          <a:off x="0" y="0"/>
+          <a:ext cx="0" cy="0"/>
+          <a:chOff x="0" y="0"/>
+          <a:chExt cx="0" cy="0"/>
+        </a:xfrm>
+      </p:grpSpPr>
+      <p:sp>
+        <p:nvSpPr>
+          <p:cNvPr id="2" name="Slide Image Placeholder 1"/>
+          <p:cNvSpPr>
+            <a:spLocks noGrp="1" noRot="1" noChangeAspect="1"/>
+          </p:cNvSpPr>
+          <p:nvPr>
+            <p:ph type="sldImg"/>
+          </p:nvPr>
+        </p:nvSpPr>
+        <p:spPr/>
+      </p:sp>
+      <p:sp>
+        <p:nvSpPr>
+          <p:cNvPr id="3" name="Notes Placeholder 2"/>
+          <p:cNvSpPr>
+            <a:spLocks noGrp="1"/>
+          </p:cNvSpPr>
+          <p:nvPr>
+            <p:ph type="body" idx="1"/>
+          </p:nvPr>
+        </p:nvSpPr>
+        <p:spPr/>
+        <p:txBody>
+          <a:bodyPr/>
+          <a:lstStyle/>
+          <a:p>
+            <a:endParaRPr lang="en-US" dirty="0"/>
+          </a:p>
+        </p:txBody>
+      </p:sp>
+      <p:sp>
+        <p:nvSpPr>
+          <p:cNvPr id="4" name="Slide Number Placeholder 3"/>
+          <p:cNvSpPr>
+            <a:spLocks noGrp="1"/>
+          </p:cNvSpPr>
+          <p:nvPr>
+            <p:ph type="sldNum" sz="quarter" idx="10"/>
+          </p:nvPr>
+        </p:nvSpPr>
+        <p:spPr/>
+        <p:txBody>
+          <a:bodyPr/>
+          <a:lstStyle/>
+          <a:p>
+            <a:fld id="{3FFC207A-36A1-3243-A33F-1510AFB24BC1}" type="slidenum">
+              <a:rPr lang="en-US" smtClean="0"/>
+              <a:t>34</a:t>
             </a:fld>
             <a:endParaRPr lang="en-US"/>
           </a:p>
@@ -3874,6 +3959,99 @@
           <a:p>
             <a:r>
               <a:rPr lang="en-US" dirty="0"/>
+              <a:t>Permutation testing	</a:t>
+            </a:r>
+          </a:p>
+        </p:txBody>
+      </p:sp>
+      <p:sp>
+        <p:nvSpPr>
+          <p:cNvPr id="3" name="Content Placeholder 2"/>
+          <p:cNvSpPr>
+            <a:spLocks noGrp="1"/>
+          </p:cNvSpPr>
+          <p:nvPr>
+            <p:ph idx="1"/>
+          </p:nvPr>
+        </p:nvSpPr>
+        <p:spPr/>
+        <p:txBody>
+          <a:bodyPr/>
+          <a:lstStyle/>
+          <a:p>
+            <a:r>
+              <a:rPr lang="en-US" dirty="0"/>
+              <a:t>Choose a statistic that reflects the effect you are trying to measure</a:t>
+            </a:r>
+          </a:p>
+          <a:p>
+            <a:pPr lvl="1"/>
+            <a:r>
+              <a:rPr lang="en-US" dirty="0"/>
+              <a:t>e.g., mean, median, geometric mean</a:t>
+            </a:r>
+          </a:p>
+          <a:p>
+            <a:endParaRPr lang="en-US" dirty="0"/>
+          </a:p>
+          <a:p>
+            <a:r>
+              <a:rPr lang="en-US" dirty="0"/>
+              <a:t>Compared the observed value of the statistic with a null distribution, generated by interchanging things that should be interchangeable under your null hypothesis</a:t>
+            </a:r>
+          </a:p>
+          <a:p>
+            <a:endParaRPr lang="en-US" dirty="0"/>
+          </a:p>
+        </p:txBody>
+      </p:sp>
+    </p:spTree>
+    <p:extLst>
+      <p:ext uri="{BB962C8B-B14F-4D97-AF65-F5344CB8AC3E}">
+        <p14:creationId xmlns:p14="http://schemas.microsoft.com/office/powerpoint/2010/main" val="1506322930"/>
+      </p:ext>
+    </p:extLst>
+  </p:cSld>
+  <p:clrMapOvr>
+    <a:masterClrMapping/>
+  </p:clrMapOvr>
+</p:sld>
+</file>
+
+<file path=ppt/slides/slide11.xml><?xml version="1.0" encoding="utf-8"?>
+<p:sld xmlns:a="http://schemas.openxmlformats.org/drawingml/2006/main" xmlns:r="http://schemas.openxmlformats.org/officeDocument/2006/relationships" xmlns:p="http://schemas.openxmlformats.org/presentationml/2006/main">
+  <p:cSld>
+    <p:spTree>
+      <p:nvGrpSpPr>
+        <p:cNvPr id="1" name=""/>
+        <p:cNvGrpSpPr/>
+        <p:nvPr/>
+      </p:nvGrpSpPr>
+      <p:grpSpPr>
+        <a:xfrm>
+          <a:off x="0" y="0"/>
+          <a:ext cx="0" cy="0"/>
+          <a:chOff x="0" y="0"/>
+          <a:chExt cx="0" cy="0"/>
+        </a:xfrm>
+      </p:grpSpPr>
+      <p:sp>
+        <p:nvSpPr>
+          <p:cNvPr id="2" name="Title 1"/>
+          <p:cNvSpPr>
+            <a:spLocks noGrp="1"/>
+          </p:cNvSpPr>
+          <p:nvPr>
+            <p:ph type="title"/>
+          </p:nvPr>
+        </p:nvSpPr>
+        <p:spPr/>
+        <p:txBody>
+          <a:bodyPr/>
+          <a:lstStyle/>
+          <a:p>
+            <a:r>
+              <a:rPr lang="en-US" dirty="0"/>
               <a:t>Brute force method </a:t>
             </a:r>
             <a:r>
@@ -3943,7 +4121,7 @@
 </p:sld>
 </file>
 
-<file path=ppt/slides/slide11.xml><?xml version="1.0" encoding="utf-8"?>
+<file path=ppt/slides/slide12.xml><?xml version="1.0" encoding="utf-8"?>
 <p:sld xmlns:a="http://schemas.openxmlformats.org/drawingml/2006/main" xmlns:r="http://schemas.openxmlformats.org/officeDocument/2006/relationships" xmlns:p="http://schemas.openxmlformats.org/presentationml/2006/main">
   <p:cSld>
     <p:spTree>
@@ -4131,109 +4309,6 @@
 </p:sld>
 </file>
 
-<file path=ppt/slides/slide12.xml><?xml version="1.0" encoding="utf-8"?>
-<p:sld xmlns:a="http://schemas.openxmlformats.org/drawingml/2006/main" xmlns:r="http://schemas.openxmlformats.org/officeDocument/2006/relationships" xmlns:p="http://schemas.openxmlformats.org/presentationml/2006/main">
-  <p:cSld>
-    <p:spTree>
-      <p:nvGrpSpPr>
-        <p:cNvPr id="1" name=""/>
-        <p:cNvGrpSpPr/>
-        <p:nvPr/>
-      </p:nvGrpSpPr>
-      <p:grpSpPr>
-        <a:xfrm>
-          <a:off x="0" y="0"/>
-          <a:ext cx="0" cy="0"/>
-          <a:chOff x="0" y="0"/>
-          <a:chExt cx="0" cy="0"/>
-        </a:xfrm>
-      </p:grpSpPr>
-      <p:sp>
-        <p:nvSpPr>
-          <p:cNvPr id="2" name="Title 1"/>
-          <p:cNvSpPr>
-            <a:spLocks noGrp="1"/>
-          </p:cNvSpPr>
-          <p:nvPr>
-            <p:ph type="title"/>
-          </p:nvPr>
-        </p:nvSpPr>
-        <p:spPr/>
-        <p:txBody>
-          <a:bodyPr/>
-          <a:lstStyle/>
-          <a:p>
-            <a:r>
-              <a:rPr lang="en-US" dirty="0"/>
-              <a:t>Counting ant colonies</a:t>
-            </a:r>
-          </a:p>
-        </p:txBody>
-      </p:sp>
-      <p:sp>
-        <p:nvSpPr>
-          <p:cNvPr id="3" name="Content Placeholder 2"/>
-          <p:cNvSpPr>
-            <a:spLocks noGrp="1"/>
-          </p:cNvSpPr>
-          <p:nvPr>
-            <p:ph idx="1"/>
-          </p:nvPr>
-        </p:nvSpPr>
-        <p:spPr/>
-        <p:txBody>
-          <a:bodyPr/>
-          <a:lstStyle/>
-          <a:p>
-            <a:r>
-              <a:rPr lang="en-US" dirty="0"/>
-              <a:t>We do an exhaustive survey of ant colonies in a forest habitat and an old-field habitat. This is how many colonies we find in each survey plot:</a:t>
-            </a:r>
-          </a:p>
-          <a:p>
-            <a:pPr lvl="1"/>
-            <a:r>
-              <a:rPr lang="en-US" dirty="0"/>
-              <a:t>Forest: 9, 6, 4, 6, 7, 10</a:t>
-            </a:r>
-          </a:p>
-          <a:p>
-            <a:pPr lvl="1"/>
-            <a:r>
-              <a:rPr lang="en-US" dirty="0"/>
-              <a:t>Field: 12, 9, 12, 10</a:t>
-            </a:r>
-          </a:p>
-          <a:p>
-            <a:r>
-              <a:rPr lang="en-US" dirty="0"/>
-              <a:t>Field seems to have more ant colonies</a:t>
-            </a:r>
-          </a:p>
-          <a:p>
-            <a:endParaRPr lang="en-US" dirty="0"/>
-          </a:p>
-          <a:p>
-            <a:r>
-              <a:rPr lang="en-US" dirty="0"/>
-              <a:t>Could this result be due to chance?</a:t>
-            </a:r>
-          </a:p>
-        </p:txBody>
-      </p:sp>
-    </p:spTree>
-    <p:extLst>
-      <p:ext uri="{BB962C8B-B14F-4D97-AF65-F5344CB8AC3E}">
-        <p14:creationId xmlns:p14="http://schemas.microsoft.com/office/powerpoint/2010/main" val="240158714"/>
-      </p:ext>
-    </p:extLst>
-  </p:cSld>
-  <p:clrMapOvr>
-    <a:masterClrMapping/>
-  </p:clrMapOvr>
-</p:sld>
-</file>
-
 <file path=ppt/slides/slide13.xml><?xml version="1.0" encoding="utf-8"?>
 <p:sld xmlns:a="http://schemas.openxmlformats.org/drawingml/2006/main" xmlns:r="http://schemas.openxmlformats.org/officeDocument/2006/relationships" xmlns:p="http://schemas.openxmlformats.org/presentationml/2006/main">
   <p:cSld>
@@ -4268,7 +4343,7 @@
           <a:p>
             <a:r>
               <a:rPr lang="en-US" dirty="0"/>
-              <a:t>Field and forest ants</a:t>
+              <a:t>Counting ant colonies</a:t>
             </a:r>
           </a:p>
         </p:txBody>
@@ -4290,7 +4365,27 @@
           <a:p>
             <a:r>
               <a:rPr lang="en-US" dirty="0"/>
-              <a:t>Total of 210 possible permutations</a:t>
+              <a:t>We do an exhaustive survey of ant colonies in a forest habitat and an old-field habitat. This is how many colonies we find in each survey plot:</a:t>
+            </a:r>
+          </a:p>
+          <a:p>
+            <a:pPr lvl="1"/>
+            <a:r>
+              <a:rPr lang="en-US" dirty="0"/>
+              <a:t>Forest: 9, 6, 4, 6, 7, 10</a:t>
+            </a:r>
+          </a:p>
+          <a:p>
+            <a:pPr lvl="1"/>
+            <a:r>
+              <a:rPr lang="en-US" dirty="0"/>
+              <a:t>Field: 12, 9, 12, 10</a:t>
+            </a:r>
+          </a:p>
+          <a:p>
+            <a:r>
+              <a:rPr lang="en-US" dirty="0"/>
+              <a:t>Field seems to have more ant colonies</a:t>
             </a:r>
           </a:p>
           <a:p>
@@ -4299,53 +4394,15 @@
           <a:p>
             <a:r>
               <a:rPr lang="en-US" dirty="0"/>
-              <a:t>5 have Field mean - Forest mean  ≥ 3.75</a:t>
-            </a:r>
-          </a:p>
-          <a:p>
-            <a:endParaRPr lang="en-US" dirty="0"/>
-          </a:p>
-          <a:p>
-            <a:r>
-              <a:rPr lang="en-US" dirty="0"/>
-              <a:t>What is our P value?</a:t>
-            </a:r>
-            <a:br>
-              <a:rPr lang="en-US" dirty="0"/>
-            </a:br>
-            <a:br>
-              <a:rPr lang="en-US" dirty="0"/>
-            </a:br>
-            <a:br>
-              <a:rPr lang="en-US" dirty="0"/>
-            </a:br>
-            <a:r>
-              <a:rPr lang="en-US" dirty="0"/>
-              <a:t>(now for the real problem </a:t>
-            </a:r>
-            <a:r>
-              <a:rPr lang="mr-IN" dirty="0"/>
-              <a:t>–</a:t>
-            </a:r>
-            <a:r>
-              <a:rPr lang="en-US" dirty="0"/>
-              <a:t> go to R)</a:t>
-            </a:r>
-            <a:r>
-              <a:rPr lang="mr-IN" dirty="0"/>
-              <a:t>…</a:t>
-            </a:r>
-            <a:br>
-              <a:rPr lang="en-US" dirty="0"/>
-            </a:br>
-            <a:endParaRPr lang="en-US" dirty="0"/>
+              <a:t>Could this result be due to chance?</a:t>
+            </a:r>
           </a:p>
         </p:txBody>
       </p:sp>
     </p:spTree>
     <p:extLst>
       <p:ext uri="{BB962C8B-B14F-4D97-AF65-F5344CB8AC3E}">
-        <p14:creationId xmlns:p14="http://schemas.microsoft.com/office/powerpoint/2010/main" val="495020263"/>
+        <p14:creationId xmlns:p14="http://schemas.microsoft.com/office/powerpoint/2010/main" val="240158714"/>
       </p:ext>
     </p:extLst>
   </p:cSld>
@@ -4389,7 +4446,7 @@
           <a:p>
             <a:r>
               <a:rPr lang="en-US" dirty="0"/>
-              <a:t>Ties and tails</a:t>
+              <a:t>Field and forest ants</a:t>
             </a:r>
           </a:p>
         </p:txBody>
@@ -4406,64 +4463,67 @@
         </p:nvSpPr>
         <p:spPr/>
         <p:txBody>
-          <a:bodyPr>
-            <a:normAutofit lnSpcReduction="10000"/>
-          </a:bodyPr>
-          <a:lstStyle/>
-          <a:p>
-            <a:r>
-              <a:rPr lang="en-US" dirty="0"/>
-              <a:t>“Ties” (permutations with a statistic equal to the observed statistic) “count” against significance</a:t>
-            </a:r>
-          </a:p>
-          <a:p>
-            <a:pPr lvl="1"/>
-            <a:r>
-              <a:rPr lang="en-US" dirty="0"/>
-              <a:t>Ties are evidence against our observation being unusual</a:t>
-            </a:r>
-          </a:p>
-          <a:p>
-            <a:pPr lvl="1"/>
+          <a:bodyPr/>
+          <a:lstStyle/>
+          <a:p>
+            <a:r>
+              <a:rPr lang="en-US" dirty="0"/>
+              <a:t>Total of 210 possible permutations</a:t>
+            </a:r>
+          </a:p>
+          <a:p>
             <a:endParaRPr lang="en-US" dirty="0"/>
           </a:p>
           <a:p>
             <a:r>
-              <a:rPr lang="en-US" i="1" dirty="0"/>
-              <a:t>The jury is out about the best way to calculate a two-tailed p-value</a:t>
-            </a:r>
-          </a:p>
-          <a:p>
-            <a:pPr lvl="1"/>
-            <a:r>
-              <a:rPr lang="en-US" dirty="0"/>
-              <a:t>One way: calculate a one-tailed P-value for the observed effect, and then double the P-value</a:t>
-            </a:r>
-          </a:p>
-          <a:p>
-            <a:pPr lvl="1"/>
-            <a:r>
-              <a:rPr lang="en-US" dirty="0"/>
-              <a:t>Other way: take the absolute value to tally every across both tails</a:t>
-            </a:r>
-          </a:p>
-          <a:p>
-            <a:pPr lvl="1"/>
+              <a:rPr lang="en-US" dirty="0"/>
+              <a:t>5 have Field mean - Forest mean  ≥ 3.75</a:t>
+            </a:r>
+          </a:p>
+          <a:p>
             <a:endParaRPr lang="en-US" dirty="0"/>
           </a:p>
           <a:p>
-            <a:pPr lvl="1"/>
-            <a:r>
-              <a:rPr lang="en-US" dirty="0"/>
-              <a:t>Classic tests assume everything is symmetric, so people often don’t need to think about this point. </a:t>
-            </a:r>
+            <a:r>
+              <a:rPr lang="en-US" dirty="0"/>
+              <a:t>What is our P value?</a:t>
+            </a:r>
+            <a:br>
+              <a:rPr lang="en-US" dirty="0"/>
+            </a:br>
+            <a:br>
+              <a:rPr lang="en-US" dirty="0"/>
+            </a:br>
+            <a:br>
+              <a:rPr lang="en-US" dirty="0"/>
+            </a:br>
+            <a:r>
+              <a:rPr lang="en-US" dirty="0"/>
+              <a:t>(now for the real problem </a:t>
+            </a:r>
+            <a:r>
+              <a:rPr lang="mr-IN" dirty="0"/>
+              <a:t>–</a:t>
+            </a:r>
+            <a:r>
+              <a:rPr lang="en-US" dirty="0"/>
+              <a:t> go to R)</a:t>
+            </a:r>
+            <a:r>
+              <a:rPr lang="mr-IN" dirty="0"/>
+              <a:t>…</a:t>
+            </a:r>
+            <a:br>
+              <a:rPr lang="en-US" dirty="0"/>
+            </a:br>
+            <a:endParaRPr lang="en-US" dirty="0"/>
           </a:p>
         </p:txBody>
       </p:sp>
     </p:spTree>
     <p:extLst>
       <p:ext uri="{BB962C8B-B14F-4D97-AF65-F5344CB8AC3E}">
-        <p14:creationId xmlns:p14="http://schemas.microsoft.com/office/powerpoint/2010/main" val="378878848"/>
+        <p14:creationId xmlns:p14="http://schemas.microsoft.com/office/powerpoint/2010/main" val="495020263"/>
       </p:ext>
     </p:extLst>
   </p:cSld>
@@ -4502,80 +4562,86 @@
         </p:nvSpPr>
         <p:spPr/>
         <p:txBody>
+          <a:bodyPr/>
+          <a:lstStyle/>
+          <a:p>
+            <a:r>
+              <a:rPr lang="en-US" dirty="0"/>
+              <a:t>Ties and tails</a:t>
+            </a:r>
+          </a:p>
+        </p:txBody>
+      </p:sp>
+      <p:sp>
+        <p:nvSpPr>
+          <p:cNvPr id="3" name="Content Placeholder 2"/>
+          <p:cNvSpPr>
+            <a:spLocks noGrp="1"/>
+          </p:cNvSpPr>
+          <p:nvPr>
+            <p:ph idx="1"/>
+          </p:nvPr>
+        </p:nvSpPr>
+        <p:spPr/>
+        <p:txBody>
           <a:bodyPr>
-            <a:normAutofit/>
+            <a:normAutofit lnSpcReduction="10000"/>
           </a:bodyPr>
           <a:lstStyle/>
           <a:p>
             <a:r>
-              <a:rPr lang="en-US" b="1" dirty="0"/>
-              <a:t>Which statistic should we use for permutations?</a:t>
-            </a:r>
+              <a:rPr lang="en-US" dirty="0"/>
+              <a:t>“Ties” (permutations with a statistic equal to the observed statistic) “count” against significance</a:t>
+            </a:r>
+          </a:p>
+          <a:p>
+            <a:pPr lvl="1"/>
+            <a:r>
+              <a:rPr lang="en-US" dirty="0"/>
+              <a:t>Ties are evidence against our observation being unusual</a:t>
+            </a:r>
+          </a:p>
+          <a:p>
+            <a:pPr lvl="1"/>
             <a:endParaRPr lang="en-US" dirty="0"/>
           </a:p>
-        </p:txBody>
-      </p:sp>
-      <p:sp>
-        <p:nvSpPr>
-          <p:cNvPr id="3" name="Content Placeholder 2"/>
-          <p:cNvSpPr>
-            <a:spLocks noGrp="1"/>
-          </p:cNvSpPr>
-          <p:nvPr>
-            <p:ph idx="1"/>
-          </p:nvPr>
-        </p:nvSpPr>
-        <p:spPr/>
-        <p:txBody>
-          <a:bodyPr>
-            <a:normAutofit/>
-          </a:bodyPr>
-          <a:lstStyle/>
-          <a:p>
-            <a:r>
-              <a:rPr lang="en-US" dirty="0"/>
-              <a:t>We can use any statistic we want, and get a valid test</a:t>
+          <a:p>
+            <a:r>
+              <a:rPr lang="en-US" i="1" dirty="0"/>
+              <a:t>The jury is out about the best way to calculate a two-tailed p-value</a:t>
             </a:r>
           </a:p>
           <a:p>
             <a:pPr lvl="1"/>
             <a:r>
-              <a:rPr lang="en-US" sz="2800" dirty="0"/>
-              <a:t>Means tend to have more power than medians</a:t>
+              <a:rPr lang="en-US" dirty="0"/>
+              <a:t>One way: calculate a one-tailed P-value for the observed effect, and then double the P-value</a:t>
             </a:r>
           </a:p>
           <a:p>
             <a:pPr lvl="1"/>
             <a:r>
-              <a:rPr lang="en-US" sz="2800" dirty="0"/>
-              <a:t>Transformations that make the data more normal also tend to increase power</a:t>
+              <a:rPr lang="en-US" dirty="0"/>
+              <a:t>Other way: take the absolute value to tally every across both tails</a:t>
             </a:r>
           </a:p>
           <a:p>
             <a:pPr lvl="1"/>
-            <a:endParaRPr lang="en-US" sz="2800" dirty="0"/>
+            <a:endParaRPr lang="en-US" dirty="0"/>
           </a:p>
           <a:p>
             <a:pPr lvl="1"/>
             <a:r>
-              <a:rPr lang="en-US" sz="2800" dirty="0"/>
-              <a:t>Using the geometric mean is equivalent to what transformation?</a:t>
-            </a:r>
-          </a:p>
-          <a:p>
-            <a:pPr lvl="1"/>
-            <a:endParaRPr lang="en-US" sz="2800" dirty="0"/>
-          </a:p>
-          <a:p>
-            <a:pPr lvl="1"/>
-            <a:endParaRPr lang="en-US" sz="2800" dirty="0"/>
+              <a:rPr lang="en-US" dirty="0"/>
+              <a:t>Classic tests assume everything is symmetric, so people often don’t need to think about this point. </a:t>
+            </a:r>
           </a:p>
         </p:txBody>
       </p:sp>
     </p:spTree>
     <p:extLst>
       <p:ext uri="{BB962C8B-B14F-4D97-AF65-F5344CB8AC3E}">
-        <p14:creationId xmlns:p14="http://schemas.microsoft.com/office/powerpoint/2010/main" val="1983758822"/>
+        <p14:creationId xmlns:p14="http://schemas.microsoft.com/office/powerpoint/2010/main" val="378878848"/>
       </p:ext>
     </p:extLst>
   </p:cSld>
@@ -4614,61 +4680,80 @@
         </p:nvSpPr>
         <p:spPr/>
         <p:txBody>
-          <a:bodyPr/>
-          <a:lstStyle/>
-          <a:p>
-            <a:r>
-              <a:rPr lang="en-US" dirty="0"/>
-              <a:t>Permutation Power</a:t>
-            </a:r>
-          </a:p>
-        </p:txBody>
-      </p:sp>
-      <p:sp>
-        <p:nvSpPr>
-          <p:cNvPr id="3" name="Content Placeholder 2"/>
-          <p:cNvSpPr>
-            <a:spLocks noGrp="1"/>
-          </p:cNvSpPr>
-          <p:nvPr>
-            <p:ph idx="1"/>
-          </p:nvPr>
-        </p:nvSpPr>
-        <p:spPr/>
-        <p:txBody>
           <a:bodyPr>
             <a:normAutofit/>
           </a:bodyPr>
           <a:lstStyle/>
           <a:p>
             <a:r>
-              <a:rPr lang="en-US" sz="4000" dirty="0"/>
-              <a:t>You can test anything, if you can:</a:t>
+              <a:rPr lang="en-US" b="1" dirty="0"/>
+              <a:t>Which statistic should we use for permutations?</a:t>
+            </a:r>
+            <a:endParaRPr lang="en-US" dirty="0"/>
+          </a:p>
+        </p:txBody>
+      </p:sp>
+      <p:sp>
+        <p:nvSpPr>
+          <p:cNvPr id="3" name="Content Placeholder 2"/>
+          <p:cNvSpPr>
+            <a:spLocks noGrp="1"/>
+          </p:cNvSpPr>
+          <p:nvPr>
+            <p:ph idx="1"/>
+          </p:nvPr>
+        </p:nvSpPr>
+        <p:spPr/>
+        <p:txBody>
+          <a:bodyPr>
+            <a:normAutofit/>
+          </a:bodyPr>
+          <a:lstStyle/>
+          <a:p>
+            <a:r>
+              <a:rPr lang="en-US" dirty="0"/>
+              <a:t>We can use any statistic we want, and get a valid test</a:t>
             </a:r>
           </a:p>
           <a:p>
             <a:pPr lvl="1"/>
             <a:r>
-              <a:rPr lang="en-US" sz="4000" dirty="0"/>
-              <a:t>Measure it with a statistic</a:t>
+              <a:rPr lang="en-US" sz="2800" dirty="0"/>
+              <a:t>Means tend to have more power than medians</a:t>
             </a:r>
           </a:p>
           <a:p>
             <a:pPr lvl="1"/>
             <a:r>
-              <a:rPr lang="en-US" sz="4000" dirty="0"/>
-              <a:t>Come up with a permutation approach that reflects a scientific question</a:t>
-            </a:r>
-          </a:p>
-          <a:p>
-            <a:endParaRPr lang="en-US" sz="4000" dirty="0"/>
+              <a:rPr lang="en-US" sz="2800" dirty="0"/>
+              <a:t>Transformations that make the data more normal also tend to increase power</a:t>
+            </a:r>
+          </a:p>
+          <a:p>
+            <a:pPr lvl="1"/>
+            <a:endParaRPr lang="en-US" sz="2800" dirty="0"/>
+          </a:p>
+          <a:p>
+            <a:pPr lvl="1"/>
+            <a:r>
+              <a:rPr lang="en-US" sz="2800" dirty="0"/>
+              <a:t>Using the geometric mean is equivalent to what transformation?</a:t>
+            </a:r>
+          </a:p>
+          <a:p>
+            <a:pPr lvl="1"/>
+            <a:endParaRPr lang="en-US" sz="2800" dirty="0"/>
+          </a:p>
+          <a:p>
+            <a:pPr lvl="1"/>
+            <a:endParaRPr lang="en-US" sz="2800" dirty="0"/>
           </a:p>
         </p:txBody>
       </p:sp>
     </p:spTree>
     <p:extLst>
       <p:ext uri="{BB962C8B-B14F-4D97-AF65-F5344CB8AC3E}">
-        <p14:creationId xmlns:p14="http://schemas.microsoft.com/office/powerpoint/2010/main" val="1136291904"/>
+        <p14:creationId xmlns:p14="http://schemas.microsoft.com/office/powerpoint/2010/main" val="1983758822"/>
       </p:ext>
     </p:extLst>
   </p:cSld>
@@ -4712,7 +4797,7 @@
           <a:p>
             <a:r>
               <a:rPr lang="en-US" dirty="0"/>
-              <a:t>A little more about permutations</a:t>
+              <a:t>Permutation Power</a:t>
             </a:r>
           </a:p>
         </p:txBody>
@@ -4729,100 +4814,39 @@
         </p:nvSpPr>
         <p:spPr/>
         <p:txBody>
-          <a:bodyPr/>
-          <a:lstStyle/>
-          <a:p>
-            <a:r>
-              <a:rPr lang="en-US" dirty="0"/>
-              <a:t>There are packages for doing permutations </a:t>
-            </a:r>
-            <a:r>
-              <a:rPr lang="mr-IN" dirty="0"/>
-              <a:t>–</a:t>
-            </a:r>
-            <a:r>
-              <a:rPr lang="en-US" dirty="0"/>
-              <a:t> coin is one</a:t>
+          <a:bodyPr>
+            <a:normAutofit/>
+          </a:bodyPr>
+          <a:lstStyle/>
+          <a:p>
+            <a:r>
+              <a:rPr lang="en-US" sz="4000" dirty="0"/>
+              <a:t>You can test anything, if you can:</a:t>
             </a:r>
           </a:p>
           <a:p>
             <a:pPr lvl="1"/>
             <a:r>
-              <a:rPr lang="en-US" dirty="0"/>
-              <a:t>This package is very powerful (and a bit complicated)</a:t>
+              <a:rPr lang="en-US" sz="4000" dirty="0"/>
+              <a:t>Measure it with a statistic</a:t>
             </a:r>
           </a:p>
           <a:p>
             <a:pPr lvl="1"/>
-            <a:endParaRPr lang="en-US" dirty="0"/>
-          </a:p>
-          <a:p>
-            <a:r>
-              <a:rPr lang="en-US" dirty="0"/>
-              <a:t>They will ask you to choose a type of p-value </a:t>
-            </a:r>
-          </a:p>
-          <a:p>
-            <a:r>
-              <a:rPr lang="en-US" b="1" dirty="0" err="1"/>
-              <a:t>oneway_test</a:t>
-            </a:r>
-            <a:r>
-              <a:rPr lang="en-US" dirty="0"/>
-              <a:t>(</a:t>
-            </a:r>
-            <a:r>
-              <a:rPr lang="en-US" dirty="0" err="1"/>
-              <a:t>colonies~place,data</a:t>
-            </a:r>
-            <a:r>
-              <a:rPr lang="en-US" dirty="0"/>
-              <a:t>=</a:t>
-            </a:r>
-            <a:r>
-              <a:rPr lang="en-US" dirty="0" err="1"/>
-              <a:t>ants,distribution</a:t>
-            </a:r>
-            <a:r>
-              <a:rPr lang="en-US" dirty="0"/>
-              <a:t>=</a:t>
-            </a:r>
-            <a:r>
-              <a:rPr lang="en-US" b="1" dirty="0"/>
-              <a:t>approximate</a:t>
-            </a:r>
-            <a:r>
-              <a:rPr lang="en-US" dirty="0"/>
-              <a:t>(B=9999))</a:t>
-            </a:r>
-          </a:p>
-          <a:p>
-            <a:pPr lvl="1"/>
-            <a:r>
-              <a:rPr lang="en-US" dirty="0"/>
-              <a:t>This should be equivalent to our simulation method</a:t>
-            </a:r>
-          </a:p>
-          <a:p>
-            <a:pPr lvl="1"/>
-            <a:r>
-              <a:rPr lang="en-US" dirty="0"/>
-              <a:t>My opinion: Brute force methods (e.g. writing a loop) still provide a more explicit way to do permutations</a:t>
-            </a:r>
-            <a:br>
-              <a:rPr lang="en-US" dirty="0"/>
-            </a:br>
-            <a:endParaRPr lang="en-US" dirty="0"/>
-          </a:p>
-          <a:p>
-            <a:endParaRPr lang="en-US" dirty="0"/>
+            <a:r>
+              <a:rPr lang="en-US" sz="4000" dirty="0"/>
+              <a:t>Come up with a permutation approach that reflects a scientific question</a:t>
+            </a:r>
+          </a:p>
+          <a:p>
+            <a:endParaRPr lang="en-US" sz="4000" dirty="0"/>
           </a:p>
         </p:txBody>
       </p:sp>
     </p:spTree>
     <p:extLst>
       <p:ext uri="{BB962C8B-B14F-4D97-AF65-F5344CB8AC3E}">
-        <p14:creationId xmlns:p14="http://schemas.microsoft.com/office/powerpoint/2010/main" val="811180735"/>
+        <p14:creationId xmlns:p14="http://schemas.microsoft.com/office/powerpoint/2010/main" val="1136291904"/>
       </p:ext>
     </p:extLst>
   </p:cSld>
@@ -4866,7 +4890,7 @@
           <a:p>
             <a:r>
               <a:rPr lang="en-US" dirty="0"/>
-              <a:t>Permutation Summary</a:t>
+              <a:t>A little more about permutations</a:t>
             </a:r>
           </a:p>
         </p:txBody>
@@ -4883,66 +4907,90 @@
         </p:nvSpPr>
         <p:spPr/>
         <p:txBody>
-          <a:bodyPr>
-            <a:normAutofit fontScale="92500" lnSpcReduction="20000"/>
-          </a:bodyPr>
-          <a:lstStyle/>
-          <a:p>
-            <a:r>
-              <a:rPr lang="en-US" dirty="0"/>
-              <a:t>Advantages</a:t>
-            </a:r>
-          </a:p>
-          <a:p>
-            <a:r>
-              <a:rPr lang="en-US" dirty="0"/>
-              <a:t>General applicability</a:t>
-            </a:r>
-          </a:p>
-          <a:p>
-            <a:r>
-              <a:rPr lang="en-US" dirty="0"/>
-              <a:t>Conceptual clarity</a:t>
-            </a:r>
-          </a:p>
-          <a:p>
-            <a:r>
-              <a:rPr lang="en-US" dirty="0"/>
-              <a:t>Flexibility</a:t>
-            </a:r>
-          </a:p>
-          <a:p>
-            <a:r>
-              <a:rPr lang="en-US" dirty="0"/>
-              <a:t>Fewer assumptions</a:t>
-            </a:r>
-          </a:p>
-          <a:p>
+          <a:bodyPr/>
+          <a:lstStyle/>
+          <a:p>
+            <a:r>
+              <a:rPr lang="en-US" dirty="0"/>
+              <a:t>There are packages for doing permutations </a:t>
+            </a:r>
+            <a:r>
+              <a:rPr lang="mr-IN" dirty="0"/>
+              <a:t>–</a:t>
+            </a:r>
+            <a:r>
+              <a:rPr lang="en-US" dirty="0"/>
+              <a:t> coin is one</a:t>
+            </a:r>
+          </a:p>
+          <a:p>
+            <a:pPr lvl="1"/>
+            <a:r>
+              <a:rPr lang="en-US" dirty="0"/>
+              <a:t>This package is very powerful (and a bit complicated)</a:t>
+            </a:r>
+          </a:p>
+          <a:p>
+            <a:pPr lvl="1"/>
             <a:endParaRPr lang="en-US" dirty="0"/>
           </a:p>
           <a:p>
             <a:r>
               <a:rPr lang="en-US" dirty="0"/>
-              <a:t>Disadvantages</a:t>
-            </a:r>
-          </a:p>
-          <a:p>
-            <a:r>
-              <a:rPr lang="en-US" dirty="0"/>
-              <a:t>Hard to implement</a:t>
-            </a:r>
-          </a:p>
-          <a:p>
-            <a:r>
-              <a:rPr lang="en-US" dirty="0"/>
-              <a:t>May take a lot of computer time</a:t>
-            </a:r>
-          </a:p>
-          <a:p>
-            <a:r>
-              <a:rPr lang="en-US" dirty="0"/>
-              <a:t>May be hard to obtain confidence intervals without distributional assumptions</a:t>
-            </a:r>
+              <a:t>They will ask you to choose a type of p-value </a:t>
+            </a:r>
+          </a:p>
+          <a:p>
+            <a:r>
+              <a:rPr lang="en-US" b="1" dirty="0" err="1"/>
+              <a:t>oneway_test</a:t>
+            </a:r>
+            <a:r>
+              <a:rPr lang="en-US" dirty="0"/>
+              <a:t>(</a:t>
+            </a:r>
+            <a:r>
+              <a:rPr lang="en-US" dirty="0" err="1"/>
+              <a:t>colonies~place,data</a:t>
+            </a:r>
+            <a:r>
+              <a:rPr lang="en-US" dirty="0"/>
+              <a:t>=</a:t>
+            </a:r>
+            <a:r>
+              <a:rPr lang="en-US" dirty="0" err="1"/>
+              <a:t>ants,distribution</a:t>
+            </a:r>
+            <a:r>
+              <a:rPr lang="en-US" dirty="0"/>
+              <a:t>=</a:t>
+            </a:r>
+            <a:r>
+              <a:rPr lang="en-US" b="1" dirty="0"/>
+              <a:t>approximate</a:t>
+            </a:r>
+            <a:r>
+              <a:rPr lang="en-US" dirty="0"/>
+              <a:t>(B=9999))</a:t>
+            </a:r>
+          </a:p>
+          <a:p>
+            <a:pPr lvl="1"/>
+            <a:r>
+              <a:rPr lang="en-US" dirty="0"/>
+              <a:t>This should be equivalent to our simulation method</a:t>
+            </a:r>
+          </a:p>
+          <a:p>
+            <a:pPr lvl="1"/>
+            <a:r>
+              <a:rPr lang="en-US" dirty="0"/>
+              <a:t>My opinion: Brute force methods (e.g. writing a loop) still provide a more explicit way to do permutations</a:t>
+            </a:r>
+            <a:br>
+              <a:rPr lang="en-US" dirty="0"/>
+            </a:br>
+            <a:endParaRPr lang="en-US" dirty="0"/>
           </a:p>
           <a:p>
             <a:endParaRPr lang="en-US" dirty="0"/>
@@ -4952,7 +5000,7 @@
     </p:spTree>
     <p:extLst>
       <p:ext uri="{BB962C8B-B14F-4D97-AF65-F5344CB8AC3E}">
-        <p14:creationId xmlns:p14="http://schemas.microsoft.com/office/powerpoint/2010/main" val="1856310743"/>
+        <p14:creationId xmlns:p14="http://schemas.microsoft.com/office/powerpoint/2010/main" val="811180735"/>
       </p:ext>
     </p:extLst>
   </p:cSld>
@@ -4981,13 +5029,7 @@
       </p:grpSpPr>
       <p:sp>
         <p:nvSpPr>
-          <p:cNvPr id="2" name="Title 1">
-            <a:extLst>
-              <a:ext uri="{FF2B5EF4-FFF2-40B4-BE49-F238E27FC236}">
-                <a16:creationId xmlns:a16="http://schemas.microsoft.com/office/drawing/2014/main" id="{59A3B0B6-FF46-2248-87C1-42576F4061CB}"/>
-              </a:ext>
-            </a:extLst>
-          </p:cNvPr>
+          <p:cNvPr id="2" name="Title 1"/>
           <p:cNvSpPr>
             <a:spLocks noGrp="1"/>
           </p:cNvSpPr>
@@ -5002,20 +5044,14 @@
           <a:p>
             <a:r>
               <a:rPr lang="en-US" dirty="0"/>
-              <a:t>“Classical” tests</a:t>
-            </a:r>
-          </a:p>
-        </p:txBody>
-      </p:sp>
-      <p:sp>
-        <p:nvSpPr>
-          <p:cNvPr id="3" name="Content Placeholder 2">
-            <a:extLst>
-              <a:ext uri="{FF2B5EF4-FFF2-40B4-BE49-F238E27FC236}">
-                <a16:creationId xmlns:a16="http://schemas.microsoft.com/office/drawing/2014/main" id="{0F57B95E-DFBD-A64E-A691-6375B64E9341}"/>
-              </a:ext>
-            </a:extLst>
-          </p:cNvPr>
+              <a:t>Permutation Summary</a:t>
+            </a:r>
+          </a:p>
+        </p:txBody>
+      </p:sp>
+      <p:sp>
+        <p:nvSpPr>
+          <p:cNvPr id="3" name="Content Placeholder 2"/>
           <p:cNvSpPr>
             <a:spLocks noGrp="1"/>
           </p:cNvSpPr>
@@ -5025,12 +5061,38 @@
         </p:nvSpPr>
         <p:spPr/>
         <p:txBody>
-          <a:bodyPr/>
-          <a:lstStyle/>
-          <a:p>
-            <a:r>
-              <a:rPr lang="en-US" dirty="0"/>
-              <a:t>There are lots of pre-packaged tests implemented in R</a:t>
+          <a:bodyPr>
+            <a:normAutofit fontScale="92500" lnSpcReduction="20000"/>
+          </a:bodyPr>
+          <a:lstStyle/>
+          <a:p>
+            <a:r>
+              <a:rPr lang="en-US" dirty="0"/>
+              <a:t>Advantages</a:t>
+            </a:r>
+          </a:p>
+          <a:p>
+            <a:r>
+              <a:rPr lang="en-US" dirty="0"/>
+              <a:t>General applicability</a:t>
+            </a:r>
+          </a:p>
+          <a:p>
+            <a:r>
+              <a:rPr lang="en-US" dirty="0"/>
+              <a:t>Conceptual clarity</a:t>
+            </a:r>
+          </a:p>
+          <a:p>
+            <a:r>
+              <a:rPr lang="en-US" dirty="0"/>
+              <a:t>Flexibility</a:t>
+            </a:r>
+          </a:p>
+          <a:p>
+            <a:r>
+              <a:rPr lang="en-US" dirty="0"/>
+              <a:t>Fewer assumptions</a:t>
             </a:r>
           </a:p>
           <a:p>
@@ -5039,23 +5101,36 @@
           <a:p>
             <a:r>
               <a:rPr lang="en-US" dirty="0"/>
-              <a:t>We’ll talk about some of the commonly used ones and leave the rest for you to review on your own in the </a:t>
-            </a:r>
-            <a:r>
-              <a:rPr lang="en-US" dirty="0" err="1"/>
-              <a:t>powerpoint</a:t>
-            </a:r>
-            <a:r>
-              <a:rPr lang="en-US" dirty="0"/>
-              <a:t> slides</a:t>
-            </a:r>
+              <a:t>Disadvantages</a:t>
+            </a:r>
+          </a:p>
+          <a:p>
+            <a:r>
+              <a:rPr lang="en-US" dirty="0"/>
+              <a:t>Hard to implement</a:t>
+            </a:r>
+          </a:p>
+          <a:p>
+            <a:r>
+              <a:rPr lang="en-US" dirty="0"/>
+              <a:t>May take a lot of computer time</a:t>
+            </a:r>
+          </a:p>
+          <a:p>
+            <a:r>
+              <a:rPr lang="en-US" dirty="0"/>
+              <a:t>May be hard to obtain confidence intervals without distributional assumptions</a:t>
+            </a:r>
+          </a:p>
+          <a:p>
+            <a:endParaRPr lang="en-US" dirty="0"/>
           </a:p>
         </p:txBody>
       </p:sp>
     </p:spTree>
     <p:extLst>
       <p:ext uri="{BB962C8B-B14F-4D97-AF65-F5344CB8AC3E}">
-        <p14:creationId xmlns:p14="http://schemas.microsoft.com/office/powerpoint/2010/main" val="3544176793"/>
+        <p14:creationId xmlns:p14="http://schemas.microsoft.com/office/powerpoint/2010/main" val="1856310743"/>
       </p:ext>
     </p:extLst>
   </p:cSld>
@@ -5084,7 +5159,13 @@
       </p:grpSpPr>
       <p:sp>
         <p:nvSpPr>
-          <p:cNvPr id="2" name="Title 1"/>
+          <p:cNvPr id="2" name="Title 1">
+            <a:extLst>
+              <a:ext uri="{FF2B5EF4-FFF2-40B4-BE49-F238E27FC236}">
+                <a16:creationId xmlns:a16="http://schemas.microsoft.com/office/drawing/2014/main" id="{4F5D406E-281C-5C4A-8BA6-891C8EA636C9}"/>
+              </a:ext>
+            </a:extLst>
+          </p:cNvPr>
           <p:cNvSpPr>
             <a:spLocks noGrp="1"/>
           </p:cNvSpPr>
@@ -5099,14 +5180,20 @@
           <a:p>
             <a:r>
               <a:rPr lang="en-US" dirty="0"/>
-              <a:t>Goals</a:t>
-            </a:r>
-          </a:p>
-        </p:txBody>
-      </p:sp>
-      <p:sp>
-        <p:nvSpPr>
-          <p:cNvPr id="3" name="Content Placeholder 2"/>
+              <a:t>Announcement</a:t>
+            </a:r>
+          </a:p>
+        </p:txBody>
+      </p:sp>
+      <p:sp>
+        <p:nvSpPr>
+          <p:cNvPr id="3" name="Content Placeholder 2">
+            <a:extLst>
+              <a:ext uri="{FF2B5EF4-FFF2-40B4-BE49-F238E27FC236}">
+                <a16:creationId xmlns:a16="http://schemas.microsoft.com/office/drawing/2014/main" id="{5E2672F1-4933-1E40-B076-522CC527E0A1}"/>
+              </a:ext>
+            </a:extLst>
+          </p:cNvPr>
           <p:cNvSpPr>
             <a:spLocks noGrp="1"/>
           </p:cNvSpPr>
@@ -5116,38 +5203,135 @@
         </p:nvSpPr>
         <p:spPr/>
         <p:txBody>
-          <a:bodyPr/>
-          <a:lstStyle/>
-          <a:p>
-            <a:r>
-              <a:rPr lang="en-US" dirty="0"/>
-              <a:t>Understand  several commonly used “tests” in ecology and evolutionary biology and how to perform them in R</a:t>
-            </a:r>
-          </a:p>
-          <a:p>
+          <a:bodyPr>
+            <a:normAutofit fontScale="92500" lnSpcReduction="10000"/>
+          </a:bodyPr>
+          <a:lstStyle/>
+          <a:p>
+            <a:r>
+              <a:rPr lang="en-US" dirty="0"/>
+              <a:t>Canceled classes:</a:t>
+            </a:r>
+          </a:p>
+          <a:p>
+            <a:pPr lvl="1"/>
+            <a:r>
+              <a:rPr lang="en-US" dirty="0"/>
+              <a:t>Thursday Feb 27</a:t>
+            </a:r>
+            <a:r>
+              <a:rPr lang="en-US" baseline="30000" dirty="0"/>
+              <a:t>th</a:t>
+            </a:r>
+            <a:r>
+              <a:rPr lang="en-US" dirty="0"/>
+              <a:t> </a:t>
+            </a:r>
+            <a:r>
+              <a:rPr lang="en-US" b="1" dirty="0"/>
+              <a:t>class will not be held</a:t>
+            </a:r>
+          </a:p>
+          <a:p>
+            <a:pPr lvl="1"/>
+            <a:r>
+              <a:rPr lang="en-US" dirty="0"/>
+              <a:t>Tuesday March 3</a:t>
+            </a:r>
+            <a:r>
+              <a:rPr lang="en-US" baseline="30000" dirty="0"/>
+              <a:t>rd</a:t>
+            </a:r>
+            <a:r>
+              <a:rPr lang="en-US" dirty="0"/>
+              <a:t> </a:t>
+            </a:r>
+            <a:r>
+              <a:rPr lang="en-US" b="1" dirty="0"/>
+              <a:t>class will not be held</a:t>
+            </a:r>
+            <a:br>
+              <a:rPr lang="en-US" b="1" dirty="0"/>
+            </a:br>
+            <a:endParaRPr lang="en-US" b="1" dirty="0"/>
+          </a:p>
+          <a:p>
+            <a:pPr lvl="1"/>
+            <a:r>
+              <a:rPr lang="en-US" dirty="0"/>
+              <a:t>Use this time to read:</a:t>
+            </a:r>
+          </a:p>
+          <a:p>
+            <a:pPr lvl="2"/>
+            <a:r>
+              <a:rPr lang="en-US" dirty="0"/>
+              <a:t>1) Chapter on Distributions from Ben </a:t>
+            </a:r>
+            <a:r>
+              <a:rPr lang="en-US" dirty="0" err="1"/>
+              <a:t>Bolkers</a:t>
+            </a:r>
+            <a:r>
+              <a:rPr lang="en-US" dirty="0"/>
+              <a:t> book (posted)</a:t>
+            </a:r>
+          </a:p>
+          <a:p>
+            <a:pPr lvl="3"/>
+            <a:r>
+              <a:rPr lang="en-US" dirty="0"/>
+              <a:t>There will be a short quiz activity on canvas</a:t>
+            </a:r>
+          </a:p>
+          <a:p>
+            <a:pPr lvl="2"/>
+            <a:r>
+              <a:rPr lang="en-US" dirty="0"/>
+              <a:t>2) </a:t>
+            </a:r>
+            <a:r>
+              <a:rPr lang="en-US" dirty="0" err="1"/>
+              <a:t>Felsenstein</a:t>
+            </a:r>
+            <a:r>
+              <a:rPr lang="en-US" dirty="0"/>
+              <a:t> 1985 Am Nat (posted)</a:t>
+            </a:r>
+          </a:p>
+          <a:p>
+            <a:pPr lvl="2"/>
+            <a:r>
+              <a:rPr lang="en-US" dirty="0"/>
+              <a:t>3) Vote (on Tuesday)</a:t>
+            </a:r>
+          </a:p>
+          <a:p>
+            <a:pPr marL="914400" lvl="2" indent="0">
+              <a:buNone/>
+            </a:pPr>
+            <a:br>
+              <a:rPr lang="en-US" dirty="0"/>
+            </a:br>
             <a:endParaRPr lang="en-US" dirty="0"/>
           </a:p>
           <a:p>
-            <a:r>
-              <a:rPr lang="en-US" dirty="0"/>
-              <a:t>Understand permutation tests in relation to these other tests and be able to apply them to your data</a:t>
-            </a:r>
-          </a:p>
-          <a:p>
-            <a:endParaRPr lang="en-US" dirty="0"/>
-          </a:p>
-          <a:p>
-            <a:r>
-              <a:rPr lang="en-US" dirty="0"/>
-              <a:t>Begin to build a dichotomous key of statistical approaches for application to datasets</a:t>
-            </a:r>
+            <a:pPr lvl="1"/>
+            <a:r>
+              <a:rPr lang="en-US" b="1" u="sng" dirty="0"/>
+              <a:t>Thursday Mar 5th class: Dr. Josef Uyeda discussing working with phylogenies in R</a:t>
+            </a:r>
+            <a:br>
+              <a:rPr lang="en-US" b="1" u="sng" dirty="0"/>
+            </a:br>
+            <a:endParaRPr lang="en-US" b="1" u="sng" dirty="0"/>
           </a:p>
         </p:txBody>
       </p:sp>
     </p:spTree>
     <p:extLst>
       <p:ext uri="{BB962C8B-B14F-4D97-AF65-F5344CB8AC3E}">
-        <p14:creationId xmlns:p14="http://schemas.microsoft.com/office/powerpoint/2010/main" val="1387291854"/>
+        <p14:creationId xmlns:p14="http://schemas.microsoft.com/office/powerpoint/2010/main" val="127835531"/>
       </p:ext>
     </p:extLst>
   </p:cSld>
@@ -5176,7 +5360,13 @@
       </p:grpSpPr>
       <p:sp>
         <p:nvSpPr>
-          <p:cNvPr id="2" name="Title 1"/>
+          <p:cNvPr id="2" name="Title 1">
+            <a:extLst>
+              <a:ext uri="{FF2B5EF4-FFF2-40B4-BE49-F238E27FC236}">
+                <a16:creationId xmlns:a16="http://schemas.microsoft.com/office/drawing/2014/main" id="{59A3B0B6-FF46-2248-87C1-42576F4061CB}"/>
+              </a:ext>
+            </a:extLst>
+          </p:cNvPr>
           <p:cNvSpPr>
             <a:spLocks noGrp="1"/>
           </p:cNvSpPr>
@@ -5191,14 +5381,20 @@
           <a:p>
             <a:r>
               <a:rPr lang="en-US" dirty="0"/>
-              <a:t>T-test (two-sample, one-sample, paired)</a:t>
-            </a:r>
-          </a:p>
-        </p:txBody>
-      </p:sp>
-      <p:sp>
-        <p:nvSpPr>
-          <p:cNvPr id="3" name="Content Placeholder 2"/>
+              <a:t>“Classical” tests</a:t>
+            </a:r>
+          </a:p>
+        </p:txBody>
+      </p:sp>
+      <p:sp>
+        <p:nvSpPr>
+          <p:cNvPr id="3" name="Content Placeholder 2">
+            <a:extLst>
+              <a:ext uri="{FF2B5EF4-FFF2-40B4-BE49-F238E27FC236}">
+                <a16:creationId xmlns:a16="http://schemas.microsoft.com/office/drawing/2014/main" id="{0F57B95E-DFBD-A64E-A691-6375B64E9341}"/>
+              </a:ext>
+            </a:extLst>
+          </p:cNvPr>
           <p:cNvSpPr>
             <a:spLocks noGrp="1"/>
           </p:cNvSpPr>
@@ -5208,67 +5404,29 @@
         </p:nvSpPr>
         <p:spPr/>
         <p:txBody>
-          <a:bodyPr>
-            <a:normAutofit fontScale="85000" lnSpcReduction="20000"/>
-          </a:bodyPr>
-          <a:lstStyle/>
-          <a:p>
-            <a:r>
-              <a:rPr lang="en-US" dirty="0"/>
-              <a:t>Two-sample: Used to ask if two means are significantly different</a:t>
-            </a:r>
-          </a:p>
-          <a:p>
-            <a:pPr lvl="1"/>
-            <a:r>
-              <a:rPr lang="en-US" dirty="0"/>
-              <a:t>Often called a Student’s t-test, unpaired t-test, or independent samples t-test</a:t>
-            </a:r>
-          </a:p>
-          <a:p>
-            <a:pPr lvl="1"/>
+          <a:bodyPr/>
+          <a:lstStyle/>
+          <a:p>
+            <a:r>
+              <a:rPr lang="en-US" dirty="0"/>
+              <a:t>There are lots of pre-packaged tests implemented in R</a:t>
+            </a:r>
+          </a:p>
+          <a:p>
             <a:endParaRPr lang="en-US" dirty="0"/>
           </a:p>
           <a:p>
             <a:r>
               <a:rPr lang="en-US" dirty="0"/>
-              <a:t>One-sample: Used to ask if one thing is significantly different from some value (e.g. confidence intervals)</a:t>
-            </a:r>
-          </a:p>
-          <a:p>
-            <a:endParaRPr lang="en-US" dirty="0"/>
-          </a:p>
-          <a:p>
-            <a:r>
-              <a:rPr lang="en-US" dirty="0"/>
-              <a:t>Paired: Used to ask if two samples from the same “unit” (e.g. plot, person, site) are significantly different</a:t>
-            </a:r>
-          </a:p>
-          <a:p>
-            <a:pPr lvl="1"/>
-            <a:r>
-              <a:rPr lang="en-US" dirty="0"/>
-              <a:t>E.g. Was bat infection on more or less after our treatment?</a:t>
-            </a:r>
-          </a:p>
-          <a:p>
-            <a:pPr lvl="1"/>
-            <a:r>
-              <a:rPr lang="en-US" dirty="0"/>
-              <a:t>The unit could be an individual bat, (e.g. Susie before treatment or Susie after treatment) OR the unit could be prevalence of infection at a site (e.g. Bear Cave before and after treatment)</a:t>
-            </a:r>
-          </a:p>
-          <a:p>
-            <a:pPr lvl="1"/>
-            <a:r>
-              <a:rPr lang="en-US" dirty="0"/>
-              <a:t>The many units would then be 15 bats measured before and after treatment, or 15 caves measured before and after treatment</a:t>
-            </a:r>
-          </a:p>
-          <a:p>
-            <a:r>
-              <a:rPr lang="en-US" dirty="0"/>
-              <a:t>To use a T-test, each of the two populations should follow a normal distribution</a:t>
+              <a:t>We’ll talk about some of the commonly used ones and leave the rest for you to review on your own in the </a:t>
+            </a:r>
+            <a:r>
+              <a:rPr lang="en-US" dirty="0" err="1"/>
+              <a:t>powerpoint</a:t>
+            </a:r>
+            <a:r>
+              <a:rPr lang="en-US" dirty="0"/>
+              <a:t> slides</a:t>
             </a:r>
           </a:p>
         </p:txBody>
@@ -5276,7 +5434,7 @@
     </p:spTree>
     <p:extLst>
       <p:ext uri="{BB962C8B-B14F-4D97-AF65-F5344CB8AC3E}">
-        <p14:creationId xmlns:p14="http://schemas.microsoft.com/office/powerpoint/2010/main" val="1227985366"/>
+        <p14:creationId xmlns:p14="http://schemas.microsoft.com/office/powerpoint/2010/main" val="3544176793"/>
       </p:ext>
     </p:extLst>
   </p:cSld>
@@ -5320,7 +5478,7 @@
           <a:p>
             <a:r>
               <a:rPr lang="en-US" dirty="0"/>
-              <a:t>T-test variance</a:t>
+              <a:t>T-test (two-sample, one-sample, paired)</a:t>
             </a:r>
           </a:p>
         </p:txBody>
@@ -5337,21 +5495,67 @@
         </p:nvSpPr>
         <p:spPr/>
         <p:txBody>
-          <a:bodyPr/>
-          <a:lstStyle/>
-          <a:p>
-            <a:r>
-              <a:rPr lang="en-US" dirty="0"/>
-              <a:t>A slightly silly nuance is that a classical student’s t-test assumes variances are also equal</a:t>
-            </a:r>
-          </a:p>
-          <a:p>
+          <a:bodyPr>
+            <a:normAutofit fontScale="85000" lnSpcReduction="20000"/>
+          </a:bodyPr>
+          <a:lstStyle/>
+          <a:p>
+            <a:r>
+              <a:rPr lang="en-US" dirty="0"/>
+              <a:t>Two-sample: Used to ask if two means are significantly different</a:t>
+            </a:r>
+          </a:p>
+          <a:p>
+            <a:pPr lvl="1"/>
+            <a:r>
+              <a:rPr lang="en-US" dirty="0"/>
+              <a:t>Often called a Student’s t-test, unpaired t-test, or independent samples t-test</a:t>
+            </a:r>
+          </a:p>
+          <a:p>
+            <a:pPr lvl="1"/>
             <a:endParaRPr lang="en-US" dirty="0"/>
           </a:p>
           <a:p>
             <a:r>
               <a:rPr lang="en-US" dirty="0"/>
-              <a:t>If you don’t want to add that assumption, you are technically doing Welch’s t-test (and this is the default in R)</a:t>
+              <a:t>One-sample: Used to ask if one thing is significantly different from some value (e.g. confidence intervals)</a:t>
+            </a:r>
+          </a:p>
+          <a:p>
+            <a:endParaRPr lang="en-US" dirty="0"/>
+          </a:p>
+          <a:p>
+            <a:r>
+              <a:rPr lang="en-US" dirty="0"/>
+              <a:t>Paired: Used to ask if two samples from the same “unit” (e.g. plot, person, site) are significantly different</a:t>
+            </a:r>
+          </a:p>
+          <a:p>
+            <a:pPr lvl="1"/>
+            <a:r>
+              <a:rPr lang="en-US" dirty="0"/>
+              <a:t>E.g. Was bat infection on more or less after our treatment?</a:t>
+            </a:r>
+          </a:p>
+          <a:p>
+            <a:pPr lvl="1"/>
+            <a:r>
+              <a:rPr lang="en-US" dirty="0"/>
+              <a:t>The unit could be an individual bat, (e.g. Susie before treatment or Susie after treatment) OR the unit could be prevalence of infection at a site (e.g. Bear Cave before and after treatment)</a:t>
+            </a:r>
+          </a:p>
+          <a:p>
+            <a:pPr lvl="1"/>
+            <a:r>
+              <a:rPr lang="en-US" dirty="0"/>
+              <a:t>The many units would then be 15 bats measured before and after treatment, or 15 caves measured before and after treatment</a:t>
+            </a:r>
+          </a:p>
+          <a:p>
+            <a:r>
+              <a:rPr lang="en-US" dirty="0"/>
+              <a:t>To use a T-test, each of the two populations should follow a normal distribution</a:t>
             </a:r>
           </a:p>
         </p:txBody>
@@ -5359,7 +5563,7 @@
     </p:spTree>
     <p:extLst>
       <p:ext uri="{BB962C8B-B14F-4D97-AF65-F5344CB8AC3E}">
-        <p14:creationId xmlns:p14="http://schemas.microsoft.com/office/powerpoint/2010/main" val="726402733"/>
+        <p14:creationId xmlns:p14="http://schemas.microsoft.com/office/powerpoint/2010/main" val="1227985366"/>
       </p:ext>
     </p:extLst>
   </p:cSld>
@@ -5403,15 +5607,7 @@
           <a:p>
             <a:r>
               <a:rPr lang="en-US" dirty="0"/>
-              <a:t>Go to R</a:t>
-            </a:r>
-            <a:r>
-              <a:rPr lang="mr-IN" dirty="0"/>
-              <a:t>…</a:t>
-            </a:r>
-            <a:r>
-              <a:rPr lang="en-US" dirty="0"/>
-              <a:t>.t-tests</a:t>
+              <a:t>T-test variance</a:t>
             </a:r>
           </a:p>
         </p:txBody>
@@ -5431,14 +5627,26 @@
           <a:bodyPr/>
           <a:lstStyle/>
           <a:p>
-            <a:endParaRPr lang="en-US"/>
+            <a:r>
+              <a:rPr lang="en-US" dirty="0"/>
+              <a:t>A slightly silly nuance is that a classical student’s t-test assumes variances are also equal</a:t>
+            </a:r>
+          </a:p>
+          <a:p>
+            <a:endParaRPr lang="en-US" dirty="0"/>
+          </a:p>
+          <a:p>
+            <a:r>
+              <a:rPr lang="en-US" dirty="0"/>
+              <a:t>If you don’t want to add that assumption, you are technically doing Welch’s t-test (and this is the default in R)</a:t>
+            </a:r>
           </a:p>
         </p:txBody>
       </p:sp>
     </p:spTree>
     <p:extLst>
       <p:ext uri="{BB962C8B-B14F-4D97-AF65-F5344CB8AC3E}">
-        <p14:creationId xmlns:p14="http://schemas.microsoft.com/office/powerpoint/2010/main" val="175530512"/>
+        <p14:creationId xmlns:p14="http://schemas.microsoft.com/office/powerpoint/2010/main" val="726402733"/>
       </p:ext>
     </p:extLst>
   </p:cSld>
@@ -5482,7 +5690,15 @@
           <a:p>
             <a:r>
               <a:rPr lang="en-US" dirty="0"/>
-              <a:t>T-tests are powerful</a:t>
+              <a:t>Go to R</a:t>
+            </a:r>
+            <a:r>
+              <a:rPr lang="mr-IN" dirty="0"/>
+              <a:t>…</a:t>
+            </a:r>
+            <a:r>
+              <a:rPr lang="en-US" dirty="0"/>
+              <a:t>.t-tests</a:t>
             </a:r>
           </a:p>
         </p:txBody>
@@ -5502,42 +5718,14 @@
           <a:bodyPr/>
           <a:lstStyle/>
           <a:p>
-            <a:r>
-              <a:rPr lang="en-US" dirty="0"/>
-              <a:t>T-tests can be very powerful, paired t-tests can be more powerful than unpaired</a:t>
-            </a:r>
-          </a:p>
-          <a:p>
-            <a:pPr lvl="1"/>
-            <a:r>
-              <a:rPr lang="en-US" i="1" dirty="0"/>
-              <a:t>Try changing the amount you adding or subtracting to each forest value, and then running the paired and unpaired tests. What do you find?</a:t>
-            </a:r>
-          </a:p>
-          <a:p>
-            <a:endParaRPr lang="en-US" dirty="0"/>
-          </a:p>
-          <a:p>
-            <a:r>
-              <a:rPr lang="en-US" dirty="0"/>
-              <a:t>We can see that our p-values for a t-test are more powerful than if we did a permutation</a:t>
-            </a:r>
-          </a:p>
-          <a:p>
-            <a:endParaRPr lang="en-US" dirty="0"/>
-          </a:p>
-          <a:p>
-            <a:r>
-              <a:rPr lang="en-US" dirty="0"/>
-              <a:t>But what about the assumptions?</a:t>
-            </a:r>
+            <a:endParaRPr lang="en-US"/>
           </a:p>
         </p:txBody>
       </p:sp>
     </p:spTree>
     <p:extLst>
       <p:ext uri="{BB962C8B-B14F-4D97-AF65-F5344CB8AC3E}">
-        <p14:creationId xmlns:p14="http://schemas.microsoft.com/office/powerpoint/2010/main" val="650816266"/>
+        <p14:creationId xmlns:p14="http://schemas.microsoft.com/office/powerpoint/2010/main" val="175530512"/>
       </p:ext>
     </p:extLst>
   </p:cSld>
@@ -5579,10 +5767,9 @@
           <a:bodyPr/>
           <a:lstStyle/>
           <a:p>
-            <a:pPr algn="ctr"/>
-            <a:r>
-              <a:rPr lang="en-US" dirty="0"/>
-              <a:t>How do I know if my data is normally distributed?</a:t>
+            <a:r>
+              <a:rPr lang="en-US" dirty="0"/>
+              <a:t>T-tests are powerful</a:t>
             </a:r>
           </a:p>
         </p:txBody>
@@ -5599,41 +5786,45 @@
         </p:nvSpPr>
         <p:spPr/>
         <p:txBody>
-          <a:bodyPr>
-            <a:normAutofit/>
-          </a:bodyPr>
-          <a:lstStyle/>
-          <a:p>
-            <a:r>
-              <a:rPr lang="en-US" sz="3600" dirty="0"/>
-              <a:t>There are more tests!</a:t>
-            </a:r>
-          </a:p>
-          <a:p>
-            <a:endParaRPr lang="en-US" sz="3600" dirty="0"/>
-          </a:p>
-          <a:p>
-            <a:r>
-              <a:rPr lang="en-US" sz="3600" dirty="0"/>
-              <a:t>We will cover these in more details for linear models because there are nuances</a:t>
+          <a:bodyPr/>
+          <a:lstStyle/>
+          <a:p>
+            <a:r>
+              <a:rPr lang="en-US" dirty="0"/>
+              <a:t>T-tests can be very powerful, paired t-tests can be more powerful than unpaired</a:t>
             </a:r>
           </a:p>
           <a:p>
             <a:pPr lvl="1"/>
             <a:r>
-              <a:rPr lang="en-US" sz="3600" dirty="0"/>
-              <a:t>these nuances primarily deal with something called the residuals</a:t>
-            </a:r>
-          </a:p>
-          <a:p>
-            <a:endParaRPr lang="en-US" sz="3600" dirty="0"/>
+              <a:rPr lang="en-US" i="1" dirty="0"/>
+              <a:t>Try changing the amount you adding or subtracting to each forest value, and then running the paired and unpaired tests. What do you find?</a:t>
+            </a:r>
+          </a:p>
+          <a:p>
+            <a:endParaRPr lang="en-US" dirty="0"/>
+          </a:p>
+          <a:p>
+            <a:r>
+              <a:rPr lang="en-US" dirty="0"/>
+              <a:t>We can see that our p-values for a t-test are more powerful than if we did a permutation</a:t>
+            </a:r>
+          </a:p>
+          <a:p>
+            <a:endParaRPr lang="en-US" dirty="0"/>
+          </a:p>
+          <a:p>
+            <a:r>
+              <a:rPr lang="en-US" dirty="0"/>
+              <a:t>But what about the assumptions?</a:t>
+            </a:r>
           </a:p>
         </p:txBody>
       </p:sp>
     </p:spTree>
     <p:extLst>
       <p:ext uri="{BB962C8B-B14F-4D97-AF65-F5344CB8AC3E}">
-        <p14:creationId xmlns:p14="http://schemas.microsoft.com/office/powerpoint/2010/main" val="338309575"/>
+        <p14:creationId xmlns:p14="http://schemas.microsoft.com/office/powerpoint/2010/main" val="650816266"/>
       </p:ext>
     </p:extLst>
   </p:cSld>
@@ -5675,9 +5866,10 @@
           <a:bodyPr/>
           <a:lstStyle/>
           <a:p>
-            <a:r>
-              <a:rPr lang="en-US" dirty="0"/>
-              <a:t>Shapiro-Wilk Test</a:t>
+            <a:pPr algn="ctr"/>
+            <a:r>
+              <a:rPr lang="en-US" dirty="0"/>
+              <a:t>How do I know if my data is normally distributed?</a:t>
             </a:r>
           </a:p>
         </p:txBody>
@@ -5695,57 +5887,40 @@
         <p:spPr/>
         <p:txBody>
           <a:bodyPr>
-            <a:normAutofit fontScale="47500" lnSpcReduction="20000"/>
+            <a:normAutofit/>
           </a:bodyPr>
           <a:lstStyle/>
           <a:p>
             <a:r>
-              <a:rPr lang="en-US" sz="5100" dirty="0"/>
-              <a:t>A test of normality  (for data or residuals)</a:t>
-            </a:r>
-          </a:p>
-          <a:p>
-            <a:endParaRPr lang="en-US" sz="5100" dirty="0"/>
-          </a:p>
-          <a:p>
-            <a:r>
-              <a:rPr lang="en-US" sz="5100" dirty="0"/>
-              <a:t>Tests the null hypothesis that a sample (e.g. your data) came from a normally distributed population</a:t>
-            </a:r>
-          </a:p>
-          <a:p>
-            <a:endParaRPr lang="en-US" sz="5100" dirty="0"/>
-          </a:p>
-          <a:p>
-            <a:r>
-              <a:rPr lang="en-US" sz="5100" i="1" u="sng" dirty="0"/>
-              <a:t>The null hypothesis is that the data are normally distributed</a:t>
-            </a:r>
-          </a:p>
-          <a:p>
-            <a:endParaRPr lang="en-US" sz="5100" i="1" dirty="0"/>
-          </a:p>
-          <a:p>
-            <a:r>
-              <a:rPr lang="en-US" sz="5100" dirty="0"/>
-              <a:t>A P-value &lt; 0.05 indicates that data are not normally distributed</a:t>
-            </a:r>
-          </a:p>
-          <a:p>
-            <a:endParaRPr lang="en-US" sz="5100" dirty="0"/>
-          </a:p>
-          <a:p>
-            <a:r>
-              <a:rPr lang="en-US" sz="5100" dirty="0"/>
-              <a:t>Some others that are less powerful: Anderson-Darling, Kolmogorov-Smirnov, Lilliefors (Go to R..)</a:t>
-            </a:r>
+              <a:rPr lang="en-US" sz="3600" dirty="0"/>
+              <a:t>There are more tests!</a:t>
+            </a:r>
+          </a:p>
+          <a:p>
+            <a:endParaRPr lang="en-US" sz="3600" dirty="0"/>
+          </a:p>
+          <a:p>
+            <a:r>
+              <a:rPr lang="en-US" sz="3600" dirty="0"/>
+              <a:t>We will cover these in more details for linear models because there are nuances</a:t>
+            </a:r>
+          </a:p>
+          <a:p>
+            <a:pPr lvl="1"/>
+            <a:r>
+              <a:rPr lang="en-US" sz="3600" dirty="0"/>
+              <a:t>these nuances primarily deal with something called the residuals</a:t>
+            </a:r>
+          </a:p>
+          <a:p>
+            <a:endParaRPr lang="en-US" sz="3600" dirty="0"/>
           </a:p>
         </p:txBody>
       </p:sp>
     </p:spTree>
     <p:extLst>
       <p:ext uri="{BB962C8B-B14F-4D97-AF65-F5344CB8AC3E}">
-        <p14:creationId xmlns:p14="http://schemas.microsoft.com/office/powerpoint/2010/main" val="597949227"/>
+        <p14:creationId xmlns:p14="http://schemas.microsoft.com/office/powerpoint/2010/main" val="338309575"/>
       </p:ext>
     </p:extLst>
   </p:cSld>
@@ -5789,7 +5964,7 @@
           <a:p>
             <a:r>
               <a:rPr lang="en-US" dirty="0"/>
-              <a:t>Pond nutrients</a:t>
+              <a:t>Shapiro-Wilk Test</a:t>
             </a:r>
           </a:p>
         </p:txBody>
@@ -5806,32 +5981,58 @@
         </p:nvSpPr>
         <p:spPr/>
         <p:txBody>
-          <a:bodyPr/>
-          <a:lstStyle/>
-          <a:p>
-            <a:r>
-              <a:rPr lang="en-US" dirty="0"/>
-              <a:t>We measure correlations between a species of algae and nitrogen and phosphorous levels in natural ponds. Thus, we have a data frame showing N, P and A (for algae).</a:t>
-            </a:r>
-          </a:p>
-          <a:p>
-            <a:endParaRPr lang="en-US" dirty="0"/>
-          </a:p>
-          <a:p>
-            <a:r>
-              <a:rPr lang="en-US" dirty="0"/>
-              <a:t>What kinds of tests could we do to see whether the algae are correlated with nutrient levels?</a:t>
-            </a:r>
-          </a:p>
-          <a:p>
-            <a:endParaRPr lang="en-US" dirty="0"/>
+          <a:bodyPr>
+            <a:normAutofit fontScale="47500" lnSpcReduction="20000"/>
+          </a:bodyPr>
+          <a:lstStyle/>
+          <a:p>
+            <a:r>
+              <a:rPr lang="en-US" sz="5100" dirty="0"/>
+              <a:t>A test of normality  (for data or residuals)</a:t>
+            </a:r>
+          </a:p>
+          <a:p>
+            <a:endParaRPr lang="en-US" sz="5100" dirty="0"/>
+          </a:p>
+          <a:p>
+            <a:r>
+              <a:rPr lang="en-US" sz="5100" dirty="0"/>
+              <a:t>Tests the null hypothesis that a sample (e.g. your data) came from a normally distributed population</a:t>
+            </a:r>
+          </a:p>
+          <a:p>
+            <a:endParaRPr lang="en-US" sz="5100" dirty="0"/>
+          </a:p>
+          <a:p>
+            <a:r>
+              <a:rPr lang="en-US" sz="5100" i="1" u="sng" dirty="0"/>
+              <a:t>The null hypothesis is that the data are normally distributed</a:t>
+            </a:r>
+          </a:p>
+          <a:p>
+            <a:endParaRPr lang="en-US" sz="5100" i="1" dirty="0"/>
+          </a:p>
+          <a:p>
+            <a:r>
+              <a:rPr lang="en-US" sz="5100" dirty="0"/>
+              <a:t>A P-value &lt; 0.05 indicates that data are not normally distributed</a:t>
+            </a:r>
+          </a:p>
+          <a:p>
+            <a:endParaRPr lang="en-US" sz="5100" dirty="0"/>
+          </a:p>
+          <a:p>
+            <a:r>
+              <a:rPr lang="en-US" sz="5100" dirty="0"/>
+              <a:t>Some others that are less powerful: Anderson-Darling, Kolmogorov-Smirnov, Lilliefors (Go to R..)</a:t>
+            </a:r>
           </a:p>
         </p:txBody>
       </p:sp>
     </p:spTree>
     <p:extLst>
       <p:ext uri="{BB962C8B-B14F-4D97-AF65-F5344CB8AC3E}">
-        <p14:creationId xmlns:p14="http://schemas.microsoft.com/office/powerpoint/2010/main" val="326081140"/>
+        <p14:creationId xmlns:p14="http://schemas.microsoft.com/office/powerpoint/2010/main" val="597949227"/>
       </p:ext>
     </p:extLst>
   </p:cSld>
@@ -5875,15 +6076,7 @@
           <a:p>
             <a:r>
               <a:rPr lang="en-US" dirty="0"/>
-              <a:t>Linear correlation </a:t>
-            </a:r>
-            <a:r>
-              <a:rPr lang="mr-IN" dirty="0"/>
-              <a:t>–</a:t>
-            </a:r>
-            <a:r>
-              <a:rPr lang="en-US" dirty="0"/>
-              <a:t> Pearson r correlation</a:t>
+              <a:t>Pond nutrients</a:t>
             </a:r>
           </a:p>
         </p:txBody>
@@ -5900,14 +6093,12 @@
         </p:nvSpPr>
         <p:spPr/>
         <p:txBody>
-          <a:bodyPr>
-            <a:normAutofit lnSpcReduction="10000"/>
-          </a:bodyPr>
-          <a:lstStyle/>
-          <a:p>
-            <a:r>
-              <a:rPr lang="en-US" dirty="0"/>
-              <a:t>Measures the degree of association between two variables</a:t>
+          <a:bodyPr/>
+          <a:lstStyle/>
+          <a:p>
+            <a:r>
+              <a:rPr lang="en-US" dirty="0"/>
+              <a:t>We measure correlations between a species of algae and nitrogen and phosphorous levels in natural ponds. Thus, we have a data frame showing N, P and A (for algae).</a:t>
             </a:r>
           </a:p>
           <a:p>
@@ -5916,64 +6107,18 @@
           <a:p>
             <a:r>
               <a:rPr lang="en-US" dirty="0"/>
-              <a:t>Gives you r which varies between -1 and 1. </a:t>
-            </a:r>
-          </a:p>
-          <a:p>
-            <a:pPr lvl="1"/>
-            <a:r>
-              <a:rPr lang="en-US" dirty="0"/>
-              <a:t>1 is a 1:1 relationship, so it gives you the strength of the linear correlation. </a:t>
+              <a:t>What kinds of tests could we do to see whether the algae are correlated with nutrient levels?</a:t>
             </a:r>
           </a:p>
           <a:p>
             <a:endParaRPr lang="en-US" dirty="0"/>
-          </a:p>
-          <a:p>
-            <a:r>
-              <a:rPr lang="en-US" dirty="0"/>
-              <a:t>Assumptions:</a:t>
-            </a:r>
-          </a:p>
-          <a:p>
-            <a:pPr lvl="1"/>
-            <a:r>
-              <a:rPr lang="en-US" b="1" u="sng" dirty="0"/>
-              <a:t>Both</a:t>
-            </a:r>
-            <a:r>
-              <a:rPr lang="en-US" dirty="0"/>
-              <a:t> variables are normally distributed</a:t>
-            </a:r>
-          </a:p>
-          <a:p>
-            <a:pPr lvl="1"/>
-            <a:r>
-              <a:rPr lang="en-US" dirty="0"/>
-              <a:t>Variables have a linear relationship (y = mx + b)</a:t>
-            </a:r>
-          </a:p>
-          <a:p>
-            <a:pPr lvl="1"/>
-            <a:r>
-              <a:rPr lang="en-US" dirty="0"/>
-              <a:t>Variables are equally distributed around a regression line (e.g. there isn’t bunching of the data in a given area </a:t>
-            </a:r>
-            <a:r>
-              <a:rPr lang="mr-IN" dirty="0"/>
-              <a:t>–</a:t>
-            </a:r>
-            <a:r>
-              <a:rPr lang="en-US" dirty="0"/>
-              <a:t> this is called homoscedasticity)</a:t>
-            </a:r>
           </a:p>
         </p:txBody>
       </p:sp>
     </p:spTree>
     <p:extLst>
       <p:ext uri="{BB962C8B-B14F-4D97-AF65-F5344CB8AC3E}">
-        <p14:creationId xmlns:p14="http://schemas.microsoft.com/office/powerpoint/2010/main" val="1079663477"/>
+        <p14:creationId xmlns:p14="http://schemas.microsoft.com/office/powerpoint/2010/main" val="326081140"/>
       </p:ext>
     </p:extLst>
   </p:cSld>
@@ -6015,10 +6160,17 @@
           <a:bodyPr/>
           <a:lstStyle/>
           <a:p>
-            <a:pPr algn="ctr"/>
-            <a:r>
-              <a:rPr lang="en-US" dirty="0"/>
-              <a:t>Non-linear? Test a correlation with Kendall Rank Correlation</a:t>
+            <a:r>
+              <a:rPr lang="en-US" dirty="0"/>
+              <a:t>Linear correlation </a:t>
+            </a:r>
+            <a:r>
+              <a:rPr lang="mr-IN" dirty="0"/>
+              <a:t>–</a:t>
+            </a:r>
+            <a:r>
+              <a:rPr lang="en-US" dirty="0"/>
+              <a:t> Pearson r correlation</a:t>
             </a:r>
           </a:p>
         </p:txBody>
@@ -6035,12 +6187,14 @@
         </p:nvSpPr>
         <p:spPr/>
         <p:txBody>
-          <a:bodyPr/>
-          <a:lstStyle/>
-          <a:p>
-            <a:r>
-              <a:rPr lang="en-US" dirty="0"/>
-              <a:t>Kendall rank correlation is a non-parametric test (e.g. non-normal, doesn’t need to be normally distributed)</a:t>
+          <a:bodyPr>
+            <a:normAutofit lnSpcReduction="10000"/>
+          </a:bodyPr>
+          <a:lstStyle/>
+          <a:p>
+            <a:r>
+              <a:rPr lang="en-US" dirty="0"/>
+              <a:t>Measures the degree of association between two variables</a:t>
             </a:r>
           </a:p>
           <a:p>
@@ -6049,7 +6203,14 @@
           <a:p>
             <a:r>
               <a:rPr lang="en-US" dirty="0"/>
-              <a:t>It ranks the order of things in your dataset and then measures the strength of dependence between two variables</a:t>
+              <a:t>Gives you r which varies between -1 and 1. </a:t>
+            </a:r>
+          </a:p>
+          <a:p>
+            <a:pPr lvl="1"/>
+            <a:r>
+              <a:rPr lang="en-US" dirty="0"/>
+              <a:t>1 is a 1:1 relationship, so it gives you the strength of the linear correlation. </a:t>
             </a:r>
           </a:p>
           <a:p>
@@ -6058,7 +6219,40 @@
           <a:p>
             <a:r>
               <a:rPr lang="en-US" dirty="0"/>
-              <a:t>It is less powerful, but still very useful</a:t>
+              <a:t>Assumptions:</a:t>
+            </a:r>
+          </a:p>
+          <a:p>
+            <a:pPr lvl="1"/>
+            <a:r>
+              <a:rPr lang="en-US" b="1" u="sng" dirty="0"/>
+              <a:t>Both</a:t>
+            </a:r>
+            <a:r>
+              <a:rPr lang="en-US" dirty="0"/>
+              <a:t> variables are normally distributed</a:t>
+            </a:r>
+          </a:p>
+          <a:p>
+            <a:pPr lvl="1"/>
+            <a:r>
+              <a:rPr lang="en-US" dirty="0"/>
+              <a:t>Variables have a linear relationship (y = mx + b)</a:t>
+            </a:r>
+          </a:p>
+          <a:p>
+            <a:pPr lvl="1"/>
+            <a:r>
+              <a:rPr lang="en-US" dirty="0"/>
+              <a:t>Variables are equally distributed around a regression line (e.g. there isn’t bunching of the data in a given area </a:t>
+            </a:r>
+            <a:r>
+              <a:rPr lang="mr-IN" dirty="0"/>
+              <a:t>–</a:t>
+            </a:r>
+            <a:r>
+              <a:rPr lang="en-US" dirty="0"/>
+              <a:t> this is called homoscedasticity)</a:t>
             </a:r>
           </a:p>
         </p:txBody>
@@ -6066,7 +6260,7 @@
     </p:spTree>
     <p:extLst>
       <p:ext uri="{BB962C8B-B14F-4D97-AF65-F5344CB8AC3E}">
-        <p14:creationId xmlns:p14="http://schemas.microsoft.com/office/powerpoint/2010/main" val="397136078"/>
+        <p14:creationId xmlns:p14="http://schemas.microsoft.com/office/powerpoint/2010/main" val="1079663477"/>
       </p:ext>
     </p:extLst>
   </p:cSld>
@@ -6108,9 +6302,10 @@
           <a:bodyPr/>
           <a:lstStyle/>
           <a:p>
-            <a:r>
-              <a:rPr lang="en-US" dirty="0"/>
-              <a:t>Note about testing correlations with tests</a:t>
+            <a:pPr algn="ctr"/>
+            <a:r>
+              <a:rPr lang="en-US" dirty="0"/>
+              <a:t>Non-linear? Test a correlation with Kendall Rank Correlation</a:t>
             </a:r>
           </a:p>
         </p:txBody>
@@ -6125,21 +6320,14 @@
             <p:ph idx="1"/>
           </p:nvPr>
         </p:nvSpPr>
-        <p:spPr>
-          <a:xfrm>
-            <a:off x="838200" y="1857156"/>
-            <a:ext cx="10515600" cy="4351338"/>
-          </a:xfrm>
-        </p:spPr>
-        <p:txBody>
-          <a:bodyPr>
-            <a:normAutofit lnSpcReduction="10000"/>
-          </a:bodyPr>
-          <a:lstStyle/>
-          <a:p>
-            <a:r>
-              <a:rPr lang="en-US" dirty="0"/>
-              <a:t>Correlational tests are useful for describing relationships between variables where we don’t have a strong a priori hypothesis about how one affects the others</a:t>
+        <p:spPr/>
+        <p:txBody>
+          <a:bodyPr/>
+          <a:lstStyle/>
+          <a:p>
+            <a:r>
+              <a:rPr lang="en-US" dirty="0"/>
+              <a:t>Kendall rank correlation is a non-parametric test (e.g. non-normal, doesn’t need to be normally distributed)</a:t>
             </a:r>
           </a:p>
           <a:p>
@@ -6148,7 +6336,7 @@
           <a:p>
             <a:r>
               <a:rPr lang="en-US" dirty="0"/>
-              <a:t>My opinion: When we have hypotheses about dependence, we should use models </a:t>
+              <a:t>It ranks the order of things in your dataset and then measures the strength of dependence between two variables</a:t>
             </a:r>
           </a:p>
           <a:p>
@@ -6157,26 +6345,15 @@
           <a:p>
             <a:r>
               <a:rPr lang="en-US" dirty="0"/>
-              <a:t>Which of these would you use a test vs a model?</a:t>
-            </a:r>
-          </a:p>
-          <a:p>
-            <a:pPr lvl="1"/>
-            <a:r>
-              <a:rPr lang="en-US" dirty="0"/>
-              <a:t>Salt intake and growth, fat and weight, temperature and infection, pavement and number of humans, number of frogs and number of fish</a:t>
-            </a:r>
-          </a:p>
-          <a:p>
-            <a:pPr lvl="1"/>
-            <a:endParaRPr lang="en-US" dirty="0"/>
+              <a:t>It is less powerful, but still very useful</a:t>
+            </a:r>
           </a:p>
         </p:txBody>
       </p:sp>
     </p:spTree>
     <p:extLst>
       <p:ext uri="{BB962C8B-B14F-4D97-AF65-F5344CB8AC3E}">
-        <p14:creationId xmlns:p14="http://schemas.microsoft.com/office/powerpoint/2010/main" val="1609073287"/>
+        <p14:creationId xmlns:p14="http://schemas.microsoft.com/office/powerpoint/2010/main" val="397136078"/>
       </p:ext>
     </p:extLst>
   </p:cSld>
@@ -6220,7 +6397,7 @@
           <a:p>
             <a:r>
               <a:rPr lang="en-US" dirty="0"/>
-              <a:t>Introduction</a:t>
+              <a:t>Goals</a:t>
             </a:r>
           </a:p>
         </p:txBody>
@@ -6237,14 +6414,12 @@
         </p:nvSpPr>
         <p:spPr/>
         <p:txBody>
-          <a:bodyPr>
-            <a:normAutofit fontScale="92500" lnSpcReduction="10000"/>
-          </a:bodyPr>
-          <a:lstStyle/>
-          <a:p>
-            <a:r>
-              <a:rPr lang="en-US" dirty="0"/>
-              <a:t>Tests are often used in ecology and evolutionary biology to provide insight about data</a:t>
+          <a:bodyPr/>
+          <a:lstStyle/>
+          <a:p>
+            <a:r>
+              <a:rPr lang="en-US" dirty="0"/>
+              <a:t>Understand  several commonly used “tests” in ecology and evolutionary biology and how to perform them in R</a:t>
             </a:r>
           </a:p>
           <a:p>
@@ -6253,7 +6428,7 @@
           <a:p>
             <a:r>
               <a:rPr lang="en-US" dirty="0"/>
-              <a:t>Usually these tests are designed to tell us about the differences between two groups</a:t>
+              <a:t>Understand permutation tests in relation to these other tests and be able to apply them to your data</a:t>
             </a:r>
           </a:p>
           <a:p>
@@ -6262,16 +6437,7 @@
           <a:p>
             <a:r>
               <a:rPr lang="en-US" dirty="0"/>
-              <a:t>Sometimes tests will tell us about the differences between one group and some value (usually 0)</a:t>
-            </a:r>
-          </a:p>
-          <a:p>
-            <a:endParaRPr lang="en-US" dirty="0"/>
-          </a:p>
-          <a:p>
-            <a:r>
-              <a:rPr lang="en-US" dirty="0"/>
-              <a:t>Most often they have assumptions, so it is useful to understand what those are to avoid improper application</a:t>
+              <a:t>Begin to build a dichotomous key of statistical approaches for application to datasets</a:t>
             </a:r>
           </a:p>
         </p:txBody>
@@ -6279,7 +6445,7 @@
     </p:spTree>
     <p:extLst>
       <p:ext uri="{BB962C8B-B14F-4D97-AF65-F5344CB8AC3E}">
-        <p14:creationId xmlns:p14="http://schemas.microsoft.com/office/powerpoint/2010/main" val="1193718519"/>
+        <p14:creationId xmlns:p14="http://schemas.microsoft.com/office/powerpoint/2010/main" val="1387291854"/>
       </p:ext>
     </p:extLst>
   </p:cSld>
@@ -6323,7 +6489,7 @@
           <a:p>
             <a:r>
               <a:rPr lang="en-US" dirty="0"/>
-              <a:t>Mantel test</a:t>
+              <a:t>Note about testing correlations with tests</a:t>
             </a:r>
           </a:p>
         </p:txBody>
@@ -6340,19 +6506,19 @@
         </p:nvSpPr>
         <p:spPr>
           <a:xfrm>
-            <a:off x="838200" y="1548384"/>
-            <a:ext cx="10515600" cy="4628579"/>
+            <a:off x="838200" y="1857156"/>
+            <a:ext cx="10515600" cy="4351338"/>
           </a:xfrm>
         </p:spPr>
         <p:txBody>
           <a:bodyPr>
-            <a:normAutofit fontScale="85000" lnSpcReduction="20000"/>
+            <a:normAutofit lnSpcReduction="10000"/>
           </a:bodyPr>
           <a:lstStyle/>
           <a:p>
             <a:r>
               <a:rPr lang="en-US" dirty="0"/>
-              <a:t>This is a statistical test of the correlation between two matrices of the same dimension</a:t>
+              <a:t>Correlational tests are useful for describing relationships between variables where we don’t have a strong a priori hypothesis about how one affects the others</a:t>
             </a:r>
           </a:p>
           <a:p>
@@ -6361,45 +6527,27 @@
           <a:p>
             <a:r>
               <a:rPr lang="en-US" dirty="0"/>
-              <a:t>They are most frequently used in ecology where the data are distances between objects</a:t>
+              <a:t>My opinion: When we have hypotheses about dependence, we should use models </a:t>
+            </a:r>
+          </a:p>
+          <a:p>
+            <a:endParaRPr lang="en-US" dirty="0"/>
+          </a:p>
+          <a:p>
+            <a:r>
+              <a:rPr lang="en-US" dirty="0"/>
+              <a:t>Which of these would you use a test vs a model?</a:t>
             </a:r>
           </a:p>
           <a:p>
             <a:pPr lvl="1"/>
             <a:r>
               <a:rPr lang="en-US" dirty="0"/>
-              <a:t>You might use a mantel test to see if your data are spatially autocorrelated</a:t>
-            </a:r>
-          </a:p>
-          <a:p>
-            <a:endParaRPr lang="en-US" dirty="0"/>
-          </a:p>
-          <a:p>
-            <a:r>
-              <a:rPr lang="en-US" dirty="0"/>
-              <a:t>For example, you might have one dataset which is a matrix of genetic distances, and one matrix with geographic distances between the range of species to each other species</a:t>
-            </a:r>
-          </a:p>
-          <a:p>
-            <a:endParaRPr lang="en-US" dirty="0"/>
-          </a:p>
-          <a:p>
-            <a:r>
-              <a:rPr lang="en-US" dirty="0"/>
-              <a:t>Here is some helpful info on how to do one: </a:t>
-            </a:r>
-            <a:r>
-              <a:rPr lang="en-US" dirty="0">
-                <a:hlinkClick r:id="rId2"/>
-              </a:rPr>
-              <a:t>https://stats.idre.ucla.edu/r/faq/how-can-i-perform-a-mantel-test-in-r/</a:t>
-            </a:r>
-            <a:r>
-              <a:rPr lang="en-US" dirty="0"/>
-              <a:t> </a:t>
-            </a:r>
-          </a:p>
-          <a:p>
+              <a:t>Salt intake and growth, fat and weight, temperature and infection, pavement and number of humans, number of frogs and number of fish</a:t>
+            </a:r>
+          </a:p>
+          <a:p>
+            <a:pPr lvl="1"/>
             <a:endParaRPr lang="en-US" dirty="0"/>
           </a:p>
         </p:txBody>
@@ -6407,7 +6555,7 @@
     </p:spTree>
     <p:extLst>
       <p:ext uri="{BB962C8B-B14F-4D97-AF65-F5344CB8AC3E}">
-        <p14:creationId xmlns:p14="http://schemas.microsoft.com/office/powerpoint/2010/main" val="416448812"/>
+        <p14:creationId xmlns:p14="http://schemas.microsoft.com/office/powerpoint/2010/main" val="1609073287"/>
       </p:ext>
     </p:extLst>
   </p:cSld>
@@ -6451,7 +6599,7 @@
           <a:p>
             <a:r>
               <a:rPr lang="en-US" dirty="0"/>
-              <a:t>Fisher’s exact test</a:t>
+              <a:t>Mantel test</a:t>
             </a:r>
           </a:p>
         </p:txBody>
@@ -6466,14 +6614,21 @@
             <p:ph idx="1"/>
           </p:nvPr>
         </p:nvSpPr>
-        <p:spPr/>
-        <p:txBody>
-          <a:bodyPr/>
-          <a:lstStyle/>
-          <a:p>
-            <a:r>
-              <a:rPr lang="en-US" dirty="0"/>
-              <a:t>The fisher’s exact test is a test to analyze contingency tables (e.g. 2 x 2) tables of categorical count data</a:t>
+        <p:spPr>
+          <a:xfrm>
+            <a:off x="838200" y="1548384"/>
+            <a:ext cx="10515600" cy="4628579"/>
+          </a:xfrm>
+        </p:spPr>
+        <p:txBody>
+          <a:bodyPr>
+            <a:normAutofit fontScale="85000" lnSpcReduction="20000"/>
+          </a:bodyPr>
+          <a:lstStyle/>
+          <a:p>
+            <a:r>
+              <a:rPr lang="en-US" dirty="0"/>
+              <a:t>This is a statistical test of the correlation between two matrices of the same dimension</a:t>
             </a:r>
           </a:p>
           <a:p>
@@ -6482,17 +6637,42 @@
           <a:p>
             <a:r>
               <a:rPr lang="en-US" dirty="0"/>
-              <a:t>It’s good for small samples and unbalanced designs (e.g. the numbers in each group are not equal)</a:t>
-            </a:r>
-            <a:br>
-              <a:rPr lang="en-US" dirty="0"/>
-            </a:br>
+              <a:t>They are most frequently used in ecology where the data are distances between objects</a:t>
+            </a:r>
+          </a:p>
+          <a:p>
+            <a:pPr lvl="1"/>
+            <a:r>
+              <a:rPr lang="en-US" dirty="0"/>
+              <a:t>You might use a mantel test to see if your data are spatially autocorrelated</a:t>
+            </a:r>
+          </a:p>
+          <a:p>
             <a:endParaRPr lang="en-US" dirty="0"/>
           </a:p>
           <a:p>
             <a:r>
               <a:rPr lang="en-US" dirty="0"/>
-              <a:t>It uses a quasi-permutation approach to calculate an exact p-value</a:t>
+              <a:t>For example, you might have one dataset which is a matrix of genetic distances, and one matrix with geographic distances between the range of species to each other species</a:t>
+            </a:r>
+          </a:p>
+          <a:p>
+            <a:endParaRPr lang="en-US" dirty="0"/>
+          </a:p>
+          <a:p>
+            <a:r>
+              <a:rPr lang="en-US" dirty="0"/>
+              <a:t>Here is some helpful info on how to do one: </a:t>
+            </a:r>
+            <a:r>
+              <a:rPr lang="en-US" dirty="0">
+                <a:hlinkClick r:id="rId2"/>
+              </a:rPr>
+              <a:t>https://stats.idre.ucla.edu/r/faq/how-can-i-perform-a-mantel-test-in-r/</a:t>
+            </a:r>
+            <a:r>
+              <a:rPr lang="en-US" dirty="0"/>
+              <a:t> </a:t>
             </a:r>
           </a:p>
           <a:p>
@@ -6503,7 +6683,7 @@
     </p:spTree>
     <p:extLst>
       <p:ext uri="{BB962C8B-B14F-4D97-AF65-F5344CB8AC3E}">
-        <p14:creationId xmlns:p14="http://schemas.microsoft.com/office/powerpoint/2010/main" val="174052823"/>
+        <p14:creationId xmlns:p14="http://schemas.microsoft.com/office/powerpoint/2010/main" val="416448812"/>
       </p:ext>
     </p:extLst>
   </p:cSld>
@@ -6546,48 +6726,60 @@
           <a:lstStyle/>
           <a:p>
             <a:r>
-              <a:rPr lang="en-US"/>
-              <a:t>Fisher test example</a:t>
-            </a:r>
+              <a:rPr lang="en-US" dirty="0"/>
+              <a:t>Fisher’s exact test</a:t>
+            </a:r>
+          </a:p>
+        </p:txBody>
+      </p:sp>
+      <p:sp>
+        <p:nvSpPr>
+          <p:cNvPr id="3" name="Content Placeholder 2"/>
+          <p:cNvSpPr>
+            <a:spLocks noGrp="1"/>
+          </p:cNvSpPr>
+          <p:nvPr>
+            <p:ph idx="1"/>
+          </p:nvPr>
+        </p:nvSpPr>
+        <p:spPr/>
+        <p:txBody>
+          <a:bodyPr/>
+          <a:lstStyle/>
+          <a:p>
+            <a:r>
+              <a:rPr lang="en-US" dirty="0"/>
+              <a:t>The fisher’s exact test is a test to analyze contingency tables (e.g. 2 x 2) tables of categorical count data</a:t>
+            </a:r>
+          </a:p>
+          <a:p>
             <a:endParaRPr lang="en-US" dirty="0"/>
           </a:p>
-        </p:txBody>
-      </p:sp>
-      <p:sp>
-        <p:nvSpPr>
-          <p:cNvPr id="3" name="Content Placeholder 2"/>
-          <p:cNvSpPr>
-            <a:spLocks noGrp="1"/>
-          </p:cNvSpPr>
-          <p:nvPr>
-            <p:ph idx="1"/>
-          </p:nvPr>
-        </p:nvSpPr>
-        <p:spPr/>
-        <p:txBody>
-          <a:bodyPr/>
-          <a:lstStyle/>
-          <a:p>
-            <a:r>
-              <a:rPr lang="en-US" dirty="0"/>
-              <a:t>Pinnacles National Park has two different entrances that are unconnected. We went to the east side of Pinnacles 11 times, and 10 of 11 times we saw condors. We went to the west side of Pinnacle 8 times, and 1 of 8 times we saw condors. Is there a statistically significant difference in condor sightings? </a:t>
-            </a:r>
-          </a:p>
-          <a:p>
+          <a:p>
+            <a:r>
+              <a:rPr lang="en-US" dirty="0"/>
+              <a:t>It’s good for small samples and unbalanced designs (e.g. the numbers in each group are not equal)</a:t>
+            </a:r>
+            <a:br>
+              <a:rPr lang="en-US" dirty="0"/>
+            </a:br>
             <a:endParaRPr lang="en-US" dirty="0"/>
           </a:p>
           <a:p>
             <a:r>
               <a:rPr lang="en-US" dirty="0"/>
-              <a:t>Interpretation: Null hypothesis is that the probability is equal. A p-value &lt; 0.05 tells you that the east and west sides differ in the probability of detecting condors</a:t>
-            </a:r>
+              <a:t>It uses a quasi-permutation approach to calculate an exact p-value</a:t>
+            </a:r>
+          </a:p>
+          <a:p>
+            <a:endParaRPr lang="en-US" dirty="0"/>
           </a:p>
         </p:txBody>
       </p:sp>
     </p:spTree>
     <p:extLst>
       <p:ext uri="{BB962C8B-B14F-4D97-AF65-F5344CB8AC3E}">
-        <p14:creationId xmlns:p14="http://schemas.microsoft.com/office/powerpoint/2010/main" val="459422531"/>
+        <p14:creationId xmlns:p14="http://schemas.microsoft.com/office/powerpoint/2010/main" val="174052823"/>
       </p:ext>
     </p:extLst>
   </p:cSld>
@@ -6630,6 +6822,90 @@
           <a:lstStyle/>
           <a:p>
             <a:r>
+              <a:rPr lang="en-US"/>
+              <a:t>Fisher test example</a:t>
+            </a:r>
+            <a:endParaRPr lang="en-US" dirty="0"/>
+          </a:p>
+        </p:txBody>
+      </p:sp>
+      <p:sp>
+        <p:nvSpPr>
+          <p:cNvPr id="3" name="Content Placeholder 2"/>
+          <p:cNvSpPr>
+            <a:spLocks noGrp="1"/>
+          </p:cNvSpPr>
+          <p:nvPr>
+            <p:ph idx="1"/>
+          </p:nvPr>
+        </p:nvSpPr>
+        <p:spPr/>
+        <p:txBody>
+          <a:bodyPr/>
+          <a:lstStyle/>
+          <a:p>
+            <a:r>
+              <a:rPr lang="en-US" dirty="0"/>
+              <a:t>Pinnacles National Park has two different entrances that are unconnected. We went to the east side of Pinnacles 11 times, and 10 of 11 times we saw condors. We went to the west side of Pinnacle 8 times, and 1 of 8 times we saw condors. Is there a statistically significant difference in condor sightings? </a:t>
+            </a:r>
+          </a:p>
+          <a:p>
+            <a:endParaRPr lang="en-US" dirty="0"/>
+          </a:p>
+          <a:p>
+            <a:r>
+              <a:rPr lang="en-US" dirty="0"/>
+              <a:t>Interpretation: Null hypothesis is that the probability is equal. A p-value &lt; 0.05 tells you that the east and west sides differ in the probability of detecting condors</a:t>
+            </a:r>
+          </a:p>
+        </p:txBody>
+      </p:sp>
+    </p:spTree>
+    <p:extLst>
+      <p:ext uri="{BB962C8B-B14F-4D97-AF65-F5344CB8AC3E}">
+        <p14:creationId xmlns:p14="http://schemas.microsoft.com/office/powerpoint/2010/main" val="459422531"/>
+      </p:ext>
+    </p:extLst>
+  </p:cSld>
+  <p:clrMapOvr>
+    <a:masterClrMapping/>
+  </p:clrMapOvr>
+</p:sld>
+</file>
+
+<file path=ppt/slides/slide34.xml><?xml version="1.0" encoding="utf-8"?>
+<p:sld xmlns:a="http://schemas.openxmlformats.org/drawingml/2006/main" xmlns:r="http://schemas.openxmlformats.org/officeDocument/2006/relationships" xmlns:p="http://schemas.openxmlformats.org/presentationml/2006/main">
+  <p:cSld>
+    <p:spTree>
+      <p:nvGrpSpPr>
+        <p:cNvPr id="1" name=""/>
+        <p:cNvGrpSpPr/>
+        <p:nvPr/>
+      </p:nvGrpSpPr>
+      <p:grpSpPr>
+        <a:xfrm>
+          <a:off x="0" y="0"/>
+          <a:ext cx="0" cy="0"/>
+          <a:chOff x="0" y="0"/>
+          <a:chExt cx="0" cy="0"/>
+        </a:xfrm>
+      </p:grpSpPr>
+      <p:sp>
+        <p:nvSpPr>
+          <p:cNvPr id="2" name="Title 1"/>
+          <p:cNvSpPr>
+            <a:spLocks noGrp="1"/>
+          </p:cNvSpPr>
+          <p:nvPr>
+            <p:ph type="title"/>
+          </p:nvPr>
+        </p:nvSpPr>
+        <p:spPr/>
+        <p:txBody>
+          <a:bodyPr/>
+          <a:lstStyle/>
+          <a:p>
+            <a:r>
               <a:rPr lang="en-US" dirty="0"/>
               <a:t>Rank tests</a:t>
             </a:r>
@@ -6745,7 +7021,7 @@
 </p:sld>
 </file>
 
-<file path=ppt/slides/slide34.xml><?xml version="1.0" encoding="utf-8"?>
+<file path=ppt/slides/slide35.xml><?xml version="1.0" encoding="utf-8"?>
 <p:sld xmlns:a="http://schemas.openxmlformats.org/drawingml/2006/main" xmlns:r="http://schemas.openxmlformats.org/officeDocument/2006/relationships" xmlns:p="http://schemas.openxmlformats.org/presentationml/2006/main">
   <p:cSld>
     <p:spTree>
@@ -6958,34 +7234,40 @@
           <a:p>
             <a:r>
               <a:rPr lang="en-US" dirty="0"/>
-              <a:t>A focus on application</a:t>
-            </a:r>
-            <a:r>
-              <a:rPr lang="mr-IN" dirty="0"/>
-              <a:t>…</a:t>
-            </a:r>
+              <a:t>Introduction</a:t>
+            </a:r>
+          </a:p>
+        </p:txBody>
+      </p:sp>
+      <p:sp>
+        <p:nvSpPr>
+          <p:cNvPr id="3" name="Content Placeholder 2"/>
+          <p:cNvSpPr>
+            <a:spLocks noGrp="1"/>
+          </p:cNvSpPr>
+          <p:nvPr>
+            <p:ph idx="1"/>
+          </p:nvPr>
+        </p:nvSpPr>
+        <p:spPr/>
+        <p:txBody>
+          <a:bodyPr>
+            <a:normAutofit fontScale="92500" lnSpcReduction="10000"/>
+          </a:bodyPr>
+          <a:lstStyle/>
+          <a:p>
+            <a:r>
+              <a:rPr lang="en-US" dirty="0"/>
+              <a:t>Tests are often used in ecology and evolutionary biology to provide insight about data</a:t>
+            </a:r>
+          </a:p>
+          <a:p>
             <a:endParaRPr lang="en-US" dirty="0"/>
           </a:p>
-        </p:txBody>
-      </p:sp>
-      <p:sp>
-        <p:nvSpPr>
-          <p:cNvPr id="3" name="Content Placeholder 2"/>
-          <p:cNvSpPr>
-            <a:spLocks noGrp="1"/>
-          </p:cNvSpPr>
-          <p:nvPr>
-            <p:ph idx="1"/>
-          </p:nvPr>
-        </p:nvSpPr>
-        <p:spPr/>
-        <p:txBody>
-          <a:bodyPr/>
-          <a:lstStyle/>
-          <a:p>
-            <a:r>
-              <a:rPr lang="en-US" dirty="0"/>
-              <a:t>Each of these tests could be a single a class</a:t>
+          <a:p>
+            <a:r>
+              <a:rPr lang="en-US" dirty="0"/>
+              <a:t>Usually these tests are designed to tell us about the differences between two groups</a:t>
             </a:r>
           </a:p>
           <a:p>
@@ -6994,7 +7276,7 @@
           <a:p>
             <a:r>
               <a:rPr lang="en-US" dirty="0"/>
-              <a:t>Our focus will be on quick assumptions and how to apply them and interpret them in R</a:t>
+              <a:t>Sometimes tests will tell us about the differences between one group and some value (usually 0)</a:t>
             </a:r>
           </a:p>
           <a:p>
@@ -7003,15 +7285,7 @@
           <a:p>
             <a:r>
               <a:rPr lang="en-US" dirty="0"/>
-              <a:t>If you want to understand further, the Wikipedia pages are often </a:t>
-            </a:r>
-            <a:r>
-              <a:rPr lang="en-US" i="1" dirty="0"/>
-              <a:t>very </a:t>
-            </a:r>
-            <a:r>
-              <a:rPr lang="en-US" dirty="0"/>
-              <a:t>helpful (or take a real stats class)</a:t>
+              <a:t>Most often they have assumptions, so it is useful to understand what those are to avoid improper application</a:t>
             </a:r>
           </a:p>
         </p:txBody>
@@ -7019,7 +7293,7 @@
     </p:spTree>
     <p:extLst>
       <p:ext uri="{BB962C8B-B14F-4D97-AF65-F5344CB8AC3E}">
-        <p14:creationId xmlns:p14="http://schemas.microsoft.com/office/powerpoint/2010/main" val="2089782546"/>
+        <p14:creationId xmlns:p14="http://schemas.microsoft.com/office/powerpoint/2010/main" val="1193718519"/>
       </p:ext>
     </p:extLst>
   </p:cSld>
@@ -7063,8 +7337,13 @@
           <a:p>
             <a:r>
               <a:rPr lang="en-US" dirty="0"/>
-              <a:t>Tests in the age of computers</a:t>
-            </a:r>
+              <a:t>A focus on application</a:t>
+            </a:r>
+            <a:r>
+              <a:rPr lang="mr-IN" dirty="0"/>
+              <a:t>…</a:t>
+            </a:r>
+            <a:endParaRPr lang="en-US" dirty="0"/>
           </a:p>
         </p:txBody>
       </p:sp>
@@ -7080,66 +7359,46 @@
         </p:nvSpPr>
         <p:spPr/>
         <p:txBody>
-          <a:bodyPr>
-            <a:normAutofit fontScale="85000" lnSpcReduction="10000"/>
-          </a:bodyPr>
-          <a:lstStyle/>
-          <a:p>
-            <a:r>
-              <a:rPr lang="en-US" sz="3200" dirty="0"/>
-              <a:t>Classical statistics was developed under </a:t>
-            </a:r>
-            <a:r>
-              <a:rPr lang="en-US" sz="3200" dirty="0" err="1"/>
-              <a:t>lampost</a:t>
-            </a:r>
-            <a:r>
-              <a:rPr lang="en-US" sz="3200" dirty="0"/>
-              <a:t> theory</a:t>
-            </a:r>
-          </a:p>
-          <a:p>
-            <a:endParaRPr lang="en-US" sz="3200" dirty="0"/>
-          </a:p>
-          <a:p>
-            <a:r>
-              <a:rPr lang="en-US" sz="3200" dirty="0"/>
-              <a:t>Classical statistics relies heavily on normality assumptions because that was the only simple way to perform statistics without computers</a:t>
-            </a:r>
-          </a:p>
-          <a:p>
-            <a:pPr lvl="1"/>
-            <a:r>
-              <a:rPr lang="en-US" sz="3200" dirty="0"/>
-              <a:t>These statistics use “shortcuts” that rely on normality assumptions </a:t>
-            </a:r>
-          </a:p>
-          <a:p>
-            <a:pPr lvl="2"/>
-            <a:r>
-              <a:rPr lang="en-US" sz="3200" dirty="0"/>
-              <a:t>We aren’t going to learn much about the shortcuts</a:t>
-            </a:r>
-          </a:p>
-          <a:p>
-            <a:pPr lvl="2"/>
-            <a:endParaRPr lang="en-US" sz="3200" dirty="0"/>
-          </a:p>
-          <a:p>
-            <a:r>
-              <a:rPr lang="en-US" sz="4000" dirty="0"/>
-              <a:t>With computers, we can do permutations. Computers light up the street and make us wonder why we didn’t look in the right place the first time. </a:t>
-            </a:r>
-          </a:p>
-          <a:p>
-            <a:endParaRPr lang="en-US" sz="3200" dirty="0"/>
+          <a:bodyPr/>
+          <a:lstStyle/>
+          <a:p>
+            <a:r>
+              <a:rPr lang="en-US" dirty="0"/>
+              <a:t>Each of these tests could be a single a class</a:t>
+            </a:r>
+          </a:p>
+          <a:p>
+            <a:endParaRPr lang="en-US" dirty="0"/>
+          </a:p>
+          <a:p>
+            <a:r>
+              <a:rPr lang="en-US" dirty="0"/>
+              <a:t>Our focus will be on quick assumptions and how to apply them and interpret them in R</a:t>
+            </a:r>
+          </a:p>
+          <a:p>
+            <a:endParaRPr lang="en-US" dirty="0"/>
+          </a:p>
+          <a:p>
+            <a:r>
+              <a:rPr lang="en-US" dirty="0"/>
+              <a:t>If you want to understand further, the Wikipedia pages are often </a:t>
+            </a:r>
+            <a:r>
+              <a:rPr lang="en-US" i="1" dirty="0"/>
+              <a:t>very </a:t>
+            </a:r>
+            <a:r>
+              <a:rPr lang="en-US" dirty="0"/>
+              <a:t>helpful (or take a real stats class)</a:t>
+            </a:r>
           </a:p>
         </p:txBody>
       </p:sp>
     </p:spTree>
     <p:extLst>
       <p:ext uri="{BB962C8B-B14F-4D97-AF65-F5344CB8AC3E}">
-        <p14:creationId xmlns:p14="http://schemas.microsoft.com/office/powerpoint/2010/main" val="356503392"/>
+        <p14:creationId xmlns:p14="http://schemas.microsoft.com/office/powerpoint/2010/main" val="2089782546"/>
       </p:ext>
     </p:extLst>
   </p:cSld>
@@ -7183,7 +7442,7 @@
           <a:p>
             <a:r>
               <a:rPr lang="en-US" dirty="0"/>
-              <a:t>Permutation tests</a:t>
+              <a:t>Tests in the age of computers</a:t>
             </a:r>
           </a:p>
         </p:txBody>
@@ -7200,43 +7459,66 @@
         </p:nvSpPr>
         <p:spPr/>
         <p:txBody>
-          <a:bodyPr/>
-          <a:lstStyle/>
-          <a:p>
-            <a:r>
-              <a:rPr lang="en-US" dirty="0"/>
-              <a:t>We had an introduction to a permutation test last week</a:t>
-            </a:r>
-          </a:p>
-          <a:p>
-            <a:endParaRPr lang="en-US" dirty="0"/>
-          </a:p>
-          <a:p>
-            <a:r>
-              <a:rPr lang="en-US" dirty="0"/>
-              <a:t>Permutation tests provide a powerful way to analyze your data and also </a:t>
-            </a:r>
-            <a:r>
-              <a:rPr lang="en-US" i="1" dirty="0"/>
-              <a:t>thinking about what your statistical tests mean</a:t>
-            </a:r>
-            <a:endParaRPr lang="en-US" dirty="0"/>
-          </a:p>
-          <a:p>
-            <a:endParaRPr lang="en-US" dirty="0"/>
-          </a:p>
-          <a:p>
-            <a:r>
-              <a:rPr lang="en-US" dirty="0"/>
-              <a:t>Thinking about statistical tests in terms of permutations can help you think clearly about your tests even if you never actually use them</a:t>
-            </a:r>
+          <a:bodyPr>
+            <a:normAutofit fontScale="85000" lnSpcReduction="10000"/>
+          </a:bodyPr>
+          <a:lstStyle/>
+          <a:p>
+            <a:r>
+              <a:rPr lang="en-US" sz="3200" dirty="0"/>
+              <a:t>Classical statistics was developed under </a:t>
+            </a:r>
+            <a:r>
+              <a:rPr lang="en-US" sz="3200" dirty="0" err="1"/>
+              <a:t>lampost</a:t>
+            </a:r>
+            <a:r>
+              <a:rPr lang="en-US" sz="3200" dirty="0"/>
+              <a:t> theory</a:t>
+            </a:r>
+          </a:p>
+          <a:p>
+            <a:endParaRPr lang="en-US" sz="3200" dirty="0"/>
+          </a:p>
+          <a:p>
+            <a:r>
+              <a:rPr lang="en-US" sz="3200" dirty="0"/>
+              <a:t>Classical statistics relies heavily on normality assumptions because that was the only simple way to perform statistics without computers</a:t>
+            </a:r>
+          </a:p>
+          <a:p>
+            <a:pPr lvl="1"/>
+            <a:r>
+              <a:rPr lang="en-US" sz="3200" dirty="0"/>
+              <a:t>These statistics use “shortcuts” that rely on normality assumptions </a:t>
+            </a:r>
+          </a:p>
+          <a:p>
+            <a:pPr lvl="2"/>
+            <a:r>
+              <a:rPr lang="en-US" sz="3200" dirty="0"/>
+              <a:t>We aren’t going to learn much about the shortcuts</a:t>
+            </a:r>
+          </a:p>
+          <a:p>
+            <a:pPr lvl="2"/>
+            <a:endParaRPr lang="en-US" sz="3200" dirty="0"/>
+          </a:p>
+          <a:p>
+            <a:r>
+              <a:rPr lang="en-US" sz="4000" dirty="0"/>
+              <a:t>With computers, we can do permutations. Computers light up the street and make us wonder why we didn’t look in the right place the first time. </a:t>
+            </a:r>
+          </a:p>
+          <a:p>
+            <a:endParaRPr lang="en-US" sz="3200" dirty="0"/>
           </a:p>
         </p:txBody>
       </p:sp>
     </p:spTree>
     <p:extLst>
       <p:ext uri="{BB962C8B-B14F-4D97-AF65-F5344CB8AC3E}">
-        <p14:creationId xmlns:p14="http://schemas.microsoft.com/office/powerpoint/2010/main" val="258519036"/>
+        <p14:creationId xmlns:p14="http://schemas.microsoft.com/office/powerpoint/2010/main" val="356503392"/>
       </p:ext>
     </p:extLst>
   </p:cSld>
@@ -7280,7 +7562,7 @@
           <a:p>
             <a:r>
               <a:rPr lang="en-US" dirty="0"/>
-              <a:t>Permutation approach</a:t>
+              <a:t>Permutation tests</a:t>
             </a:r>
           </a:p>
         </p:txBody>
@@ -7302,42 +7584,38 @@
           <a:p>
             <a:r>
               <a:rPr lang="en-US" dirty="0"/>
-              <a:t>The key frequentist question is:</a:t>
-            </a:r>
-          </a:p>
-          <a:p>
-            <a:pPr lvl="1"/>
-            <a:r>
-              <a:rPr lang="en-US" dirty="0"/>
-              <a:t>could this effect be generated by chance (under the null hypothesis)</a:t>
-            </a:r>
-          </a:p>
-          <a:p>
-            <a:pPr lvl="1"/>
+              <a:t>We had an introduction to a permutation test last week</a:t>
+            </a:r>
+          </a:p>
+          <a:p>
             <a:endParaRPr lang="en-US" dirty="0"/>
           </a:p>
           <a:p>
             <a:r>
               <a:rPr lang="en-US" dirty="0"/>
-              <a:t>Permutation tests provide a natural, intuitive way to test a wide range of such hypotheses:</a:t>
-            </a:r>
-          </a:p>
-          <a:p>
-            <a:pPr lvl="1"/>
-            <a:r>
-              <a:rPr lang="en-US" dirty="0"/>
-              <a:t>If we hypothesize that two things are interchangeable, what happens if we interchange  (e.g. scramble) them?</a:t>
-            </a:r>
-          </a:p>
-          <a:p>
+              <a:t>Permutation tests provide a powerful way to analyze your data and also </a:t>
+            </a:r>
+            <a:r>
+              <a:rPr lang="en-US" i="1" dirty="0"/>
+              <a:t>thinking about what your statistical tests mean</a:t>
+            </a:r>
             <a:endParaRPr lang="en-US" dirty="0"/>
+          </a:p>
+          <a:p>
+            <a:endParaRPr lang="en-US" dirty="0"/>
+          </a:p>
+          <a:p>
+            <a:r>
+              <a:rPr lang="en-US" dirty="0"/>
+              <a:t>Thinking about statistical tests in terms of permutations can help you think clearly about your tests even if you never actually use them</a:t>
+            </a:r>
           </a:p>
         </p:txBody>
       </p:sp>
     </p:spTree>
     <p:extLst>
       <p:ext uri="{BB962C8B-B14F-4D97-AF65-F5344CB8AC3E}">
-        <p14:creationId xmlns:p14="http://schemas.microsoft.com/office/powerpoint/2010/main" val="836296601"/>
+        <p14:creationId xmlns:p14="http://schemas.microsoft.com/office/powerpoint/2010/main" val="258519036"/>
       </p:ext>
     </p:extLst>
   </p:cSld>
@@ -7381,7 +7659,7 @@
           <a:p>
             <a:r>
               <a:rPr lang="en-US" dirty="0"/>
-              <a:t>Counting ant colonies</a:t>
+              <a:t>Permutation approach</a:t>
             </a:r>
           </a:p>
         </p:txBody>
@@ -7403,44 +7681,42 @@
           <a:p>
             <a:r>
               <a:rPr lang="en-US" dirty="0"/>
-              <a:t>We do an exhaustive survey of ant colonies in a forest habitat and an old-field habitat. This is how many colonies we find in each survey plot:</a:t>
+              <a:t>The key frequentist question is:</a:t>
             </a:r>
           </a:p>
           <a:p>
             <a:pPr lvl="1"/>
             <a:r>
               <a:rPr lang="en-US" dirty="0"/>
-              <a:t>Forest: 9, 6, 4, 6, 7, 10</a:t>
+              <a:t>could this effect be generated by chance (under the null hypothesis)</a:t>
             </a:r>
           </a:p>
           <a:p>
             <a:pPr lvl="1"/>
-            <a:r>
-              <a:rPr lang="en-US" dirty="0"/>
-              <a:t>Field: 12, 9, 12, 10</a:t>
-            </a:r>
-          </a:p>
-          <a:p>
-            <a:r>
-              <a:rPr lang="en-US" dirty="0"/>
-              <a:t>Field seems to have more ant colonies</a:t>
-            </a:r>
-          </a:p>
-          <a:p>
             <a:endParaRPr lang="en-US" dirty="0"/>
           </a:p>
           <a:p>
             <a:r>
               <a:rPr lang="en-US" dirty="0"/>
-              <a:t>Could this result be due to chance?</a:t>
-            </a:r>
+              <a:t>Permutation tests provide a natural, intuitive way to test a wide range of such hypotheses:</a:t>
+            </a:r>
+          </a:p>
+          <a:p>
+            <a:pPr lvl="1"/>
+            <a:r>
+              <a:rPr lang="en-US" dirty="0"/>
+              <a:t>If we hypothesize that two things are interchangeable, what happens if we interchange  (e.g. scramble) them?</a:t>
+            </a:r>
+          </a:p>
+          <a:p>
+            <a:endParaRPr lang="en-US" dirty="0"/>
           </a:p>
         </p:txBody>
       </p:sp>
     </p:spTree>
     <p:extLst>
       <p:ext uri="{BB962C8B-B14F-4D97-AF65-F5344CB8AC3E}">
-        <p14:creationId xmlns:p14="http://schemas.microsoft.com/office/powerpoint/2010/main" val="1471105694"/>
+        <p14:creationId xmlns:p14="http://schemas.microsoft.com/office/powerpoint/2010/main" val="836296601"/>
       </p:ext>
     </p:extLst>
   </p:cSld>
@@ -7484,7 +7760,7 @@
           <a:p>
             <a:r>
               <a:rPr lang="en-US" dirty="0"/>
-              <a:t>Permutation testing	</a:t>
+              <a:t>Counting ant colonies</a:t>
             </a:r>
           </a:p>
         </p:txBody>
@@ -7506,14 +7782,27 @@
           <a:p>
             <a:r>
               <a:rPr lang="en-US" dirty="0"/>
-              <a:t>Choose a statistic that reflects the effect you are trying to measure</a:t>
+              <a:t>We do an exhaustive survey of ant colonies in a forest habitat and an old-field habitat. This is how many colonies we find in each survey plot:</a:t>
             </a:r>
           </a:p>
           <a:p>
             <a:pPr lvl="1"/>
             <a:r>
               <a:rPr lang="en-US" dirty="0"/>
-              <a:t>e.g., mean, median, geometric mean</a:t>
+              <a:t>Forest: 9, 6, 4, 6, 7, 10</a:t>
+            </a:r>
+          </a:p>
+          <a:p>
+            <a:pPr lvl="1"/>
+            <a:r>
+              <a:rPr lang="en-US" dirty="0"/>
+              <a:t>Field: 12, 9, 12, 10</a:t>
+            </a:r>
+          </a:p>
+          <a:p>
+            <a:r>
+              <a:rPr lang="en-US" dirty="0"/>
+              <a:t>Field seems to have more ant colonies</a:t>
             </a:r>
           </a:p>
           <a:p>
@@ -7522,18 +7811,15 @@
           <a:p>
             <a:r>
               <a:rPr lang="en-US" dirty="0"/>
-              <a:t>Compared the observed value of the statistic with a null distribution, generated by interchanging things that should be interchangeable under your null hypothesis</a:t>
-            </a:r>
-          </a:p>
-          <a:p>
-            <a:endParaRPr lang="en-US" dirty="0"/>
+              <a:t>Could this result be due to chance?</a:t>
+            </a:r>
           </a:p>
         </p:txBody>
       </p:sp>
     </p:spTree>
     <p:extLst>
       <p:ext uri="{BB962C8B-B14F-4D97-AF65-F5344CB8AC3E}">
-        <p14:creationId xmlns:p14="http://schemas.microsoft.com/office/powerpoint/2010/main" val="1506322930"/>
+        <p14:creationId xmlns:p14="http://schemas.microsoft.com/office/powerpoint/2010/main" val="1471105694"/>
       </p:ext>
     </p:extLst>
   </p:cSld>

</xml_diff>